<commit_message>
Made triangular figures for CI vs. gamma graph. Need to do the same for delta and sigma graphs.
</commit_message>
<xml_diff>
--- a/figure_other/Seminar Figures.pptx
+++ b/figure_other/Seminar Figures.pptx
@@ -13,10 +13,10 @@
     <p:sldId id="266" r:id="rId7"/>
     <p:sldId id="267" r:id="rId8"/>
     <p:sldId id="268" r:id="rId9"/>
-    <p:sldId id="259" r:id="rId10"/>
-    <p:sldId id="262" r:id="rId11"/>
-    <p:sldId id="263" r:id="rId12"/>
-    <p:sldId id="264" r:id="rId13"/>
+    <p:sldId id="276" r:id="rId10"/>
+    <p:sldId id="277" r:id="rId11"/>
+    <p:sldId id="278" r:id="rId12"/>
+    <p:sldId id="279" r:id="rId13"/>
     <p:sldId id="256" r:id="rId14"/>
   </p:sldIdLst>
   <p:sldSz cx="9144000" cy="6858000" type="screen4x3"/>
@@ -300,7 +300,7 @@
           <a:p>
             <a:fld id="{392B46AE-74E1-BB46-A59A-36DBA27128E6}" type="datetimeFigureOut">
               <a:rPr lang="en-US" smtClean="0"/>
-              <a:t>22-Mar-13</a:t>
+              <a:t>25-Mar-13</a:t>
             </a:fld>
             <a:endParaRPr lang="en-US"/>
           </a:p>
@@ -470,7 +470,7 @@
           <a:p>
             <a:fld id="{392B46AE-74E1-BB46-A59A-36DBA27128E6}" type="datetimeFigureOut">
               <a:rPr lang="en-US" smtClean="0"/>
-              <a:t>22-Mar-13</a:t>
+              <a:t>25-Mar-13</a:t>
             </a:fld>
             <a:endParaRPr lang="en-US"/>
           </a:p>
@@ -650,7 +650,7 @@
           <a:p>
             <a:fld id="{392B46AE-74E1-BB46-A59A-36DBA27128E6}" type="datetimeFigureOut">
               <a:rPr lang="en-US" smtClean="0"/>
-              <a:t>22-Mar-13</a:t>
+              <a:t>25-Mar-13</a:t>
             </a:fld>
             <a:endParaRPr lang="en-US"/>
           </a:p>
@@ -820,7 +820,7 @@
           <a:p>
             <a:fld id="{392B46AE-74E1-BB46-A59A-36DBA27128E6}" type="datetimeFigureOut">
               <a:rPr lang="en-US" smtClean="0"/>
-              <a:t>22-Mar-13</a:t>
+              <a:t>25-Mar-13</a:t>
             </a:fld>
             <a:endParaRPr lang="en-US"/>
           </a:p>
@@ -1066,7 +1066,7 @@
           <a:p>
             <a:fld id="{392B46AE-74E1-BB46-A59A-36DBA27128E6}" type="datetimeFigureOut">
               <a:rPr lang="en-US" smtClean="0"/>
-              <a:t>22-Mar-13</a:t>
+              <a:t>25-Mar-13</a:t>
             </a:fld>
             <a:endParaRPr lang="en-US"/>
           </a:p>
@@ -1354,7 +1354,7 @@
           <a:p>
             <a:fld id="{392B46AE-74E1-BB46-A59A-36DBA27128E6}" type="datetimeFigureOut">
               <a:rPr lang="en-US" smtClean="0"/>
-              <a:t>22-Mar-13</a:t>
+              <a:t>25-Mar-13</a:t>
             </a:fld>
             <a:endParaRPr lang="en-US"/>
           </a:p>
@@ -1776,7 +1776,7 @@
           <a:p>
             <a:fld id="{392B46AE-74E1-BB46-A59A-36DBA27128E6}" type="datetimeFigureOut">
               <a:rPr lang="en-US" smtClean="0"/>
-              <a:t>22-Mar-13</a:t>
+              <a:t>25-Mar-13</a:t>
             </a:fld>
             <a:endParaRPr lang="en-US"/>
           </a:p>
@@ -1894,7 +1894,7 @@
           <a:p>
             <a:fld id="{392B46AE-74E1-BB46-A59A-36DBA27128E6}" type="datetimeFigureOut">
               <a:rPr lang="en-US" smtClean="0"/>
-              <a:t>22-Mar-13</a:t>
+              <a:t>25-Mar-13</a:t>
             </a:fld>
             <a:endParaRPr lang="en-US"/>
           </a:p>
@@ -1989,7 +1989,7 @@
           <a:p>
             <a:fld id="{392B46AE-74E1-BB46-A59A-36DBA27128E6}" type="datetimeFigureOut">
               <a:rPr lang="en-US" smtClean="0"/>
-              <a:t>22-Mar-13</a:t>
+              <a:t>25-Mar-13</a:t>
             </a:fld>
             <a:endParaRPr lang="en-US"/>
           </a:p>
@@ -2266,7 +2266,7 @@
           <a:p>
             <a:fld id="{392B46AE-74E1-BB46-A59A-36DBA27128E6}" type="datetimeFigureOut">
               <a:rPr lang="en-US" smtClean="0"/>
-              <a:t>22-Mar-13</a:t>
+              <a:t>25-Mar-13</a:t>
             </a:fld>
             <a:endParaRPr lang="en-US"/>
           </a:p>
@@ -2519,7 +2519,7 @@
           <a:p>
             <a:fld id="{392B46AE-74E1-BB46-A59A-36DBA27128E6}" type="datetimeFigureOut">
               <a:rPr lang="en-US" smtClean="0"/>
-              <a:t>22-Mar-13</a:t>
+              <a:t>25-Mar-13</a:t>
             </a:fld>
             <a:endParaRPr lang="en-US"/>
           </a:p>
@@ -2732,7 +2732,7 @@
           <a:p>
             <a:fld id="{392B46AE-74E1-BB46-A59A-36DBA27128E6}" type="datetimeFigureOut">
               <a:rPr lang="en-US" smtClean="0"/>
-              <a:t>22-Mar-13</a:t>
+              <a:t>25-Mar-13</a:t>
             </a:fld>
             <a:endParaRPr lang="en-US"/>
           </a:p>
@@ -3372,137 +3372,6 @@
           <a:chExt cx="0" cy="0"/>
         </a:xfrm>
       </p:grpSpPr>
-      <p:sp>
-        <p:nvSpPr>
-          <p:cNvPr id="4" name="Rounded Rectangle 3"/>
-          <p:cNvSpPr/>
-          <p:nvPr/>
-        </p:nvSpPr>
-        <p:spPr>
-          <a:xfrm>
-            <a:off x="1210882" y="378727"/>
-            <a:ext cx="7506457" cy="2375770"/>
-          </a:xfrm>
-          <a:prstGeom prst="roundRect">
-            <a:avLst/>
-          </a:prstGeom>
-          <a:noFill/>
-          <a:ln w="50800">
-            <a:solidFill>
-              <a:srgbClr val="800000"/>
-            </a:solidFill>
-          </a:ln>
-          <a:effectLst/>
-        </p:spPr>
-        <p:style>
-          <a:lnRef idx="1">
-            <a:schemeClr val="accent1"/>
-          </a:lnRef>
-          <a:fillRef idx="3">
-            <a:schemeClr val="accent1"/>
-          </a:fillRef>
-          <a:effectRef idx="2">
-            <a:schemeClr val="accent1"/>
-          </a:effectRef>
-          <a:fontRef idx="minor">
-            <a:schemeClr val="lt1"/>
-          </a:fontRef>
-        </p:style>
-        <p:txBody>
-          <a:bodyPr rtlCol="0" anchor="ctr"/>
-          <a:lstStyle/>
-          <a:p>
-            <a:pPr algn="ctr"/>
-            <a:r>
-              <a:rPr lang="en-US" sz="2800" b="1" dirty="0" smtClean="0">
-                <a:solidFill>
-                  <a:srgbClr val="800000"/>
-                </a:solidFill>
-              </a:rPr>
-              <a:t>Energy does not meaningfully</a:t>
-            </a:r>
-          </a:p>
-          <a:p>
-            <a:pPr algn="ctr"/>
-            <a:r>
-              <a:rPr lang="en-US" sz="2800" b="1" dirty="0" smtClean="0">
-                <a:solidFill>
-                  <a:srgbClr val="800000"/>
-                </a:solidFill>
-              </a:rPr>
-              <a:t>contribute </a:t>
-            </a:r>
-            <a:r>
-              <a:rPr lang="en-US" sz="2800" b="1" dirty="0" smtClean="0">
-                <a:solidFill>
-                  <a:srgbClr val="800000"/>
-                </a:solidFill>
-              </a:rPr>
-              <a:t>to</a:t>
-            </a:r>
-            <a:r>
-              <a:rPr lang="en-US" sz="2800" b="1" dirty="0" smtClean="0">
-                <a:solidFill>
-                  <a:srgbClr val="800000"/>
-                </a:solidFill>
-              </a:rPr>
-              <a:t> “goodness” of fit.</a:t>
-            </a:r>
-            <a:br>
-              <a:rPr lang="en-US" sz="2800" b="1" dirty="0" smtClean="0">
-                <a:solidFill>
-                  <a:srgbClr val="800000"/>
-                </a:solidFill>
-              </a:rPr>
-            </a:br>
-            <a:r>
-              <a:rPr lang="en-US" sz="2800" b="1" dirty="0" smtClean="0">
-                <a:solidFill>
-                  <a:srgbClr val="800000"/>
-                </a:solidFill>
-              </a:rPr>
-              <a:t>Don</a:t>
-            </a:r>
-            <a:r>
-              <a:rPr lang="fr-FR" sz="2800" b="1" dirty="0" smtClean="0">
-                <a:solidFill>
-                  <a:srgbClr val="800000"/>
-                </a:solidFill>
-              </a:rPr>
-              <a:t>’</a:t>
-            </a:r>
-            <a:r>
-              <a:rPr lang="en-US" sz="2800" b="1" dirty="0" smtClean="0">
-                <a:solidFill>
-                  <a:srgbClr val="800000"/>
-                </a:solidFill>
-              </a:rPr>
-              <a:t>t include </a:t>
-            </a:r>
-            <a:r>
-              <a:rPr lang="en-US" sz="2800" b="1" i="1" dirty="0" smtClean="0">
-                <a:solidFill>
-                  <a:srgbClr val="800000"/>
-                </a:solidFill>
-              </a:rPr>
-              <a:t>e</a:t>
-            </a:r>
-            <a:r>
-              <a:rPr lang="en-US" sz="2800" b="1" dirty="0" smtClean="0">
-                <a:solidFill>
-                  <a:srgbClr val="800000"/>
-                </a:solidFill>
-              </a:rPr>
-              <a:t>.</a:t>
-            </a:r>
-            <a:endParaRPr lang="en-US" sz="2800" b="1" dirty="0">
-              <a:solidFill>
-                <a:srgbClr val="800000"/>
-              </a:solidFill>
-            </a:endParaRPr>
-          </a:p>
-        </p:txBody>
-      </p:sp>
       <p:cxnSp>
         <p:nvCxnSpPr>
           <p:cNvPr id="6" name="Straight Arrow Connector 5"/>
@@ -3585,9 +3454,9 @@
           <p:nvPr/>
         </p:nvSpPr>
         <p:spPr>
-          <a:xfrm>
-            <a:off x="158755" y="95253"/>
-            <a:ext cx="835143" cy="707886"/>
+          <a:xfrm rot="16200000">
+            <a:off x="-964227" y="2754497"/>
+            <a:ext cx="2778158" cy="707886"/>
           </a:xfrm>
           <a:prstGeom prst="rect">
             <a:avLst/>
@@ -3599,6 +3468,16 @@
           </a:bodyPr>
           <a:lstStyle/>
           <a:p>
+            <a:pPr algn="ctr"/>
+            <a:r>
+              <a:rPr lang="en-US" sz="4000" b="1" dirty="0" smtClean="0">
+                <a:solidFill>
+                  <a:srgbClr val="800000"/>
+                </a:solidFill>
+                <a:cs typeface="Symbol" charset="2"/>
+              </a:rPr>
+              <a:t>Width of </a:t>
+            </a:r>
             <a:r>
               <a:rPr lang="en-US" sz="4000" b="1" i="1" dirty="0" err="1" smtClean="0">
                 <a:solidFill>
@@ -3738,10 +3617,212 @@
           </a:p>
         </p:txBody>
       </p:sp>
+      <p:sp>
+        <p:nvSpPr>
+          <p:cNvPr id="12" name="Rectangle 11"/>
+          <p:cNvSpPr/>
+          <p:nvPr/>
+        </p:nvSpPr>
+        <p:spPr>
+          <a:xfrm>
+            <a:off x="561442" y="5885558"/>
+            <a:ext cx="302394" cy="338554"/>
+          </a:xfrm>
+          <a:prstGeom prst="rect">
+            <a:avLst/>
+          </a:prstGeom>
+        </p:spPr>
+        <p:txBody>
+          <a:bodyPr wrap="none">
+            <a:spAutoFit/>
+          </a:bodyPr>
+          <a:lstStyle/>
+          <a:p>
+            <a:pPr algn="ctr"/>
+            <a:r>
+              <a:rPr lang="en-US" sz="1600" dirty="0" smtClean="0">
+                <a:solidFill>
+                  <a:srgbClr val="800000"/>
+                </a:solidFill>
+                <a:cs typeface="Symbol" charset="2"/>
+              </a:rPr>
+              <a:t>0</a:t>
+            </a:r>
+            <a:endParaRPr lang="en-US" sz="1600" baseline="-25000" dirty="0">
+              <a:latin typeface="Symbol" charset="2"/>
+              <a:cs typeface="Symbol" charset="2"/>
+            </a:endParaRPr>
+          </a:p>
+        </p:txBody>
+      </p:sp>
+      <p:sp>
+        <p:nvSpPr>
+          <p:cNvPr id="13" name="Rectangle 12"/>
+          <p:cNvSpPr/>
+          <p:nvPr/>
+        </p:nvSpPr>
+        <p:spPr>
+          <a:xfrm>
+            <a:off x="568308" y="95253"/>
+            <a:ext cx="288661" cy="338554"/>
+          </a:xfrm>
+          <a:prstGeom prst="rect">
+            <a:avLst/>
+          </a:prstGeom>
+        </p:spPr>
+        <p:txBody>
+          <a:bodyPr wrap="none">
+            <a:spAutoFit/>
+          </a:bodyPr>
+          <a:lstStyle/>
+          <a:p>
+            <a:pPr algn="ctr"/>
+            <a:r>
+              <a:rPr lang="en-US" sz="1600" dirty="0" smtClean="0">
+                <a:solidFill>
+                  <a:srgbClr val="800000"/>
+                </a:solidFill>
+                <a:cs typeface="Symbol" charset="2"/>
+              </a:rPr>
+              <a:t>2</a:t>
+            </a:r>
+            <a:endParaRPr lang="en-US" sz="1600" baseline="-25000" dirty="0">
+              <a:latin typeface="Symbol" charset="2"/>
+              <a:cs typeface="Symbol" charset="2"/>
+            </a:endParaRPr>
+          </a:p>
+        </p:txBody>
+      </p:sp>
+      <p:grpSp>
+        <p:nvGrpSpPr>
+          <p:cNvPr id="2" name="Group 1"/>
+          <p:cNvGrpSpPr/>
+          <p:nvPr/>
+        </p:nvGrpSpPr>
+        <p:grpSpPr>
+          <a:xfrm>
+            <a:off x="1109529" y="233018"/>
+            <a:ext cx="7489733" cy="5423298"/>
+            <a:chOff x="1109529" y="233018"/>
+            <a:chExt cx="7489733" cy="5423298"/>
+          </a:xfrm>
+        </p:grpSpPr>
+        <p:sp>
+          <p:nvSpPr>
+            <p:cNvPr id="3" name="Right Triangle 2"/>
+            <p:cNvSpPr/>
+            <p:nvPr/>
+          </p:nvSpPr>
+          <p:spPr>
+            <a:xfrm rot="5400000">
+              <a:off x="2142747" y="-800200"/>
+              <a:ext cx="5423298" cy="7489733"/>
+            </a:xfrm>
+            <a:prstGeom prst="rtTriangle">
+              <a:avLst/>
+            </a:prstGeom>
+            <a:noFill/>
+            <a:ln w="50800">
+              <a:solidFill>
+                <a:srgbClr val="6C0000"/>
+              </a:solidFill>
+            </a:ln>
+            <a:effectLst/>
+          </p:spPr>
+          <p:style>
+            <a:lnRef idx="1">
+              <a:schemeClr val="accent1"/>
+            </a:lnRef>
+            <a:fillRef idx="3">
+              <a:schemeClr val="accent1"/>
+            </a:fillRef>
+            <a:effectRef idx="2">
+              <a:schemeClr val="accent1"/>
+            </a:effectRef>
+            <a:fontRef idx="minor">
+              <a:schemeClr val="lt1"/>
+            </a:fontRef>
+          </p:style>
+          <p:txBody>
+            <a:bodyPr rot="0" spcFirstLastPara="0" vertOverflow="overflow" horzOverflow="overflow" vert="vert270" wrap="square" lIns="0" tIns="0" rIns="0" bIns="0" numCol="1" spcCol="0" rtlCol="0" fromWordArt="0" anchor="t" anchorCtr="0" forceAA="0" compatLnSpc="1">
+              <a:prstTxWarp prst="textNoShape">
+                <a:avLst/>
+              </a:prstTxWarp>
+              <a:noAutofit/>
+            </a:bodyPr>
+            <a:lstStyle/>
+            <a:p>
+              <a:endParaRPr lang="en-US" sz="2800" b="1" dirty="0">
+                <a:solidFill>
+                  <a:srgbClr val="6C0000"/>
+                </a:solidFill>
+              </a:endParaRPr>
+            </a:p>
+          </p:txBody>
+        </p:sp>
+        <p:sp>
+          <p:nvSpPr>
+            <p:cNvPr id="5" name="TextBox 4"/>
+            <p:cNvSpPr txBox="1"/>
+            <p:nvPr/>
+          </p:nvSpPr>
+          <p:spPr>
+            <a:xfrm>
+              <a:off x="1165212" y="287761"/>
+              <a:ext cx="3989293" cy="1384995"/>
+            </a:xfrm>
+            <a:prstGeom prst="rect">
+              <a:avLst/>
+            </a:prstGeom>
+            <a:noFill/>
+          </p:spPr>
+          <p:txBody>
+            <a:bodyPr wrap="none" rtlCol="0">
+              <a:spAutoFit/>
+            </a:bodyPr>
+            <a:lstStyle/>
+            <a:p>
+              <a:r>
+                <a:rPr lang="en-US" sz="2800" b="1" dirty="0">
+                  <a:solidFill>
+                    <a:srgbClr val="6C0000"/>
+                  </a:solidFill>
+                </a:rPr>
+                <a:t>Can’t determine if energy</a:t>
+              </a:r>
+            </a:p>
+            <a:p>
+              <a:r>
+                <a:rPr lang="en-US" sz="2800" b="1" dirty="0">
+                  <a:solidFill>
+                    <a:srgbClr val="6C0000"/>
+                  </a:solidFill>
+                </a:rPr>
+                <a:t>meaningfully contributes</a:t>
+              </a:r>
+            </a:p>
+            <a:p>
+              <a:r>
+                <a:rPr lang="en-US" sz="2800" b="1" dirty="0">
+                  <a:solidFill>
+                    <a:srgbClr val="6C0000"/>
+                  </a:solidFill>
+                </a:rPr>
+                <a:t>to model</a:t>
+              </a:r>
+              <a:endParaRPr lang="en-US" sz="2800" b="1" dirty="0">
+                <a:solidFill>
+                  <a:srgbClr val="6C0000"/>
+                </a:solidFill>
+              </a:endParaRPr>
+            </a:p>
+          </p:txBody>
+        </p:sp>
+      </p:grpSp>
     </p:spTree>
     <p:extLst>
       <p:ext uri="{BB962C8B-B14F-4D97-AF65-F5344CB8AC3E}">
-        <p14:creationId xmlns:p14="http://schemas.microsoft.com/office/powerpoint/2010/main" val="1021428577"/>
+        <p14:creationId xmlns:p14="http://schemas.microsoft.com/office/powerpoint/2010/main" val="3929781831"/>
       </p:ext>
     </p:extLst>
   </p:cSld>
@@ -3768,137 +3849,6 @@
           <a:chExt cx="0" cy="0"/>
         </a:xfrm>
       </p:grpSpPr>
-      <p:sp>
-        <p:nvSpPr>
-          <p:cNvPr id="4" name="Rounded Rectangle 3"/>
-          <p:cNvSpPr/>
-          <p:nvPr/>
-        </p:nvSpPr>
-        <p:spPr>
-          <a:xfrm>
-            <a:off x="1210882" y="378727"/>
-            <a:ext cx="7506457" cy="2375770"/>
-          </a:xfrm>
-          <a:prstGeom prst="roundRect">
-            <a:avLst/>
-          </a:prstGeom>
-          <a:noFill/>
-          <a:ln w="50800">
-            <a:solidFill>
-              <a:srgbClr val="800000"/>
-            </a:solidFill>
-          </a:ln>
-          <a:effectLst/>
-        </p:spPr>
-        <p:style>
-          <a:lnRef idx="1">
-            <a:schemeClr val="accent1"/>
-          </a:lnRef>
-          <a:fillRef idx="3">
-            <a:schemeClr val="accent1"/>
-          </a:fillRef>
-          <a:effectRef idx="2">
-            <a:schemeClr val="accent1"/>
-          </a:effectRef>
-          <a:fontRef idx="minor">
-            <a:schemeClr val="lt1"/>
-          </a:fontRef>
-        </p:style>
-        <p:txBody>
-          <a:bodyPr rtlCol="0" anchor="ctr"/>
-          <a:lstStyle/>
-          <a:p>
-            <a:pPr algn="ctr"/>
-            <a:r>
-              <a:rPr lang="en-US" sz="2800" b="1" dirty="0" smtClean="0">
-                <a:solidFill>
-                  <a:srgbClr val="800000"/>
-                </a:solidFill>
-              </a:rPr>
-              <a:t>Energy does not meaningfully</a:t>
-            </a:r>
-          </a:p>
-          <a:p>
-            <a:pPr algn="ctr"/>
-            <a:r>
-              <a:rPr lang="en-US" sz="2800" b="1" dirty="0" smtClean="0">
-                <a:solidFill>
-                  <a:srgbClr val="800000"/>
-                </a:solidFill>
-              </a:rPr>
-              <a:t>contribute </a:t>
-            </a:r>
-            <a:r>
-              <a:rPr lang="en-US" sz="2800" b="1" dirty="0" smtClean="0">
-                <a:solidFill>
-                  <a:srgbClr val="800000"/>
-                </a:solidFill>
-              </a:rPr>
-              <a:t>to</a:t>
-            </a:r>
-            <a:r>
-              <a:rPr lang="en-US" sz="2800" b="1" dirty="0" smtClean="0">
-                <a:solidFill>
-                  <a:srgbClr val="800000"/>
-                </a:solidFill>
-              </a:rPr>
-              <a:t> “goodness” of fit.</a:t>
-            </a:r>
-            <a:br>
-              <a:rPr lang="en-US" sz="2800" b="1" dirty="0" smtClean="0">
-                <a:solidFill>
-                  <a:srgbClr val="800000"/>
-                </a:solidFill>
-              </a:rPr>
-            </a:br>
-            <a:r>
-              <a:rPr lang="en-US" sz="2800" b="1" dirty="0" smtClean="0">
-                <a:solidFill>
-                  <a:srgbClr val="800000"/>
-                </a:solidFill>
-              </a:rPr>
-              <a:t>Don</a:t>
-            </a:r>
-            <a:r>
-              <a:rPr lang="fr-FR" sz="2800" b="1" dirty="0" smtClean="0">
-                <a:solidFill>
-                  <a:srgbClr val="800000"/>
-                </a:solidFill>
-              </a:rPr>
-              <a:t>’</a:t>
-            </a:r>
-            <a:r>
-              <a:rPr lang="en-US" sz="2800" b="1" dirty="0" smtClean="0">
-                <a:solidFill>
-                  <a:srgbClr val="800000"/>
-                </a:solidFill>
-              </a:rPr>
-              <a:t>t include </a:t>
-            </a:r>
-            <a:r>
-              <a:rPr lang="en-US" sz="2800" b="1" i="1" dirty="0" smtClean="0">
-                <a:solidFill>
-                  <a:srgbClr val="800000"/>
-                </a:solidFill>
-              </a:rPr>
-              <a:t>e</a:t>
-            </a:r>
-            <a:r>
-              <a:rPr lang="en-US" sz="2800" b="1" dirty="0" smtClean="0">
-                <a:solidFill>
-                  <a:srgbClr val="800000"/>
-                </a:solidFill>
-              </a:rPr>
-              <a:t>.</a:t>
-            </a:r>
-            <a:endParaRPr lang="en-US" sz="2800" b="1" dirty="0">
-              <a:solidFill>
-                <a:srgbClr val="800000"/>
-              </a:solidFill>
-            </a:endParaRPr>
-          </a:p>
-        </p:txBody>
-      </p:sp>
       <p:cxnSp>
         <p:nvCxnSpPr>
           <p:cNvPr id="6" name="Straight Arrow Connector 5"/>
@@ -3981,9 +3931,9 @@
           <p:nvPr/>
         </p:nvSpPr>
         <p:spPr>
-          <a:xfrm>
-            <a:off x="158755" y="95253"/>
-            <a:ext cx="835143" cy="707886"/>
+          <a:xfrm rot="16200000">
+            <a:off x="-964227" y="2754497"/>
+            <a:ext cx="2778158" cy="707886"/>
           </a:xfrm>
           <a:prstGeom prst="rect">
             <a:avLst/>
@@ -3995,6 +3945,16 @@
           </a:bodyPr>
           <a:lstStyle/>
           <a:p>
+            <a:pPr algn="ctr"/>
+            <a:r>
+              <a:rPr lang="en-US" sz="4000" b="1" dirty="0" smtClean="0">
+                <a:solidFill>
+                  <a:srgbClr val="800000"/>
+                </a:solidFill>
+                <a:cs typeface="Symbol" charset="2"/>
+              </a:rPr>
+              <a:t>Width of </a:t>
+            </a:r>
             <a:r>
               <a:rPr lang="en-US" sz="4000" b="1" i="1" dirty="0" err="1" smtClean="0">
                 <a:solidFill>
@@ -4060,95 +4020,6 @@
       </p:cxnSp>
       <p:sp>
         <p:nvSpPr>
-          <p:cNvPr id="18" name="Rounded Rectangle 17"/>
-          <p:cNvSpPr/>
-          <p:nvPr/>
-        </p:nvSpPr>
-        <p:spPr>
-          <a:xfrm>
-            <a:off x="1229934" y="3312444"/>
-            <a:ext cx="2750279" cy="2375770"/>
-          </a:xfrm>
-          <a:prstGeom prst="roundRect">
-            <a:avLst/>
-          </a:prstGeom>
-          <a:noFill/>
-          <a:ln w="50800">
-            <a:solidFill>
-              <a:srgbClr val="800000"/>
-            </a:solidFill>
-          </a:ln>
-          <a:effectLst/>
-        </p:spPr>
-        <p:style>
-          <a:lnRef idx="1">
-            <a:schemeClr val="accent1"/>
-          </a:lnRef>
-          <a:fillRef idx="3">
-            <a:schemeClr val="accent1"/>
-          </a:fillRef>
-          <a:effectRef idx="2">
-            <a:schemeClr val="accent1"/>
-          </a:effectRef>
-          <a:fontRef idx="minor">
-            <a:schemeClr val="lt1"/>
-          </a:fontRef>
-        </p:style>
-        <p:txBody>
-          <a:bodyPr rtlCol="0" anchor="ctr"/>
-          <a:lstStyle/>
-          <a:p>
-            <a:pPr algn="ctr"/>
-            <a:r>
-              <a:rPr lang="en-US" sz="2800" b="1" dirty="0" smtClean="0">
-                <a:solidFill>
-                  <a:srgbClr val="800000"/>
-                </a:solidFill>
-              </a:rPr>
-              <a:t>Energy seemingly unimportant for growth. Don</a:t>
-            </a:r>
-            <a:r>
-              <a:rPr lang="fr-FR" sz="2800" b="1" dirty="0" smtClean="0">
-                <a:solidFill>
-                  <a:srgbClr val="800000"/>
-                </a:solidFill>
-              </a:rPr>
-              <a:t>’</a:t>
-            </a:r>
-            <a:r>
-              <a:rPr lang="en-US" sz="2800" b="1" dirty="0" smtClean="0">
-                <a:solidFill>
-                  <a:srgbClr val="800000"/>
-                </a:solidFill>
-              </a:rPr>
-              <a:t>t include </a:t>
-            </a:r>
-            <a:r>
-              <a:rPr lang="en-US" sz="2800" b="1" i="1" dirty="0" smtClean="0">
-                <a:solidFill>
-                  <a:srgbClr val="800000"/>
-                </a:solidFill>
-              </a:rPr>
-              <a:t>e</a:t>
-            </a:r>
-            <a:r>
-              <a:rPr lang="en-US" sz="2800" b="1" dirty="0" smtClean="0">
-                <a:solidFill>
-                  <a:srgbClr val="800000"/>
-                </a:solidFill>
-              </a:rPr>
-              <a:t>.</a:t>
-            </a:r>
-            <a:endParaRPr lang="en-US" sz="2800" b="1" dirty="0">
-              <a:solidFill>
-                <a:srgbClr val="800000"/>
-              </a:solidFill>
-            </a:endParaRPr>
-          </a:p>
-        </p:txBody>
-      </p:sp>
-      <p:sp>
-        <p:nvSpPr>
           <p:cNvPr id="22" name="Rectangle 21"/>
           <p:cNvSpPr/>
           <p:nvPr/>
@@ -4223,10 +4094,347 @@
           </a:p>
         </p:txBody>
       </p:sp>
+      <p:sp>
+        <p:nvSpPr>
+          <p:cNvPr id="12" name="Rectangle 11"/>
+          <p:cNvSpPr/>
+          <p:nvPr/>
+        </p:nvSpPr>
+        <p:spPr>
+          <a:xfrm>
+            <a:off x="561442" y="5885558"/>
+            <a:ext cx="302394" cy="338554"/>
+          </a:xfrm>
+          <a:prstGeom prst="rect">
+            <a:avLst/>
+          </a:prstGeom>
+        </p:spPr>
+        <p:txBody>
+          <a:bodyPr wrap="none">
+            <a:spAutoFit/>
+          </a:bodyPr>
+          <a:lstStyle/>
+          <a:p>
+            <a:pPr algn="ctr"/>
+            <a:r>
+              <a:rPr lang="en-US" sz="1600" dirty="0" smtClean="0">
+                <a:solidFill>
+                  <a:srgbClr val="800000"/>
+                </a:solidFill>
+                <a:cs typeface="Symbol" charset="2"/>
+              </a:rPr>
+              <a:t>0</a:t>
+            </a:r>
+            <a:endParaRPr lang="en-US" sz="1600" baseline="-25000" dirty="0">
+              <a:latin typeface="Symbol" charset="2"/>
+              <a:cs typeface="Symbol" charset="2"/>
+            </a:endParaRPr>
+          </a:p>
+        </p:txBody>
+      </p:sp>
+      <p:sp>
+        <p:nvSpPr>
+          <p:cNvPr id="13" name="Rectangle 12"/>
+          <p:cNvSpPr/>
+          <p:nvPr/>
+        </p:nvSpPr>
+        <p:spPr>
+          <a:xfrm>
+            <a:off x="568308" y="95253"/>
+            <a:ext cx="288661" cy="338554"/>
+          </a:xfrm>
+          <a:prstGeom prst="rect">
+            <a:avLst/>
+          </a:prstGeom>
+        </p:spPr>
+        <p:txBody>
+          <a:bodyPr wrap="none">
+            <a:spAutoFit/>
+          </a:bodyPr>
+          <a:lstStyle/>
+          <a:p>
+            <a:pPr algn="ctr"/>
+            <a:r>
+              <a:rPr lang="en-US" sz="1600" dirty="0" smtClean="0">
+                <a:solidFill>
+                  <a:srgbClr val="800000"/>
+                </a:solidFill>
+                <a:cs typeface="Symbol" charset="2"/>
+              </a:rPr>
+              <a:t>2</a:t>
+            </a:r>
+            <a:endParaRPr lang="en-US" sz="1600" baseline="-25000" dirty="0">
+              <a:latin typeface="Symbol" charset="2"/>
+              <a:cs typeface="Symbol" charset="2"/>
+            </a:endParaRPr>
+          </a:p>
+        </p:txBody>
+      </p:sp>
+      <p:grpSp>
+        <p:nvGrpSpPr>
+          <p:cNvPr id="2" name="Group 1"/>
+          <p:cNvGrpSpPr/>
+          <p:nvPr/>
+        </p:nvGrpSpPr>
+        <p:grpSpPr>
+          <a:xfrm>
+            <a:off x="1109529" y="233018"/>
+            <a:ext cx="7489733" cy="5423298"/>
+            <a:chOff x="1109529" y="233018"/>
+            <a:chExt cx="7489733" cy="5423298"/>
+          </a:xfrm>
+        </p:grpSpPr>
+        <p:sp>
+          <p:nvSpPr>
+            <p:cNvPr id="3" name="Right Triangle 2"/>
+            <p:cNvSpPr/>
+            <p:nvPr/>
+          </p:nvSpPr>
+          <p:spPr>
+            <a:xfrm rot="5400000">
+              <a:off x="2142747" y="-800200"/>
+              <a:ext cx="5423298" cy="7489733"/>
+            </a:xfrm>
+            <a:prstGeom prst="rtTriangle">
+              <a:avLst/>
+            </a:prstGeom>
+            <a:noFill/>
+            <a:ln w="50800">
+              <a:solidFill>
+                <a:srgbClr val="6C0000"/>
+              </a:solidFill>
+            </a:ln>
+            <a:effectLst/>
+          </p:spPr>
+          <p:style>
+            <a:lnRef idx="1">
+              <a:schemeClr val="accent1"/>
+            </a:lnRef>
+            <a:fillRef idx="3">
+              <a:schemeClr val="accent1"/>
+            </a:fillRef>
+            <a:effectRef idx="2">
+              <a:schemeClr val="accent1"/>
+            </a:effectRef>
+            <a:fontRef idx="minor">
+              <a:schemeClr val="lt1"/>
+            </a:fontRef>
+          </p:style>
+          <p:txBody>
+            <a:bodyPr rot="0" spcFirstLastPara="0" vertOverflow="overflow" horzOverflow="overflow" vert="vert270" wrap="square" lIns="0" tIns="0" rIns="0" bIns="0" numCol="1" spcCol="0" rtlCol="0" fromWordArt="0" anchor="t" anchorCtr="0" forceAA="0" compatLnSpc="1">
+              <a:prstTxWarp prst="textNoShape">
+                <a:avLst/>
+              </a:prstTxWarp>
+              <a:noAutofit/>
+            </a:bodyPr>
+            <a:lstStyle/>
+            <a:p>
+              <a:endParaRPr lang="en-US" sz="2800" b="1" dirty="0">
+                <a:solidFill>
+                  <a:srgbClr val="6C0000"/>
+                </a:solidFill>
+              </a:endParaRPr>
+            </a:p>
+          </p:txBody>
+        </p:sp>
+        <p:sp>
+          <p:nvSpPr>
+            <p:cNvPr id="5" name="TextBox 4"/>
+            <p:cNvSpPr txBox="1"/>
+            <p:nvPr/>
+          </p:nvSpPr>
+          <p:spPr>
+            <a:xfrm>
+              <a:off x="1165212" y="287761"/>
+              <a:ext cx="3989293" cy="1384995"/>
+            </a:xfrm>
+            <a:prstGeom prst="rect">
+              <a:avLst/>
+            </a:prstGeom>
+            <a:noFill/>
+          </p:spPr>
+          <p:txBody>
+            <a:bodyPr wrap="none" rtlCol="0">
+              <a:spAutoFit/>
+            </a:bodyPr>
+            <a:lstStyle/>
+            <a:p>
+              <a:r>
+                <a:rPr lang="en-US" sz="2800" b="1" dirty="0">
+                  <a:solidFill>
+                    <a:srgbClr val="6C0000"/>
+                  </a:solidFill>
+                </a:rPr>
+                <a:t>Can’t determine if energy</a:t>
+              </a:r>
+            </a:p>
+            <a:p>
+              <a:r>
+                <a:rPr lang="en-US" sz="2800" b="1" dirty="0">
+                  <a:solidFill>
+                    <a:srgbClr val="6C0000"/>
+                  </a:solidFill>
+                </a:rPr>
+                <a:t>meaningfully contributes</a:t>
+              </a:r>
+            </a:p>
+            <a:p>
+              <a:r>
+                <a:rPr lang="en-US" sz="2800" b="1" dirty="0">
+                  <a:solidFill>
+                    <a:srgbClr val="6C0000"/>
+                  </a:solidFill>
+                </a:rPr>
+                <a:t>to model</a:t>
+              </a:r>
+              <a:endParaRPr lang="en-US" sz="2800" b="1" dirty="0">
+                <a:solidFill>
+                  <a:srgbClr val="6C0000"/>
+                </a:solidFill>
+              </a:endParaRPr>
+            </a:p>
+          </p:txBody>
+        </p:sp>
+      </p:grpSp>
+      <p:grpSp>
+        <p:nvGrpSpPr>
+          <p:cNvPr id="14" name="Group 13"/>
+          <p:cNvGrpSpPr/>
+          <p:nvPr/>
+        </p:nvGrpSpPr>
+        <p:grpSpPr>
+          <a:xfrm>
+            <a:off x="862262" y="4497518"/>
+            <a:ext cx="2283816" cy="1442049"/>
+            <a:chOff x="862262" y="4497518"/>
+            <a:chExt cx="2283816" cy="1442049"/>
+          </a:xfrm>
+        </p:grpSpPr>
+        <p:sp>
+          <p:nvSpPr>
+            <p:cNvPr id="7" name="Right Triangle 6"/>
+            <p:cNvSpPr/>
+            <p:nvPr/>
+          </p:nvSpPr>
+          <p:spPr>
+            <a:xfrm flipH="1">
+              <a:off x="1109528" y="4497518"/>
+              <a:ext cx="2036544" cy="1442049"/>
+            </a:xfrm>
+            <a:prstGeom prst="rtTriangle">
+              <a:avLst/>
+            </a:prstGeom>
+            <a:noFill/>
+            <a:ln w="50800">
+              <a:solidFill>
+                <a:srgbClr val="6C0000"/>
+              </a:solidFill>
+            </a:ln>
+            <a:effectLst/>
+          </p:spPr>
+          <p:style>
+            <a:lnRef idx="1">
+              <a:schemeClr val="accent1"/>
+            </a:lnRef>
+            <a:fillRef idx="3">
+              <a:schemeClr val="accent1"/>
+            </a:fillRef>
+            <a:effectRef idx="2">
+              <a:schemeClr val="accent1"/>
+            </a:effectRef>
+            <a:fontRef idx="minor">
+              <a:schemeClr val="lt1"/>
+            </a:fontRef>
+          </p:style>
+          <p:txBody>
+            <a:bodyPr rot="0" spcFirstLastPara="0" vertOverflow="overflow" horzOverflow="overflow" vert="vert270" wrap="square" lIns="0" tIns="0" rIns="0" bIns="0" numCol="1" spcCol="0" rtlCol="0" fromWordArt="0" anchor="t" anchorCtr="0" forceAA="0" compatLnSpc="1">
+              <a:prstTxWarp prst="textNoShape">
+                <a:avLst/>
+              </a:prstTxWarp>
+              <a:noAutofit/>
+            </a:bodyPr>
+            <a:lstStyle/>
+            <a:p>
+              <a:endParaRPr lang="en-US" sz="2800" b="1">
+                <a:solidFill>
+                  <a:srgbClr val="6C0000"/>
+                </a:solidFill>
+              </a:endParaRPr>
+            </a:p>
+          </p:txBody>
+        </p:sp>
+        <p:sp>
+          <p:nvSpPr>
+            <p:cNvPr id="17" name="TextBox 16"/>
+            <p:cNvSpPr txBox="1"/>
+            <p:nvPr/>
+          </p:nvSpPr>
+          <p:spPr>
+            <a:xfrm>
+              <a:off x="862262" y="4984655"/>
+              <a:ext cx="2283816" cy="954107"/>
+            </a:xfrm>
+            <a:prstGeom prst="rect">
+              <a:avLst/>
+            </a:prstGeom>
+            <a:noFill/>
+          </p:spPr>
+          <p:txBody>
+            <a:bodyPr wrap="square" rtlCol="0">
+              <a:spAutoFit/>
+            </a:bodyPr>
+            <a:lstStyle/>
+            <a:p>
+              <a:pPr algn="r"/>
+              <a:r>
+                <a:rPr lang="en-US" sz="1400" b="1" dirty="0" smtClean="0">
+                  <a:solidFill>
+                    <a:srgbClr val="6C0000"/>
+                  </a:solidFill>
+                </a:rPr>
+                <a:t>Energy </a:t>
+              </a:r>
+            </a:p>
+            <a:p>
+              <a:pPr algn="r"/>
+              <a:r>
+                <a:rPr lang="en-US" sz="1400" b="1" dirty="0" smtClean="0">
+                  <a:solidFill>
+                    <a:srgbClr val="6C0000"/>
+                  </a:solidFill>
+                </a:rPr>
+                <a:t>seemingly </a:t>
+              </a:r>
+            </a:p>
+            <a:p>
+              <a:pPr algn="r"/>
+              <a:r>
+                <a:rPr lang="en-US" sz="1400" b="1" dirty="0" smtClean="0">
+                  <a:solidFill>
+                    <a:srgbClr val="6C0000"/>
+                  </a:solidFill>
+                </a:rPr>
+                <a:t>unimportant </a:t>
+              </a:r>
+            </a:p>
+            <a:p>
+              <a:pPr algn="r"/>
+              <a:r>
+                <a:rPr lang="en-US" sz="1400" b="1" dirty="0" smtClean="0">
+                  <a:solidFill>
+                    <a:srgbClr val="6C0000"/>
+                  </a:solidFill>
+                </a:rPr>
+                <a:t>for economic growth</a:t>
+              </a:r>
+            </a:p>
+          </p:txBody>
+        </p:sp>
+      </p:grpSp>
     </p:spTree>
     <p:extLst>
       <p:ext uri="{BB962C8B-B14F-4D97-AF65-F5344CB8AC3E}">
-        <p14:creationId xmlns:p14="http://schemas.microsoft.com/office/powerpoint/2010/main" val="2953549760"/>
+        <p14:creationId xmlns:p14="http://schemas.microsoft.com/office/powerpoint/2010/main" val="613197063"/>
       </p:ext>
     </p:extLst>
   </p:cSld>
@@ -4253,137 +4461,6 @@
           <a:chExt cx="0" cy="0"/>
         </a:xfrm>
       </p:grpSpPr>
-      <p:sp>
-        <p:nvSpPr>
-          <p:cNvPr id="4" name="Rounded Rectangle 3"/>
-          <p:cNvSpPr/>
-          <p:nvPr/>
-        </p:nvSpPr>
-        <p:spPr>
-          <a:xfrm>
-            <a:off x="1210882" y="378727"/>
-            <a:ext cx="7506457" cy="2375770"/>
-          </a:xfrm>
-          <a:prstGeom prst="roundRect">
-            <a:avLst/>
-          </a:prstGeom>
-          <a:noFill/>
-          <a:ln w="50800">
-            <a:solidFill>
-              <a:srgbClr val="800000"/>
-            </a:solidFill>
-          </a:ln>
-          <a:effectLst/>
-        </p:spPr>
-        <p:style>
-          <a:lnRef idx="1">
-            <a:schemeClr val="accent1"/>
-          </a:lnRef>
-          <a:fillRef idx="3">
-            <a:schemeClr val="accent1"/>
-          </a:fillRef>
-          <a:effectRef idx="2">
-            <a:schemeClr val="accent1"/>
-          </a:effectRef>
-          <a:fontRef idx="minor">
-            <a:schemeClr val="lt1"/>
-          </a:fontRef>
-        </p:style>
-        <p:txBody>
-          <a:bodyPr rtlCol="0" anchor="ctr"/>
-          <a:lstStyle/>
-          <a:p>
-            <a:pPr algn="ctr"/>
-            <a:r>
-              <a:rPr lang="en-US" sz="2800" b="1" dirty="0" smtClean="0">
-                <a:solidFill>
-                  <a:srgbClr val="800000"/>
-                </a:solidFill>
-              </a:rPr>
-              <a:t>Energy does not meaningfully</a:t>
-            </a:r>
-          </a:p>
-          <a:p>
-            <a:pPr algn="ctr"/>
-            <a:r>
-              <a:rPr lang="en-US" sz="2800" b="1" dirty="0" smtClean="0">
-                <a:solidFill>
-                  <a:srgbClr val="800000"/>
-                </a:solidFill>
-              </a:rPr>
-              <a:t>contribute </a:t>
-            </a:r>
-            <a:r>
-              <a:rPr lang="en-US" sz="2800" b="1" dirty="0" smtClean="0">
-                <a:solidFill>
-                  <a:srgbClr val="800000"/>
-                </a:solidFill>
-              </a:rPr>
-              <a:t>to</a:t>
-            </a:r>
-            <a:r>
-              <a:rPr lang="en-US" sz="2800" b="1" dirty="0" smtClean="0">
-                <a:solidFill>
-                  <a:srgbClr val="800000"/>
-                </a:solidFill>
-              </a:rPr>
-              <a:t> “goodness” of fit.</a:t>
-            </a:r>
-            <a:br>
-              <a:rPr lang="en-US" sz="2800" b="1" dirty="0" smtClean="0">
-                <a:solidFill>
-                  <a:srgbClr val="800000"/>
-                </a:solidFill>
-              </a:rPr>
-            </a:br>
-            <a:r>
-              <a:rPr lang="en-US" sz="2800" b="1" dirty="0" smtClean="0">
-                <a:solidFill>
-                  <a:srgbClr val="800000"/>
-                </a:solidFill>
-              </a:rPr>
-              <a:t>Don</a:t>
-            </a:r>
-            <a:r>
-              <a:rPr lang="fr-FR" sz="2800" b="1" dirty="0" smtClean="0">
-                <a:solidFill>
-                  <a:srgbClr val="800000"/>
-                </a:solidFill>
-              </a:rPr>
-              <a:t>’</a:t>
-            </a:r>
-            <a:r>
-              <a:rPr lang="en-US" sz="2800" b="1" dirty="0" smtClean="0">
-                <a:solidFill>
-                  <a:srgbClr val="800000"/>
-                </a:solidFill>
-              </a:rPr>
-              <a:t>t include </a:t>
-            </a:r>
-            <a:r>
-              <a:rPr lang="en-US" sz="2800" b="1" i="1" dirty="0" smtClean="0">
-                <a:solidFill>
-                  <a:srgbClr val="800000"/>
-                </a:solidFill>
-              </a:rPr>
-              <a:t>e</a:t>
-            </a:r>
-            <a:r>
-              <a:rPr lang="en-US" sz="2800" b="1" dirty="0" smtClean="0">
-                <a:solidFill>
-                  <a:srgbClr val="800000"/>
-                </a:solidFill>
-              </a:rPr>
-              <a:t>.</a:t>
-            </a:r>
-            <a:endParaRPr lang="en-US" sz="2800" b="1" dirty="0">
-              <a:solidFill>
-                <a:srgbClr val="800000"/>
-              </a:solidFill>
-            </a:endParaRPr>
-          </a:p>
-        </p:txBody>
-      </p:sp>
       <p:cxnSp>
         <p:nvCxnSpPr>
           <p:cNvPr id="6" name="Straight Arrow Connector 5"/>
@@ -4466,9 +4543,9 @@
           <p:nvPr/>
         </p:nvSpPr>
         <p:spPr>
-          <a:xfrm>
-            <a:off x="158755" y="95253"/>
-            <a:ext cx="835143" cy="707886"/>
+          <a:xfrm rot="16200000">
+            <a:off x="-964227" y="2754497"/>
+            <a:ext cx="2778158" cy="707886"/>
           </a:xfrm>
           <a:prstGeom prst="rect">
             <a:avLst/>
@@ -4480,6 +4557,16 @@
           </a:bodyPr>
           <a:lstStyle/>
           <a:p>
+            <a:pPr algn="ctr"/>
+            <a:r>
+              <a:rPr lang="en-US" sz="4000" b="1" dirty="0" smtClean="0">
+                <a:solidFill>
+                  <a:srgbClr val="800000"/>
+                </a:solidFill>
+                <a:cs typeface="Symbol" charset="2"/>
+              </a:rPr>
+              <a:t>Width of </a:t>
+            </a:r>
             <a:r>
               <a:rPr lang="en-US" sz="4000" b="1" i="1" dirty="0" err="1" smtClean="0">
                 <a:solidFill>
@@ -4545,152 +4632,6 @@
       </p:cxnSp>
       <p:sp>
         <p:nvSpPr>
-          <p:cNvPr id="18" name="Rounded Rectangle 17"/>
-          <p:cNvSpPr/>
-          <p:nvPr/>
-        </p:nvSpPr>
-        <p:spPr>
-          <a:xfrm>
-            <a:off x="1229934" y="3312444"/>
-            <a:ext cx="2750279" cy="2375770"/>
-          </a:xfrm>
-          <a:prstGeom prst="roundRect">
-            <a:avLst/>
-          </a:prstGeom>
-          <a:noFill/>
-          <a:ln w="50800">
-            <a:solidFill>
-              <a:srgbClr val="800000"/>
-            </a:solidFill>
-          </a:ln>
-          <a:effectLst/>
-        </p:spPr>
-        <p:style>
-          <a:lnRef idx="1">
-            <a:schemeClr val="accent1"/>
-          </a:lnRef>
-          <a:fillRef idx="3">
-            <a:schemeClr val="accent1"/>
-          </a:fillRef>
-          <a:effectRef idx="2">
-            <a:schemeClr val="accent1"/>
-          </a:effectRef>
-          <a:fontRef idx="minor">
-            <a:schemeClr val="lt1"/>
-          </a:fontRef>
-        </p:style>
-        <p:txBody>
-          <a:bodyPr rtlCol="0" anchor="ctr"/>
-          <a:lstStyle/>
-          <a:p>
-            <a:pPr algn="ctr"/>
-            <a:r>
-              <a:rPr lang="en-US" sz="2800" b="1" dirty="0" smtClean="0">
-                <a:solidFill>
-                  <a:srgbClr val="800000"/>
-                </a:solidFill>
-              </a:rPr>
-              <a:t>Energy seemingly unimportant for growth. Don</a:t>
-            </a:r>
-            <a:r>
-              <a:rPr lang="fr-FR" sz="2800" b="1" dirty="0" smtClean="0">
-                <a:solidFill>
-                  <a:srgbClr val="800000"/>
-                </a:solidFill>
-              </a:rPr>
-              <a:t>’</a:t>
-            </a:r>
-            <a:r>
-              <a:rPr lang="en-US" sz="2800" b="1" dirty="0" smtClean="0">
-                <a:solidFill>
-                  <a:srgbClr val="800000"/>
-                </a:solidFill>
-              </a:rPr>
-              <a:t>t include </a:t>
-            </a:r>
-            <a:r>
-              <a:rPr lang="en-US" sz="2800" b="1" i="1" dirty="0" smtClean="0">
-                <a:solidFill>
-                  <a:srgbClr val="800000"/>
-                </a:solidFill>
-              </a:rPr>
-              <a:t>e</a:t>
-            </a:r>
-            <a:r>
-              <a:rPr lang="en-US" sz="2800" b="1" dirty="0" smtClean="0">
-                <a:solidFill>
-                  <a:srgbClr val="800000"/>
-                </a:solidFill>
-              </a:rPr>
-              <a:t>.</a:t>
-            </a:r>
-            <a:endParaRPr lang="en-US" sz="2800" b="1" dirty="0">
-              <a:solidFill>
-                <a:srgbClr val="800000"/>
-              </a:solidFill>
-            </a:endParaRPr>
-          </a:p>
-        </p:txBody>
-      </p:sp>
-      <p:sp>
-        <p:nvSpPr>
-          <p:cNvPr id="19" name="Rounded Rectangle 18"/>
-          <p:cNvSpPr/>
-          <p:nvPr/>
-        </p:nvSpPr>
-        <p:spPr>
-          <a:xfrm>
-            <a:off x="6240590" y="3312444"/>
-            <a:ext cx="2476748" cy="2375770"/>
-          </a:xfrm>
-          <a:prstGeom prst="roundRect">
-            <a:avLst/>
-          </a:prstGeom>
-          <a:noFill/>
-          <a:ln w="50800">
-            <a:solidFill>
-              <a:srgbClr val="800000"/>
-            </a:solidFill>
-          </a:ln>
-          <a:effectLst/>
-        </p:spPr>
-        <p:style>
-          <a:lnRef idx="1">
-            <a:schemeClr val="accent1"/>
-          </a:lnRef>
-          <a:fillRef idx="3">
-            <a:schemeClr val="accent1"/>
-          </a:fillRef>
-          <a:effectRef idx="2">
-            <a:schemeClr val="accent1"/>
-          </a:effectRef>
-          <a:fontRef idx="minor">
-            <a:schemeClr val="lt1"/>
-          </a:fontRef>
-        </p:style>
-        <p:txBody>
-          <a:bodyPr rtlCol="0" anchor="ctr"/>
-          <a:lstStyle/>
-          <a:p>
-            <a:pPr algn="ctr"/>
-            <a:r>
-              <a:rPr lang="en-US" sz="2800" b="1" dirty="0" smtClean="0">
-                <a:solidFill>
-                  <a:srgbClr val="800000"/>
-                </a:solidFill>
-              </a:rPr>
-              <a:t>Energy drives economic growth</a:t>
-            </a:r>
-            <a:endParaRPr lang="en-US" sz="2800" b="1" dirty="0">
-              <a:solidFill>
-                <a:srgbClr val="800000"/>
-              </a:solidFill>
-            </a:endParaRPr>
-          </a:p>
-        </p:txBody>
-      </p:sp>
-      <p:sp>
-        <p:nvSpPr>
           <p:cNvPr id="22" name="Rectangle 21"/>
           <p:cNvSpPr/>
           <p:nvPr/>
@@ -4765,10 +4706,566 @@
           </a:p>
         </p:txBody>
       </p:sp>
+      <p:sp>
+        <p:nvSpPr>
+          <p:cNvPr id="12" name="Rectangle 11"/>
+          <p:cNvSpPr/>
+          <p:nvPr/>
+        </p:nvSpPr>
+        <p:spPr>
+          <a:xfrm>
+            <a:off x="561442" y="5885558"/>
+            <a:ext cx="302394" cy="338554"/>
+          </a:xfrm>
+          <a:prstGeom prst="rect">
+            <a:avLst/>
+          </a:prstGeom>
+        </p:spPr>
+        <p:txBody>
+          <a:bodyPr wrap="none">
+            <a:spAutoFit/>
+          </a:bodyPr>
+          <a:lstStyle/>
+          <a:p>
+            <a:pPr algn="ctr"/>
+            <a:r>
+              <a:rPr lang="en-US" sz="1600" dirty="0" smtClean="0">
+                <a:solidFill>
+                  <a:srgbClr val="800000"/>
+                </a:solidFill>
+                <a:cs typeface="Symbol" charset="2"/>
+              </a:rPr>
+              <a:t>0</a:t>
+            </a:r>
+            <a:endParaRPr lang="en-US" sz="1600" baseline="-25000" dirty="0">
+              <a:latin typeface="Symbol" charset="2"/>
+              <a:cs typeface="Symbol" charset="2"/>
+            </a:endParaRPr>
+          </a:p>
+        </p:txBody>
+      </p:sp>
+      <p:sp>
+        <p:nvSpPr>
+          <p:cNvPr id="13" name="Rectangle 12"/>
+          <p:cNvSpPr/>
+          <p:nvPr/>
+        </p:nvSpPr>
+        <p:spPr>
+          <a:xfrm>
+            <a:off x="568308" y="95253"/>
+            <a:ext cx="288661" cy="338554"/>
+          </a:xfrm>
+          <a:prstGeom prst="rect">
+            <a:avLst/>
+          </a:prstGeom>
+        </p:spPr>
+        <p:txBody>
+          <a:bodyPr wrap="none">
+            <a:spAutoFit/>
+          </a:bodyPr>
+          <a:lstStyle/>
+          <a:p>
+            <a:pPr algn="ctr"/>
+            <a:r>
+              <a:rPr lang="en-US" sz="1600" dirty="0" smtClean="0">
+                <a:solidFill>
+                  <a:srgbClr val="800000"/>
+                </a:solidFill>
+                <a:cs typeface="Symbol" charset="2"/>
+              </a:rPr>
+              <a:t>2</a:t>
+            </a:r>
+            <a:endParaRPr lang="en-US" sz="1600" baseline="-25000" dirty="0">
+              <a:latin typeface="Symbol" charset="2"/>
+              <a:cs typeface="Symbol" charset="2"/>
+            </a:endParaRPr>
+          </a:p>
+        </p:txBody>
+      </p:sp>
+      <p:grpSp>
+        <p:nvGrpSpPr>
+          <p:cNvPr id="2" name="Group 1"/>
+          <p:cNvGrpSpPr/>
+          <p:nvPr/>
+        </p:nvGrpSpPr>
+        <p:grpSpPr>
+          <a:xfrm>
+            <a:off x="1109529" y="233018"/>
+            <a:ext cx="7489733" cy="5423298"/>
+            <a:chOff x="1109529" y="233018"/>
+            <a:chExt cx="7489733" cy="5423298"/>
+          </a:xfrm>
+        </p:grpSpPr>
+        <p:sp>
+          <p:nvSpPr>
+            <p:cNvPr id="3" name="Right Triangle 2"/>
+            <p:cNvSpPr/>
+            <p:nvPr/>
+          </p:nvSpPr>
+          <p:spPr>
+            <a:xfrm rot="5400000">
+              <a:off x="2142747" y="-800200"/>
+              <a:ext cx="5423298" cy="7489733"/>
+            </a:xfrm>
+            <a:prstGeom prst="rtTriangle">
+              <a:avLst/>
+            </a:prstGeom>
+            <a:noFill/>
+            <a:ln w="50800">
+              <a:solidFill>
+                <a:srgbClr val="6C0000"/>
+              </a:solidFill>
+            </a:ln>
+            <a:effectLst/>
+          </p:spPr>
+          <p:style>
+            <a:lnRef idx="1">
+              <a:schemeClr val="accent1"/>
+            </a:lnRef>
+            <a:fillRef idx="3">
+              <a:schemeClr val="accent1"/>
+            </a:fillRef>
+            <a:effectRef idx="2">
+              <a:schemeClr val="accent1"/>
+            </a:effectRef>
+            <a:fontRef idx="minor">
+              <a:schemeClr val="lt1"/>
+            </a:fontRef>
+          </p:style>
+          <p:txBody>
+            <a:bodyPr rot="0" spcFirstLastPara="0" vertOverflow="overflow" horzOverflow="overflow" vert="vert270" wrap="square" lIns="0" tIns="0" rIns="0" bIns="0" numCol="1" spcCol="0" rtlCol="0" fromWordArt="0" anchor="t" anchorCtr="0" forceAA="0" compatLnSpc="1">
+              <a:prstTxWarp prst="textNoShape">
+                <a:avLst/>
+              </a:prstTxWarp>
+              <a:noAutofit/>
+            </a:bodyPr>
+            <a:lstStyle/>
+            <a:p>
+              <a:endParaRPr lang="en-US" sz="2800" b="1" dirty="0">
+                <a:solidFill>
+                  <a:srgbClr val="6C0000"/>
+                </a:solidFill>
+              </a:endParaRPr>
+            </a:p>
+          </p:txBody>
+        </p:sp>
+        <p:sp>
+          <p:nvSpPr>
+            <p:cNvPr id="5" name="TextBox 4"/>
+            <p:cNvSpPr txBox="1"/>
+            <p:nvPr/>
+          </p:nvSpPr>
+          <p:spPr>
+            <a:xfrm>
+              <a:off x="1165212" y="287761"/>
+              <a:ext cx="3989293" cy="1384995"/>
+            </a:xfrm>
+            <a:prstGeom prst="rect">
+              <a:avLst/>
+            </a:prstGeom>
+            <a:noFill/>
+          </p:spPr>
+          <p:txBody>
+            <a:bodyPr wrap="none" rtlCol="0">
+              <a:spAutoFit/>
+            </a:bodyPr>
+            <a:lstStyle/>
+            <a:p>
+              <a:r>
+                <a:rPr lang="en-US" sz="2800" b="1" dirty="0">
+                  <a:solidFill>
+                    <a:srgbClr val="6C0000"/>
+                  </a:solidFill>
+                </a:rPr>
+                <a:t>Can’t determine if energy</a:t>
+              </a:r>
+            </a:p>
+            <a:p>
+              <a:r>
+                <a:rPr lang="en-US" sz="2800" b="1" dirty="0">
+                  <a:solidFill>
+                    <a:srgbClr val="6C0000"/>
+                  </a:solidFill>
+                </a:rPr>
+                <a:t>meaningfully contributes</a:t>
+              </a:r>
+            </a:p>
+            <a:p>
+              <a:r>
+                <a:rPr lang="en-US" sz="2800" b="1" dirty="0">
+                  <a:solidFill>
+                    <a:srgbClr val="6C0000"/>
+                  </a:solidFill>
+                </a:rPr>
+                <a:t>to model</a:t>
+              </a:r>
+              <a:endParaRPr lang="en-US" sz="2800" b="1" dirty="0">
+                <a:solidFill>
+                  <a:srgbClr val="6C0000"/>
+                </a:solidFill>
+              </a:endParaRPr>
+            </a:p>
+          </p:txBody>
+        </p:sp>
+      </p:grpSp>
+      <p:grpSp>
+        <p:nvGrpSpPr>
+          <p:cNvPr id="14" name="Group 13"/>
+          <p:cNvGrpSpPr/>
+          <p:nvPr/>
+        </p:nvGrpSpPr>
+        <p:grpSpPr>
+          <a:xfrm>
+            <a:off x="862262" y="4497518"/>
+            <a:ext cx="2283816" cy="1442049"/>
+            <a:chOff x="862262" y="4497518"/>
+            <a:chExt cx="2283816" cy="1442049"/>
+          </a:xfrm>
+        </p:grpSpPr>
+        <p:sp>
+          <p:nvSpPr>
+            <p:cNvPr id="7" name="Right Triangle 6"/>
+            <p:cNvSpPr/>
+            <p:nvPr/>
+          </p:nvSpPr>
+          <p:spPr>
+            <a:xfrm flipH="1">
+              <a:off x="1109528" y="4497518"/>
+              <a:ext cx="2036544" cy="1442049"/>
+            </a:xfrm>
+            <a:prstGeom prst="rtTriangle">
+              <a:avLst/>
+            </a:prstGeom>
+            <a:noFill/>
+            <a:ln w="50800">
+              <a:solidFill>
+                <a:srgbClr val="6C0000"/>
+              </a:solidFill>
+            </a:ln>
+            <a:effectLst/>
+          </p:spPr>
+          <p:style>
+            <a:lnRef idx="1">
+              <a:schemeClr val="accent1"/>
+            </a:lnRef>
+            <a:fillRef idx="3">
+              <a:schemeClr val="accent1"/>
+            </a:fillRef>
+            <a:effectRef idx="2">
+              <a:schemeClr val="accent1"/>
+            </a:effectRef>
+            <a:fontRef idx="minor">
+              <a:schemeClr val="lt1"/>
+            </a:fontRef>
+          </p:style>
+          <p:txBody>
+            <a:bodyPr rot="0" spcFirstLastPara="0" vertOverflow="overflow" horzOverflow="overflow" vert="vert270" wrap="square" lIns="0" tIns="0" rIns="0" bIns="0" numCol="1" spcCol="0" rtlCol="0" fromWordArt="0" anchor="t" anchorCtr="0" forceAA="0" compatLnSpc="1">
+              <a:prstTxWarp prst="textNoShape">
+                <a:avLst/>
+              </a:prstTxWarp>
+              <a:noAutofit/>
+            </a:bodyPr>
+            <a:lstStyle/>
+            <a:p>
+              <a:endParaRPr lang="en-US" sz="2800" b="1">
+                <a:solidFill>
+                  <a:srgbClr val="6C0000"/>
+                </a:solidFill>
+              </a:endParaRPr>
+            </a:p>
+          </p:txBody>
+        </p:sp>
+        <p:sp>
+          <p:nvSpPr>
+            <p:cNvPr id="17" name="TextBox 16"/>
+            <p:cNvSpPr txBox="1"/>
+            <p:nvPr/>
+          </p:nvSpPr>
+          <p:spPr>
+            <a:xfrm>
+              <a:off x="862262" y="4984655"/>
+              <a:ext cx="2283816" cy="954107"/>
+            </a:xfrm>
+            <a:prstGeom prst="rect">
+              <a:avLst/>
+            </a:prstGeom>
+            <a:noFill/>
+          </p:spPr>
+          <p:txBody>
+            <a:bodyPr wrap="square" rtlCol="0">
+              <a:spAutoFit/>
+            </a:bodyPr>
+            <a:lstStyle/>
+            <a:p>
+              <a:pPr algn="r"/>
+              <a:r>
+                <a:rPr lang="en-US" sz="1400" b="1" dirty="0" smtClean="0">
+                  <a:solidFill>
+                    <a:srgbClr val="6C0000"/>
+                  </a:solidFill>
+                </a:rPr>
+                <a:t>Energy </a:t>
+              </a:r>
+            </a:p>
+            <a:p>
+              <a:pPr algn="r"/>
+              <a:r>
+                <a:rPr lang="en-US" sz="1400" b="1" dirty="0" smtClean="0">
+                  <a:solidFill>
+                    <a:srgbClr val="6C0000"/>
+                  </a:solidFill>
+                </a:rPr>
+                <a:t>seemingly </a:t>
+              </a:r>
+            </a:p>
+            <a:p>
+              <a:pPr algn="r"/>
+              <a:r>
+                <a:rPr lang="en-US" sz="1400" b="1" dirty="0" smtClean="0">
+                  <a:solidFill>
+                    <a:srgbClr val="6C0000"/>
+                  </a:solidFill>
+                </a:rPr>
+                <a:t>unimportant </a:t>
+              </a:r>
+            </a:p>
+            <a:p>
+              <a:pPr algn="r"/>
+              <a:r>
+                <a:rPr lang="en-US" sz="1400" b="1" dirty="0" smtClean="0">
+                  <a:solidFill>
+                    <a:srgbClr val="6C0000"/>
+                  </a:solidFill>
+                </a:rPr>
+                <a:t>for economic growth</a:t>
+              </a:r>
+            </a:p>
+          </p:txBody>
+        </p:sp>
+      </p:grpSp>
+      <p:grpSp>
+        <p:nvGrpSpPr>
+          <p:cNvPr id="20" name="Group 19"/>
+          <p:cNvGrpSpPr/>
+          <p:nvPr/>
+        </p:nvGrpSpPr>
+        <p:grpSpPr>
+          <a:xfrm>
+            <a:off x="5045367" y="734006"/>
+            <a:ext cx="3600504" cy="5207943"/>
+            <a:chOff x="4987107" y="734006"/>
+            <a:chExt cx="3600504" cy="5207943"/>
+          </a:xfrm>
+        </p:grpSpPr>
+        <p:sp>
+          <p:nvSpPr>
+            <p:cNvPr id="10" name="Freeform 9"/>
+            <p:cNvSpPr/>
+            <p:nvPr/>
+          </p:nvSpPr>
+          <p:spPr>
+            <a:xfrm>
+              <a:off x="4987107" y="734006"/>
+              <a:ext cx="3600504" cy="5207943"/>
+            </a:xfrm>
+            <a:custGeom>
+              <a:avLst/>
+              <a:gdLst>
+                <a:gd name="connsiteX0" fmla="*/ 3612156 w 3612156"/>
+                <a:gd name="connsiteY0" fmla="*/ 0 h 4415684"/>
+                <a:gd name="connsiteX1" fmla="*/ 3565548 w 3612156"/>
+                <a:gd name="connsiteY1" fmla="*/ 4415684 h 4415684"/>
+                <a:gd name="connsiteX2" fmla="*/ 0 w 3612156"/>
+                <a:gd name="connsiteY2" fmla="*/ 4415684 h 4415684"/>
+                <a:gd name="connsiteX3" fmla="*/ 0 w 3612156"/>
+                <a:gd name="connsiteY3" fmla="*/ 2807863 h 4415684"/>
+                <a:gd name="connsiteX4" fmla="*/ 3612156 w 3612156"/>
+                <a:gd name="connsiteY4" fmla="*/ 0 h 4415684"/>
+                <a:gd name="connsiteX0" fmla="*/ 3612156 w 3612156"/>
+                <a:gd name="connsiteY0" fmla="*/ 0 h 4415684"/>
+                <a:gd name="connsiteX1" fmla="*/ 3565548 w 3612156"/>
+                <a:gd name="connsiteY1" fmla="*/ 4415684 h 4415684"/>
+                <a:gd name="connsiteX2" fmla="*/ 0 w 3612156"/>
+                <a:gd name="connsiteY2" fmla="*/ 4415684 h 4415684"/>
+                <a:gd name="connsiteX3" fmla="*/ 0 w 3612156"/>
+                <a:gd name="connsiteY3" fmla="*/ 2278381 h 4415684"/>
+                <a:gd name="connsiteX4" fmla="*/ 3612156 w 3612156"/>
+                <a:gd name="connsiteY4" fmla="*/ 0 h 4415684"/>
+                <a:gd name="connsiteX0" fmla="*/ 3600504 w 3600504"/>
+                <a:gd name="connsiteY0" fmla="*/ 0 h 4465635"/>
+                <a:gd name="connsiteX1" fmla="*/ 3565548 w 3600504"/>
+                <a:gd name="connsiteY1" fmla="*/ 4465635 h 4465635"/>
+                <a:gd name="connsiteX2" fmla="*/ 0 w 3600504"/>
+                <a:gd name="connsiteY2" fmla="*/ 4465635 h 4465635"/>
+                <a:gd name="connsiteX3" fmla="*/ 0 w 3600504"/>
+                <a:gd name="connsiteY3" fmla="*/ 2328332 h 4465635"/>
+                <a:gd name="connsiteX4" fmla="*/ 3600504 w 3600504"/>
+                <a:gd name="connsiteY4" fmla="*/ 0 h 4465635"/>
+              </a:gdLst>
+              <a:ahLst/>
+              <a:cxnLst>
+                <a:cxn ang="0">
+                  <a:pos x="connsiteX0" y="connsiteY0"/>
+                </a:cxn>
+                <a:cxn ang="0">
+                  <a:pos x="connsiteX1" y="connsiteY1"/>
+                </a:cxn>
+                <a:cxn ang="0">
+                  <a:pos x="connsiteX2" y="connsiteY2"/>
+                </a:cxn>
+                <a:cxn ang="0">
+                  <a:pos x="connsiteX3" y="connsiteY3"/>
+                </a:cxn>
+                <a:cxn ang="0">
+                  <a:pos x="connsiteX4" y="connsiteY4"/>
+                </a:cxn>
+              </a:cxnLst>
+              <a:rect l="l" t="t" r="r" b="b"/>
+              <a:pathLst>
+                <a:path w="3600504" h="4465635">
+                  <a:moveTo>
+                    <a:pt x="3600504" y="0"/>
+                  </a:moveTo>
+                  <a:lnTo>
+                    <a:pt x="3565548" y="4465635"/>
+                  </a:lnTo>
+                  <a:lnTo>
+                    <a:pt x="0" y="4465635"/>
+                  </a:lnTo>
+                  <a:lnTo>
+                    <a:pt x="0" y="2328332"/>
+                  </a:lnTo>
+                  <a:lnTo>
+                    <a:pt x="3600504" y="0"/>
+                  </a:lnTo>
+                  <a:close/>
+                </a:path>
+              </a:pathLst>
+            </a:custGeom>
+            <a:noFill/>
+            <a:ln w="50800">
+              <a:solidFill>
+                <a:srgbClr val="6C0000"/>
+              </a:solidFill>
+            </a:ln>
+            <a:effectLst/>
+          </p:spPr>
+          <p:style>
+            <a:lnRef idx="1">
+              <a:schemeClr val="accent1"/>
+            </a:lnRef>
+            <a:fillRef idx="3">
+              <a:schemeClr val="accent1"/>
+            </a:fillRef>
+            <a:effectRef idx="2">
+              <a:schemeClr val="accent1"/>
+            </a:effectRef>
+            <a:fontRef idx="minor">
+              <a:schemeClr val="lt1"/>
+            </a:fontRef>
+          </p:style>
+          <p:txBody>
+            <a:bodyPr rot="0" spcFirstLastPara="0" vertOverflow="overflow" horzOverflow="overflow" vert="vert270" wrap="square" lIns="0" tIns="0" rIns="0" bIns="0" numCol="1" spcCol="0" rtlCol="0" fromWordArt="0" anchor="t" anchorCtr="0" forceAA="0" compatLnSpc="1">
+              <a:prstTxWarp prst="textNoShape">
+                <a:avLst/>
+              </a:prstTxWarp>
+              <a:noAutofit/>
+            </a:bodyPr>
+            <a:lstStyle/>
+            <a:p>
+              <a:endParaRPr lang="en-US" sz="2800" b="1">
+                <a:solidFill>
+                  <a:srgbClr val="6C0000"/>
+                </a:solidFill>
+              </a:endParaRPr>
+            </a:p>
+          </p:txBody>
+        </p:sp>
+        <p:sp>
+          <p:nvSpPr>
+            <p:cNvPr id="24" name="TextBox 23"/>
+            <p:cNvSpPr txBox="1"/>
+            <p:nvPr/>
+          </p:nvSpPr>
+          <p:spPr>
+            <a:xfrm>
+              <a:off x="5767799" y="3979169"/>
+              <a:ext cx="2633488" cy="1815882"/>
+            </a:xfrm>
+            <a:prstGeom prst="rect">
+              <a:avLst/>
+            </a:prstGeom>
+            <a:noFill/>
+          </p:spPr>
+          <p:txBody>
+            <a:bodyPr wrap="square" rtlCol="0">
+              <a:spAutoFit/>
+            </a:bodyPr>
+            <a:lstStyle/>
+            <a:p>
+              <a:pPr algn="r"/>
+              <a:r>
+                <a:rPr lang="en-US" sz="2800" b="1" dirty="0" smtClean="0">
+                  <a:solidFill>
+                    <a:srgbClr val="6C0000"/>
+                  </a:solidFill>
+                </a:rPr>
+                <a:t>Energy</a:t>
+              </a:r>
+            </a:p>
+            <a:p>
+              <a:pPr algn="r"/>
+              <a:r>
+                <a:rPr lang="en-US" sz="2800" b="1" dirty="0" smtClean="0">
+                  <a:solidFill>
+                    <a:srgbClr val="6C0000"/>
+                  </a:solidFill>
+                </a:rPr>
+                <a:t>significant</a:t>
+              </a:r>
+            </a:p>
+            <a:p>
+              <a:pPr algn="r"/>
+              <a:r>
+                <a:rPr lang="en-US" sz="2800" b="1" dirty="0">
+                  <a:solidFill>
+                    <a:srgbClr val="6C0000"/>
+                  </a:solidFill>
+                </a:rPr>
+                <a:t>f</a:t>
+              </a:r>
+              <a:r>
+                <a:rPr lang="en-US" sz="2800" b="1" dirty="0" smtClean="0">
+                  <a:solidFill>
+                    <a:srgbClr val="6C0000"/>
+                  </a:solidFill>
+                </a:rPr>
+                <a:t>or economic</a:t>
+              </a:r>
+            </a:p>
+            <a:p>
+              <a:pPr algn="r"/>
+              <a:r>
+                <a:rPr lang="en-US" sz="2800" b="1" dirty="0" smtClean="0">
+                  <a:solidFill>
+                    <a:srgbClr val="6C0000"/>
+                  </a:solidFill>
+                </a:rPr>
+                <a:t>growth</a:t>
+              </a:r>
+              <a:endParaRPr lang="en-US" sz="2800" b="1" dirty="0">
+                <a:solidFill>
+                  <a:srgbClr val="6C0000"/>
+                </a:solidFill>
+              </a:endParaRPr>
+            </a:p>
+          </p:txBody>
+        </p:sp>
+      </p:grpSp>
     </p:spTree>
     <p:extLst>
       <p:ext uri="{BB962C8B-B14F-4D97-AF65-F5344CB8AC3E}">
-        <p14:creationId xmlns:p14="http://schemas.microsoft.com/office/powerpoint/2010/main" val="1036050530"/>
+        <p14:creationId xmlns:p14="http://schemas.microsoft.com/office/powerpoint/2010/main" val="13516895"/>
       </p:ext>
     </p:extLst>
   </p:cSld>
@@ -5272,7 +5769,15 @@
                   <a:srgbClr val="800000"/>
                 </a:solidFill>
               </a:rPr>
-              <a:t>Spli</a:t>
+              <a:t>Split between </a:t>
+            </a:r>
+            <a:r>
+              <a:rPr lang="en-US" sz="2800" b="1" i="1" dirty="0" smtClean="0">
+                <a:solidFill>
+                  <a:srgbClr val="800000"/>
+                </a:solidFill>
+              </a:rPr>
+              <a:t>kl</a:t>
             </a:r>
             <a:r>
               <a:rPr lang="en-US" sz="2800" b="1" dirty="0" smtClean="0">
@@ -5280,7 +5785,7 @@
                   <a:srgbClr val="800000"/>
                 </a:solidFill>
               </a:rPr>
-              <a:t>t between </a:t>
+              <a:t> and </a:t>
             </a:r>
             <a:r>
               <a:rPr lang="en-US" sz="2800" b="1" i="1" dirty="0" smtClean="0">
@@ -5288,7 +5793,7 @@
                   <a:srgbClr val="800000"/>
                 </a:solidFill>
               </a:rPr>
-              <a:t>kl</a:t>
+              <a:t>e</a:t>
             </a:r>
             <a:r>
               <a:rPr lang="en-US" sz="2800" b="1" dirty="0" smtClean="0">
@@ -5296,58 +5801,18 @@
                   <a:srgbClr val="800000"/>
                 </a:solidFill>
               </a:rPr>
-              <a:t> and </a:t>
-            </a:r>
-            <a:r>
-              <a:rPr lang="en-US" sz="2800" b="1" i="1" dirty="0" smtClean="0">
-                <a:solidFill>
-                  <a:srgbClr val="800000"/>
-                </a:solidFill>
-              </a:rPr>
-              <a:t>e</a:t>
-            </a:r>
+              <a:t> does not meaningfully</a:t>
+            </a:r>
+          </a:p>
+          <a:p>
+            <a:pPr algn="ctr"/>
             <a:r>
               <a:rPr lang="en-US" sz="2800" b="1" dirty="0" smtClean="0">
                 <a:solidFill>
                   <a:srgbClr val="800000"/>
                 </a:solidFill>
               </a:rPr>
-              <a:t> </a:t>
-            </a:r>
-            <a:r>
-              <a:rPr lang="en-US" sz="2800" b="1" dirty="0" smtClean="0">
-                <a:solidFill>
-                  <a:srgbClr val="800000"/>
-                </a:solidFill>
-              </a:rPr>
-              <a:t>does not meaningfully</a:t>
-            </a:r>
-          </a:p>
-          <a:p>
-            <a:pPr algn="ctr"/>
-            <a:r>
-              <a:rPr lang="en-US" sz="2800" b="1" dirty="0" smtClean="0">
-                <a:solidFill>
-                  <a:srgbClr val="800000"/>
-                </a:solidFill>
-              </a:rPr>
-              <a:t>contribute </a:t>
-            </a:r>
-            <a:r>
-              <a:rPr lang="en-US" sz="2800" b="1" dirty="0" smtClean="0">
-                <a:solidFill>
-                  <a:srgbClr val="800000"/>
-                </a:solidFill>
-              </a:rPr>
-              <a:t>to</a:t>
-            </a:r>
-            <a:r>
-              <a:rPr lang="en-US" sz="2800" b="1" dirty="0" smtClean="0">
-                <a:solidFill>
-                  <a:srgbClr val="800000"/>
-                </a:solidFill>
-              </a:rPr>
-              <a:t> “goodness” of fit.</a:t>
+              <a:t>contribute to “goodness” of fit.</a:t>
             </a:r>
             <a:br>
               <a:rPr lang="en-US" sz="2800" b="1" dirty="0" smtClean="0">
@@ -5684,7 +6149,15 @@
                   <a:srgbClr val="800000"/>
                 </a:solidFill>
               </a:rPr>
-              <a:t>Spli</a:t>
+              <a:t>Split between </a:t>
+            </a:r>
+            <a:r>
+              <a:rPr lang="en-US" sz="2800" b="1" i="1" dirty="0" smtClean="0">
+                <a:solidFill>
+                  <a:srgbClr val="800000"/>
+                </a:solidFill>
+              </a:rPr>
+              <a:t>kl</a:t>
             </a:r>
             <a:r>
               <a:rPr lang="en-US" sz="2800" b="1" dirty="0" smtClean="0">
@@ -5692,7 +6165,7 @@
                   <a:srgbClr val="800000"/>
                 </a:solidFill>
               </a:rPr>
-              <a:t>t between </a:t>
+              <a:t> and </a:t>
             </a:r>
             <a:r>
               <a:rPr lang="en-US" sz="2800" b="1" i="1" dirty="0" smtClean="0">
@@ -5700,7 +6173,7 @@
                   <a:srgbClr val="800000"/>
                 </a:solidFill>
               </a:rPr>
-              <a:t>kl</a:t>
+              <a:t>e</a:t>
             </a:r>
             <a:r>
               <a:rPr lang="en-US" sz="2800" b="1" dirty="0" smtClean="0">
@@ -5708,58 +6181,18 @@
                   <a:srgbClr val="800000"/>
                 </a:solidFill>
               </a:rPr>
-              <a:t> and </a:t>
-            </a:r>
-            <a:r>
-              <a:rPr lang="en-US" sz="2800" b="1" i="1" dirty="0" smtClean="0">
-                <a:solidFill>
-                  <a:srgbClr val="800000"/>
-                </a:solidFill>
-              </a:rPr>
-              <a:t>e</a:t>
-            </a:r>
+              <a:t> does not meaningfully</a:t>
+            </a:r>
+          </a:p>
+          <a:p>
+            <a:pPr algn="ctr"/>
             <a:r>
               <a:rPr lang="en-US" sz="2800" b="1" dirty="0" smtClean="0">
                 <a:solidFill>
                   <a:srgbClr val="800000"/>
                 </a:solidFill>
               </a:rPr>
-              <a:t> </a:t>
-            </a:r>
-            <a:r>
-              <a:rPr lang="en-US" sz="2800" b="1" dirty="0" smtClean="0">
-                <a:solidFill>
-                  <a:srgbClr val="800000"/>
-                </a:solidFill>
-              </a:rPr>
-              <a:t>does not meaningfully</a:t>
-            </a:r>
-          </a:p>
-          <a:p>
-            <a:pPr algn="ctr"/>
-            <a:r>
-              <a:rPr lang="en-US" sz="2800" b="1" dirty="0" smtClean="0">
-                <a:solidFill>
-                  <a:srgbClr val="800000"/>
-                </a:solidFill>
-              </a:rPr>
-              <a:t>contribute </a:t>
-            </a:r>
-            <a:r>
-              <a:rPr lang="en-US" sz="2800" b="1" dirty="0" smtClean="0">
-                <a:solidFill>
-                  <a:srgbClr val="800000"/>
-                </a:solidFill>
-              </a:rPr>
-              <a:t>to</a:t>
-            </a:r>
-            <a:r>
-              <a:rPr lang="en-US" sz="2800" b="1" dirty="0" smtClean="0">
-                <a:solidFill>
-                  <a:srgbClr val="800000"/>
-                </a:solidFill>
-              </a:rPr>
-              <a:t> “goodness” of fit.</a:t>
+              <a:t>contribute to “goodness” of fit.</a:t>
             </a:r>
             <a:br>
               <a:rPr lang="en-US" sz="2800" b="1" dirty="0" smtClean="0">
@@ -6185,7 +6618,15 @@
                   <a:srgbClr val="800000"/>
                 </a:solidFill>
               </a:rPr>
-              <a:t>Spli</a:t>
+              <a:t>Split between </a:t>
+            </a:r>
+            <a:r>
+              <a:rPr lang="en-US" sz="2800" b="1" i="1" dirty="0" smtClean="0">
+                <a:solidFill>
+                  <a:srgbClr val="800000"/>
+                </a:solidFill>
+              </a:rPr>
+              <a:t>kl</a:t>
             </a:r>
             <a:r>
               <a:rPr lang="en-US" sz="2800" b="1" dirty="0" smtClean="0">
@@ -6193,7 +6634,7 @@
                   <a:srgbClr val="800000"/>
                 </a:solidFill>
               </a:rPr>
-              <a:t>t between </a:t>
+              <a:t> and </a:t>
             </a:r>
             <a:r>
               <a:rPr lang="en-US" sz="2800" b="1" i="1" dirty="0" smtClean="0">
@@ -6201,7 +6642,7 @@
                   <a:srgbClr val="800000"/>
                 </a:solidFill>
               </a:rPr>
-              <a:t>kl</a:t>
+              <a:t>e</a:t>
             </a:r>
             <a:r>
               <a:rPr lang="en-US" sz="2800" b="1" dirty="0" smtClean="0">
@@ -6209,58 +6650,18 @@
                   <a:srgbClr val="800000"/>
                 </a:solidFill>
               </a:rPr>
-              <a:t> and </a:t>
-            </a:r>
-            <a:r>
-              <a:rPr lang="en-US" sz="2800" b="1" i="1" dirty="0" smtClean="0">
-                <a:solidFill>
-                  <a:srgbClr val="800000"/>
-                </a:solidFill>
-              </a:rPr>
-              <a:t>e</a:t>
-            </a:r>
+              <a:t> does not meaningfully</a:t>
+            </a:r>
+          </a:p>
+          <a:p>
+            <a:pPr algn="ctr"/>
             <a:r>
               <a:rPr lang="en-US" sz="2800" b="1" dirty="0" smtClean="0">
                 <a:solidFill>
                   <a:srgbClr val="800000"/>
                 </a:solidFill>
               </a:rPr>
-              <a:t> </a:t>
-            </a:r>
-            <a:r>
-              <a:rPr lang="en-US" sz="2800" b="1" dirty="0" smtClean="0">
-                <a:solidFill>
-                  <a:srgbClr val="800000"/>
-                </a:solidFill>
-              </a:rPr>
-              <a:t>does not meaningfully</a:t>
-            </a:r>
-          </a:p>
-          <a:p>
-            <a:pPr algn="ctr"/>
-            <a:r>
-              <a:rPr lang="en-US" sz="2800" b="1" dirty="0" smtClean="0">
-                <a:solidFill>
-                  <a:srgbClr val="800000"/>
-                </a:solidFill>
-              </a:rPr>
-              <a:t>contribute </a:t>
-            </a:r>
-            <a:r>
-              <a:rPr lang="en-US" sz="2800" b="1" dirty="0" smtClean="0">
-                <a:solidFill>
-                  <a:srgbClr val="800000"/>
-                </a:solidFill>
-              </a:rPr>
-              <a:t>to</a:t>
-            </a:r>
-            <a:r>
-              <a:rPr lang="en-US" sz="2800" b="1" dirty="0" smtClean="0">
-                <a:solidFill>
-                  <a:srgbClr val="800000"/>
-                </a:solidFill>
-              </a:rPr>
-              <a:t> “goodness” of fit.</a:t>
+              <a:t>contribute to “goodness” of fit.</a:t>
             </a:r>
             <a:br>
               <a:rPr lang="en-US" sz="2800" b="1" dirty="0" smtClean="0">
@@ -7051,23 +7452,7 @@
                   <a:srgbClr val="800000"/>
                 </a:solidFill>
               </a:rPr>
-              <a:t>contribute </a:t>
-            </a:r>
-            <a:r>
-              <a:rPr lang="en-US" sz="2800" b="1" dirty="0" smtClean="0">
-                <a:solidFill>
-                  <a:srgbClr val="800000"/>
-                </a:solidFill>
-              </a:rPr>
-              <a:t>to</a:t>
-            </a:r>
-            <a:r>
-              <a:rPr lang="en-US" sz="2800" b="1" dirty="0" smtClean="0">
-                <a:solidFill>
-                  <a:srgbClr val="800000"/>
-                </a:solidFill>
-              </a:rPr>
-              <a:t> “goodness” of fit.</a:t>
+              <a:t>contribute to “goodness” of fit.</a:t>
             </a:r>
             <a:br>
               <a:rPr lang="en-US" sz="2800" b="1" dirty="0" smtClean="0">
@@ -7447,23 +7832,7 @@
                   <a:srgbClr val="800000"/>
                 </a:solidFill>
               </a:rPr>
-              <a:t>contribute </a:t>
-            </a:r>
-            <a:r>
-              <a:rPr lang="en-US" sz="2800" b="1" dirty="0" smtClean="0">
-                <a:solidFill>
-                  <a:srgbClr val="800000"/>
-                </a:solidFill>
-              </a:rPr>
-              <a:t>to</a:t>
-            </a:r>
-            <a:r>
-              <a:rPr lang="en-US" sz="2800" b="1" dirty="0" smtClean="0">
-                <a:solidFill>
-                  <a:srgbClr val="800000"/>
-                </a:solidFill>
-              </a:rPr>
-              <a:t> “goodness” of fit.</a:t>
+              <a:t>contribute to “goodness” of fit.</a:t>
             </a:r>
             <a:br>
               <a:rPr lang="en-US" sz="2800" b="1" dirty="0" smtClean="0">
@@ -7932,23 +8301,7 @@
                   <a:srgbClr val="800000"/>
                 </a:solidFill>
               </a:rPr>
-              <a:t>contribute </a:t>
-            </a:r>
-            <a:r>
-              <a:rPr lang="en-US" sz="2800" b="1" dirty="0" smtClean="0">
-                <a:solidFill>
-                  <a:srgbClr val="800000"/>
-                </a:solidFill>
-              </a:rPr>
-              <a:t>to</a:t>
-            </a:r>
-            <a:r>
-              <a:rPr lang="en-US" sz="2800" b="1" dirty="0" smtClean="0">
-                <a:solidFill>
-                  <a:srgbClr val="800000"/>
-                </a:solidFill>
-              </a:rPr>
-              <a:t> “goodness” of fit.</a:t>
+              <a:t>contribute to “goodness” of fit.</a:t>
             </a:r>
             <a:br>
               <a:rPr lang="en-US" sz="2800" b="1" dirty="0" smtClean="0">
@@ -8498,9 +8851,9 @@
           <p:nvPr/>
         </p:nvSpPr>
         <p:spPr>
-          <a:xfrm>
-            <a:off x="158755" y="95253"/>
-            <a:ext cx="835143" cy="707886"/>
+          <a:xfrm rot="16200000">
+            <a:off x="-964227" y="2754497"/>
+            <a:ext cx="2778158" cy="707886"/>
           </a:xfrm>
           <a:prstGeom prst="rect">
             <a:avLst/>
@@ -8512,6 +8865,16 @@
           </a:bodyPr>
           <a:lstStyle/>
           <a:p>
+            <a:pPr algn="ctr"/>
+            <a:r>
+              <a:rPr lang="en-US" sz="4000" b="1" dirty="0" smtClean="0">
+                <a:solidFill>
+                  <a:srgbClr val="800000"/>
+                </a:solidFill>
+                <a:cs typeface="Symbol" charset="2"/>
+              </a:rPr>
+              <a:t>Width of </a:t>
+            </a:r>
             <a:r>
               <a:rPr lang="en-US" sz="4000" b="1" i="1" dirty="0" err="1" smtClean="0">
                 <a:solidFill>
@@ -8651,10 +9014,86 @@
           </a:p>
         </p:txBody>
       </p:sp>
+      <p:sp>
+        <p:nvSpPr>
+          <p:cNvPr id="12" name="Rectangle 11"/>
+          <p:cNvSpPr/>
+          <p:nvPr/>
+        </p:nvSpPr>
+        <p:spPr>
+          <a:xfrm>
+            <a:off x="561442" y="5885558"/>
+            <a:ext cx="302394" cy="338554"/>
+          </a:xfrm>
+          <a:prstGeom prst="rect">
+            <a:avLst/>
+          </a:prstGeom>
+        </p:spPr>
+        <p:txBody>
+          <a:bodyPr wrap="none">
+            <a:spAutoFit/>
+          </a:bodyPr>
+          <a:lstStyle/>
+          <a:p>
+            <a:pPr algn="ctr"/>
+            <a:r>
+              <a:rPr lang="en-US" sz="1600" dirty="0" smtClean="0">
+                <a:solidFill>
+                  <a:srgbClr val="800000"/>
+                </a:solidFill>
+                <a:cs typeface="Symbol" charset="2"/>
+              </a:rPr>
+              <a:t>0</a:t>
+            </a:r>
+            <a:endParaRPr lang="en-US" sz="1600" baseline="-25000" dirty="0">
+              <a:latin typeface="Symbol" charset="2"/>
+              <a:cs typeface="Symbol" charset="2"/>
+            </a:endParaRPr>
+          </a:p>
+        </p:txBody>
+      </p:sp>
+      <p:sp>
+        <p:nvSpPr>
+          <p:cNvPr id="13" name="Rectangle 12"/>
+          <p:cNvSpPr/>
+          <p:nvPr/>
+        </p:nvSpPr>
+        <p:spPr>
+          <a:xfrm>
+            <a:off x="568308" y="95253"/>
+            <a:ext cx="288661" cy="338554"/>
+          </a:xfrm>
+          <a:prstGeom prst="rect">
+            <a:avLst/>
+          </a:prstGeom>
+        </p:spPr>
+        <p:txBody>
+          <a:bodyPr wrap="none">
+            <a:spAutoFit/>
+          </a:bodyPr>
+          <a:lstStyle/>
+          <a:p>
+            <a:pPr algn="ctr"/>
+            <a:r>
+              <a:rPr lang="en-US" sz="1600" dirty="0" smtClean="0">
+                <a:solidFill>
+                  <a:srgbClr val="800000"/>
+                </a:solidFill>
+                <a:cs typeface="Symbol" charset="2"/>
+              </a:rPr>
+              <a:t>2</a:t>
+            </a:r>
+            <a:endParaRPr lang="en-US" sz="1600" baseline="-25000" dirty="0">
+              <a:latin typeface="Symbol" charset="2"/>
+              <a:cs typeface="Symbol" charset="2"/>
+            </a:endParaRPr>
+          </a:p>
+        </p:txBody>
+      </p:sp>
     </p:spTree>
     <p:extLst>
       <p:ext uri="{BB962C8B-B14F-4D97-AF65-F5344CB8AC3E}">
-        <p14:creationId xmlns:p14="http://schemas.microsoft.com/office/powerpoint/2010/main" val="1484179718"/>
+        <p14:creationId xmlns:p14="http://schemas.microsoft.com/office/powerpoint/2010/main" val="1275597822"/>
       </p:ext>
     </p:extLst>
   </p:cSld>

</xml_diff>

<commit_message>
Added a 2-questions slide after the CD model in the presentation. Also trying (unsuccessfully) to add a point to the 3-D SF graph.
</commit_message>
<xml_diff>
--- a/figure_other/Seminar Figures.pptx
+++ b/figure_other/Seminar Figures.pptx
@@ -5,14 +5,13 @@
     <p:sldMasterId id="2147483648" r:id="rId1"/>
   </p:sldMasterIdLst>
   <p:sldIdLst>
-    <p:sldId id="269" r:id="rId2"/>
-    <p:sldId id="270" r:id="rId3"/>
-    <p:sldId id="271" r:id="rId4"/>
-    <p:sldId id="272" r:id="rId5"/>
-    <p:sldId id="279" r:id="rId6"/>
-    <p:sldId id="281" r:id="rId7"/>
-    <p:sldId id="280" r:id="rId8"/>
-    <p:sldId id="256" r:id="rId9"/>
+    <p:sldId id="280" r:id="rId2"/>
+    <p:sldId id="282" r:id="rId3"/>
+    <p:sldId id="283" r:id="rId4"/>
+    <p:sldId id="284" r:id="rId5"/>
+    <p:sldId id="281" r:id="rId6"/>
+    <p:sldId id="279" r:id="rId7"/>
+    <p:sldId id="256" r:id="rId8"/>
   </p:sldIdLst>
   <p:sldSz cx="9144000" cy="6858000" type="screen4x3"/>
   <p:notesSz cx="6858000" cy="9144000"/>
@@ -3148,7 +3147,7 @@
         <p:spPr>
           <a:xfrm>
             <a:off x="4909979" y="6077515"/>
-            <a:ext cx="622236" cy="707886"/>
+            <a:ext cx="523801" cy="707886"/>
           </a:xfrm>
           <a:prstGeom prst="rect">
             <a:avLst/>
@@ -3168,7 +3167,7 @@
                 <a:latin typeface="Symbol" charset="2"/>
                 <a:cs typeface="Symbol" charset="2"/>
               </a:rPr>
-              <a:t>s</a:t>
+              <a:t>g</a:t>
             </a:r>
             <a:endParaRPr lang="en-US" sz="4000" b="1" i="1" dirty="0">
               <a:latin typeface="Symbol" charset="2"/>
@@ -3184,9 +3183,9 @@
           <p:nvPr/>
         </p:nvSpPr>
         <p:spPr>
-          <a:xfrm>
-            <a:off x="158755" y="95253"/>
-            <a:ext cx="900766" cy="707886"/>
+          <a:xfrm rot="16200000">
+            <a:off x="-964227" y="2754497"/>
+            <a:ext cx="2778158" cy="707886"/>
           </a:xfrm>
           <a:prstGeom prst="rect">
             <a:avLst/>
@@ -3198,8 +3197,18 @@
           </a:bodyPr>
           <a:lstStyle/>
           <a:p>
-            <a:r>
-              <a:rPr lang="en-US" sz="4000" b="1" i="1" dirty="0" smtClean="0">
+            <a:pPr algn="ctr"/>
+            <a:r>
+              <a:rPr lang="en-US" sz="4000" b="1" dirty="0" smtClean="0">
+                <a:solidFill>
+                  <a:srgbClr val="800000"/>
+                </a:solidFill>
+                <a:cs typeface="Symbol" charset="2"/>
+              </a:rPr>
+              <a:t>Width of </a:t>
+            </a:r>
+            <a:r>
+              <a:rPr lang="en-US" sz="4000" b="1" i="1" dirty="0" err="1" smtClean="0">
                 <a:solidFill>
                   <a:srgbClr val="800000"/>
                 </a:solidFill>
@@ -3208,14 +3217,14 @@
               <a:t>CI</a:t>
             </a:r>
             <a:r>
-              <a:rPr lang="en-US" sz="4000" b="1" i="1" baseline="-25000" dirty="0" smtClean="0">
+              <a:rPr lang="en-US" sz="4000" b="1" i="1" baseline="-25000" dirty="0" err="1" smtClean="0">
                 <a:solidFill>
                   <a:srgbClr val="800000"/>
                 </a:solidFill>
                 <a:latin typeface="Symbol" charset="2"/>
                 <a:cs typeface="Symbol" charset="2"/>
               </a:rPr>
-              <a:t>s</a:t>
+              <a:t>g</a:t>
             </a:r>
             <a:endParaRPr lang="en-US" sz="4000" b="1" i="1" baseline="-25000" dirty="0">
               <a:latin typeface="Symbol" charset="2"/>
@@ -3337,10 +3346,86 @@
           </a:p>
         </p:txBody>
       </p:sp>
+      <p:sp>
+        <p:nvSpPr>
+          <p:cNvPr id="12" name="Rectangle 11"/>
+          <p:cNvSpPr/>
+          <p:nvPr/>
+        </p:nvSpPr>
+        <p:spPr>
+          <a:xfrm rot="16200000">
+            <a:off x="561442" y="5738138"/>
+            <a:ext cx="302394" cy="338554"/>
+          </a:xfrm>
+          <a:prstGeom prst="rect">
+            <a:avLst/>
+          </a:prstGeom>
+        </p:spPr>
+        <p:txBody>
+          <a:bodyPr wrap="none">
+            <a:spAutoFit/>
+          </a:bodyPr>
+          <a:lstStyle/>
+          <a:p>
+            <a:pPr algn="ctr"/>
+            <a:r>
+              <a:rPr lang="en-US" sz="1600" dirty="0" smtClean="0">
+                <a:solidFill>
+                  <a:srgbClr val="800000"/>
+                </a:solidFill>
+                <a:cs typeface="Symbol" charset="2"/>
+              </a:rPr>
+              <a:t>0</a:t>
+            </a:r>
+            <a:endParaRPr lang="en-US" sz="1600" baseline="-25000" dirty="0">
+              <a:latin typeface="Symbol" charset="2"/>
+              <a:cs typeface="Symbol" charset="2"/>
+            </a:endParaRPr>
+          </a:p>
+        </p:txBody>
+      </p:sp>
+      <p:sp>
+        <p:nvSpPr>
+          <p:cNvPr id="13" name="Rectangle 12"/>
+          <p:cNvSpPr/>
+          <p:nvPr/>
+        </p:nvSpPr>
+        <p:spPr>
+          <a:xfrm rot="16200000">
+            <a:off x="568308" y="72573"/>
+            <a:ext cx="288661" cy="338554"/>
+          </a:xfrm>
+          <a:prstGeom prst="rect">
+            <a:avLst/>
+          </a:prstGeom>
+        </p:spPr>
+        <p:txBody>
+          <a:bodyPr wrap="none">
+            <a:spAutoFit/>
+          </a:bodyPr>
+          <a:lstStyle/>
+          <a:p>
+            <a:pPr algn="ctr"/>
+            <a:r>
+              <a:rPr lang="en-US" sz="1600" dirty="0" smtClean="0">
+                <a:solidFill>
+                  <a:srgbClr val="800000"/>
+                </a:solidFill>
+                <a:cs typeface="Symbol" charset="2"/>
+              </a:rPr>
+              <a:t>2</a:t>
+            </a:r>
+            <a:endParaRPr lang="en-US" sz="1600" baseline="-25000" dirty="0">
+              <a:latin typeface="Symbol" charset="2"/>
+              <a:cs typeface="Symbol" charset="2"/>
+            </a:endParaRPr>
+          </a:p>
+        </p:txBody>
+      </p:sp>
     </p:spTree>
     <p:extLst>
       <p:ext uri="{BB962C8B-B14F-4D97-AF65-F5344CB8AC3E}">
-        <p14:creationId xmlns:p14="http://schemas.microsoft.com/office/powerpoint/2010/main" val="3346210417"/>
+        <p14:creationId xmlns:p14="http://schemas.microsoft.com/office/powerpoint/2010/main" val="4234590376"/>
       </p:ext>
     </p:extLst>
   </p:cSld>
@@ -3367,121 +3452,6 @@
           <a:chExt cx="0" cy="0"/>
         </a:xfrm>
       </p:grpSpPr>
-      <p:sp>
-        <p:nvSpPr>
-          <p:cNvPr id="4" name="Rounded Rectangle 3"/>
-          <p:cNvSpPr/>
-          <p:nvPr/>
-        </p:nvSpPr>
-        <p:spPr>
-          <a:xfrm>
-            <a:off x="1210882" y="378727"/>
-            <a:ext cx="7506457" cy="2375770"/>
-          </a:xfrm>
-          <a:prstGeom prst="roundRect">
-            <a:avLst/>
-          </a:prstGeom>
-          <a:noFill/>
-          <a:ln w="50800">
-            <a:solidFill>
-              <a:srgbClr val="800000"/>
-            </a:solidFill>
-          </a:ln>
-          <a:effectLst/>
-        </p:spPr>
-        <p:style>
-          <a:lnRef idx="1">
-            <a:schemeClr val="accent1"/>
-          </a:lnRef>
-          <a:fillRef idx="3">
-            <a:schemeClr val="accent1"/>
-          </a:fillRef>
-          <a:effectRef idx="2">
-            <a:schemeClr val="accent1"/>
-          </a:effectRef>
-          <a:fontRef idx="minor">
-            <a:schemeClr val="lt1"/>
-          </a:fontRef>
-        </p:style>
-        <p:txBody>
-          <a:bodyPr rtlCol="0" anchor="ctr"/>
-          <a:lstStyle/>
-          <a:p>
-            <a:pPr algn="ctr"/>
-            <a:r>
-              <a:rPr lang="en-US" sz="2800" b="1" dirty="0" smtClean="0">
-                <a:solidFill>
-                  <a:srgbClr val="800000"/>
-                </a:solidFill>
-              </a:rPr>
-              <a:t>Split between </a:t>
-            </a:r>
-            <a:r>
-              <a:rPr lang="en-US" sz="2800" b="1" i="1" dirty="0" smtClean="0">
-                <a:solidFill>
-                  <a:srgbClr val="800000"/>
-                </a:solidFill>
-              </a:rPr>
-              <a:t>kl</a:t>
-            </a:r>
-            <a:r>
-              <a:rPr lang="en-US" sz="2800" b="1" dirty="0" smtClean="0">
-                <a:solidFill>
-                  <a:srgbClr val="800000"/>
-                </a:solidFill>
-              </a:rPr>
-              <a:t> and </a:t>
-            </a:r>
-            <a:r>
-              <a:rPr lang="en-US" sz="2800" b="1" i="1" dirty="0" smtClean="0">
-                <a:solidFill>
-                  <a:srgbClr val="800000"/>
-                </a:solidFill>
-              </a:rPr>
-              <a:t>e</a:t>
-            </a:r>
-            <a:r>
-              <a:rPr lang="en-US" sz="2800" b="1" dirty="0" smtClean="0">
-                <a:solidFill>
-                  <a:srgbClr val="800000"/>
-                </a:solidFill>
-              </a:rPr>
-              <a:t> does not meaningfully</a:t>
-            </a:r>
-          </a:p>
-          <a:p>
-            <a:pPr algn="ctr"/>
-            <a:r>
-              <a:rPr lang="en-US" sz="2800" b="1" dirty="0" smtClean="0">
-                <a:solidFill>
-                  <a:srgbClr val="800000"/>
-                </a:solidFill>
-              </a:rPr>
-              <a:t>contribute to “goodness” of fit.</a:t>
-            </a:r>
-            <a:br>
-              <a:rPr lang="en-US" sz="2800" b="1" dirty="0" smtClean="0">
-                <a:solidFill>
-                  <a:srgbClr val="800000"/>
-                </a:solidFill>
-              </a:rPr>
-            </a:br>
-            <a:r>
-              <a:rPr lang="en-US" sz="2800" b="1" dirty="0" smtClean="0">
-                <a:solidFill>
-                  <a:srgbClr val="800000"/>
-                </a:solidFill>
-              </a:rPr>
-              <a:t>Prefer Cobb-Douglas.</a:t>
-            </a:r>
-            <a:endParaRPr lang="en-US" sz="2800" b="1" dirty="0">
-              <a:solidFill>
-                <a:srgbClr val="800000"/>
-              </a:solidFill>
-            </a:endParaRPr>
-          </a:p>
-        </p:txBody>
-      </p:sp>
       <p:cxnSp>
         <p:nvCxnSpPr>
           <p:cNvPr id="6" name="Straight Arrow Connector 5"/>
@@ -3528,7 +3498,7 @@
         <p:spPr>
           <a:xfrm>
             <a:off x="4909979" y="6077515"/>
-            <a:ext cx="622236" cy="707886"/>
+            <a:ext cx="523801" cy="707886"/>
           </a:xfrm>
           <a:prstGeom prst="rect">
             <a:avLst/>
@@ -3548,7 +3518,7 @@
                 <a:latin typeface="Symbol" charset="2"/>
                 <a:cs typeface="Symbol" charset="2"/>
               </a:rPr>
-              <a:t>s</a:t>
+              <a:t>g</a:t>
             </a:r>
             <a:endParaRPr lang="en-US" sz="4000" b="1" i="1" dirty="0">
               <a:latin typeface="Symbol" charset="2"/>
@@ -3564,9 +3534,9 @@
           <p:nvPr/>
         </p:nvSpPr>
         <p:spPr>
-          <a:xfrm>
-            <a:off x="158755" y="95253"/>
-            <a:ext cx="900766" cy="707886"/>
+          <a:xfrm rot="16200000">
+            <a:off x="-964227" y="2754497"/>
+            <a:ext cx="2778158" cy="707886"/>
           </a:xfrm>
           <a:prstGeom prst="rect">
             <a:avLst/>
@@ -3578,8 +3548,18 @@
           </a:bodyPr>
           <a:lstStyle/>
           <a:p>
-            <a:r>
-              <a:rPr lang="en-US" sz="4000" b="1" i="1" dirty="0" smtClean="0">
+            <a:pPr algn="ctr"/>
+            <a:r>
+              <a:rPr lang="en-US" sz="4000" b="1" dirty="0" smtClean="0">
+                <a:solidFill>
+                  <a:srgbClr val="800000"/>
+                </a:solidFill>
+                <a:cs typeface="Symbol" charset="2"/>
+              </a:rPr>
+              <a:t>Width of </a:t>
+            </a:r>
+            <a:r>
+              <a:rPr lang="en-US" sz="4000" b="1" i="1" dirty="0" err="1" smtClean="0">
                 <a:solidFill>
                   <a:srgbClr val="800000"/>
                 </a:solidFill>
@@ -3588,1316 +3568,14 @@
               <a:t>CI</a:t>
             </a:r>
             <a:r>
-              <a:rPr lang="en-US" sz="4000" b="1" i="1" baseline="-25000" dirty="0" smtClean="0">
+              <a:rPr lang="en-US" sz="4000" b="1" i="1" baseline="-25000" dirty="0" err="1" smtClean="0">
                 <a:solidFill>
                   <a:srgbClr val="800000"/>
                 </a:solidFill>
                 <a:latin typeface="Symbol" charset="2"/>
                 <a:cs typeface="Symbol" charset="2"/>
               </a:rPr>
-              <a:t>s</a:t>
-            </a:r>
-            <a:endParaRPr lang="en-US" sz="4000" b="1" i="1" baseline="-25000" dirty="0">
-              <a:latin typeface="Symbol" charset="2"/>
-              <a:cs typeface="Symbol" charset="2"/>
-            </a:endParaRPr>
-          </a:p>
-        </p:txBody>
-      </p:sp>
-      <p:cxnSp>
-        <p:nvCxnSpPr>
-          <p:cNvPr id="16" name="Straight Arrow Connector 15"/>
-          <p:cNvCxnSpPr/>
-          <p:nvPr/>
-        </p:nvCxnSpPr>
-        <p:spPr>
-          <a:xfrm flipV="1">
-            <a:off x="944155" y="90753"/>
-            <a:ext cx="0" cy="6011419"/>
-          </a:xfrm>
-          <a:prstGeom prst="straightConnector1">
-            <a:avLst/>
-          </a:prstGeom>
-          <a:ln w="50800">
-            <a:solidFill>
-              <a:srgbClr val="6C0000"/>
-            </a:solidFill>
-            <a:tailEnd type="none" w="med" len="med"/>
-          </a:ln>
-          <a:effectLst/>
-        </p:spPr>
-        <p:style>
-          <a:lnRef idx="2">
-            <a:schemeClr val="accent1"/>
-          </a:lnRef>
-          <a:fillRef idx="0">
-            <a:schemeClr val="accent1"/>
-          </a:fillRef>
-          <a:effectRef idx="1">
-            <a:schemeClr val="accent1"/>
-          </a:effectRef>
-          <a:fontRef idx="minor">
-            <a:schemeClr val="tx1"/>
-          </a:fontRef>
-        </p:style>
-      </p:cxnSp>
-      <p:sp>
-        <p:nvSpPr>
-          <p:cNvPr id="22" name="Rectangle 21"/>
-          <p:cNvSpPr/>
-          <p:nvPr/>
-        </p:nvSpPr>
-        <p:spPr>
-          <a:xfrm>
-            <a:off x="807136" y="6104697"/>
-            <a:ext cx="302394" cy="338554"/>
-          </a:xfrm>
-          <a:prstGeom prst="rect">
-            <a:avLst/>
-          </a:prstGeom>
-        </p:spPr>
-        <p:txBody>
-          <a:bodyPr wrap="none">
-            <a:spAutoFit/>
-          </a:bodyPr>
-          <a:lstStyle/>
-          <a:p>
-            <a:pPr algn="ctr"/>
-            <a:r>
-              <a:rPr lang="en-US" sz="1600" dirty="0" smtClean="0">
-                <a:solidFill>
-                  <a:srgbClr val="800000"/>
-                </a:solidFill>
-                <a:cs typeface="Symbol" charset="2"/>
-              </a:rPr>
-              <a:t>0</a:t>
-            </a:r>
-            <a:endParaRPr lang="en-US" sz="1600" baseline="-25000" dirty="0">
-              <a:latin typeface="Symbol" charset="2"/>
-              <a:cs typeface="Symbol" charset="2"/>
-            </a:endParaRPr>
-          </a:p>
-        </p:txBody>
-      </p:sp>
-      <p:sp>
-        <p:nvSpPr>
-          <p:cNvPr id="23" name="Rectangle 22"/>
-          <p:cNvSpPr/>
-          <p:nvPr/>
-        </p:nvSpPr>
-        <p:spPr>
-          <a:xfrm>
-            <a:off x="8485766" y="6104697"/>
-            <a:ext cx="302394" cy="338554"/>
-          </a:xfrm>
-          <a:prstGeom prst="rect">
-            <a:avLst/>
-          </a:prstGeom>
-        </p:spPr>
-        <p:txBody>
-          <a:bodyPr wrap="none">
-            <a:spAutoFit/>
-          </a:bodyPr>
-          <a:lstStyle/>
-          <a:p>
-            <a:pPr algn="ctr"/>
-            <a:r>
-              <a:rPr lang="en-US" sz="1600" dirty="0">
-                <a:solidFill>
-                  <a:srgbClr val="800000"/>
-                </a:solidFill>
-                <a:cs typeface="Symbol" charset="2"/>
-              </a:rPr>
-              <a:t>1</a:t>
-            </a:r>
-            <a:endParaRPr lang="en-US" sz="1600" baseline="-25000" dirty="0">
-              <a:latin typeface="Symbol" charset="2"/>
-              <a:cs typeface="Symbol" charset="2"/>
-            </a:endParaRPr>
-          </a:p>
-        </p:txBody>
-      </p:sp>
-    </p:spTree>
-    <p:extLst>
-      <p:ext uri="{BB962C8B-B14F-4D97-AF65-F5344CB8AC3E}">
-        <p14:creationId xmlns:p14="http://schemas.microsoft.com/office/powerpoint/2010/main" val="1690725559"/>
-      </p:ext>
-    </p:extLst>
-  </p:cSld>
-  <p:clrMapOvr>
-    <a:masterClrMapping/>
-  </p:clrMapOvr>
-</p:sld>
-</file>
-
-<file path=ppt/slides/slide3.xml><?xml version="1.0" encoding="utf-8"?>
-<p:sld xmlns:a="http://schemas.openxmlformats.org/drawingml/2006/main" xmlns:r="http://schemas.openxmlformats.org/officeDocument/2006/relationships" xmlns:p="http://schemas.openxmlformats.org/presentationml/2006/main">
-  <p:cSld>
-    <p:spTree>
-      <p:nvGrpSpPr>
-        <p:cNvPr id="1" name=""/>
-        <p:cNvGrpSpPr/>
-        <p:nvPr/>
-      </p:nvGrpSpPr>
-      <p:grpSpPr>
-        <a:xfrm>
-          <a:off x="0" y="0"/>
-          <a:ext cx="0" cy="0"/>
-          <a:chOff x="0" y="0"/>
-          <a:chExt cx="0" cy="0"/>
-        </a:xfrm>
-      </p:grpSpPr>
-      <p:sp>
-        <p:nvSpPr>
-          <p:cNvPr id="4" name="Rounded Rectangle 3"/>
-          <p:cNvSpPr/>
-          <p:nvPr/>
-        </p:nvSpPr>
-        <p:spPr>
-          <a:xfrm>
-            <a:off x="1210882" y="378727"/>
-            <a:ext cx="7506457" cy="2375770"/>
-          </a:xfrm>
-          <a:prstGeom prst="roundRect">
-            <a:avLst/>
-          </a:prstGeom>
-          <a:noFill/>
-          <a:ln w="50800">
-            <a:solidFill>
-              <a:srgbClr val="800000"/>
-            </a:solidFill>
-          </a:ln>
-          <a:effectLst/>
-        </p:spPr>
-        <p:style>
-          <a:lnRef idx="1">
-            <a:schemeClr val="accent1"/>
-          </a:lnRef>
-          <a:fillRef idx="3">
-            <a:schemeClr val="accent1"/>
-          </a:fillRef>
-          <a:effectRef idx="2">
-            <a:schemeClr val="accent1"/>
-          </a:effectRef>
-          <a:fontRef idx="minor">
-            <a:schemeClr val="lt1"/>
-          </a:fontRef>
-        </p:style>
-        <p:txBody>
-          <a:bodyPr rtlCol="0" anchor="ctr"/>
-          <a:lstStyle/>
-          <a:p>
-            <a:pPr algn="ctr"/>
-            <a:r>
-              <a:rPr lang="en-US" sz="2800" b="1" dirty="0" smtClean="0">
-                <a:solidFill>
-                  <a:srgbClr val="800000"/>
-                </a:solidFill>
-              </a:rPr>
-              <a:t>Split between </a:t>
-            </a:r>
-            <a:r>
-              <a:rPr lang="en-US" sz="2800" b="1" i="1" dirty="0" smtClean="0">
-                <a:solidFill>
-                  <a:srgbClr val="800000"/>
-                </a:solidFill>
-              </a:rPr>
-              <a:t>kl</a:t>
-            </a:r>
-            <a:r>
-              <a:rPr lang="en-US" sz="2800" b="1" dirty="0" smtClean="0">
-                <a:solidFill>
-                  <a:srgbClr val="800000"/>
-                </a:solidFill>
-              </a:rPr>
-              <a:t> and </a:t>
-            </a:r>
-            <a:r>
-              <a:rPr lang="en-US" sz="2800" b="1" i="1" dirty="0" smtClean="0">
-                <a:solidFill>
-                  <a:srgbClr val="800000"/>
-                </a:solidFill>
-              </a:rPr>
-              <a:t>e</a:t>
-            </a:r>
-            <a:r>
-              <a:rPr lang="en-US" sz="2800" b="1" dirty="0" smtClean="0">
-                <a:solidFill>
-                  <a:srgbClr val="800000"/>
-                </a:solidFill>
-              </a:rPr>
-              <a:t> does not meaningfully</a:t>
-            </a:r>
-          </a:p>
-          <a:p>
-            <a:pPr algn="ctr"/>
-            <a:r>
-              <a:rPr lang="en-US" sz="2800" b="1" dirty="0" smtClean="0">
-                <a:solidFill>
-                  <a:srgbClr val="800000"/>
-                </a:solidFill>
-              </a:rPr>
-              <a:t>contribute to “goodness” of fit.</a:t>
-            </a:r>
-            <a:br>
-              <a:rPr lang="en-US" sz="2800" b="1" dirty="0" smtClean="0">
-                <a:solidFill>
-                  <a:srgbClr val="800000"/>
-                </a:solidFill>
-              </a:rPr>
-            </a:br>
-            <a:r>
-              <a:rPr lang="en-US" sz="2800" b="1" dirty="0" smtClean="0">
-                <a:solidFill>
-                  <a:srgbClr val="800000"/>
-                </a:solidFill>
-              </a:rPr>
-              <a:t>Prefer Cobb-Douglas.</a:t>
-            </a:r>
-            <a:endParaRPr lang="en-US" sz="2800" b="1" dirty="0">
-              <a:solidFill>
-                <a:srgbClr val="800000"/>
-              </a:solidFill>
-            </a:endParaRPr>
-          </a:p>
-        </p:txBody>
-      </p:sp>
-      <p:cxnSp>
-        <p:nvCxnSpPr>
-          <p:cNvPr id="6" name="Straight Arrow Connector 5"/>
-          <p:cNvCxnSpPr/>
-          <p:nvPr/>
-        </p:nvCxnSpPr>
-        <p:spPr>
-          <a:xfrm>
-            <a:off x="944155" y="6077515"/>
-            <a:ext cx="7957460" cy="0"/>
-          </a:xfrm>
-          <a:prstGeom prst="straightConnector1">
-            <a:avLst/>
-          </a:prstGeom>
-          <a:ln w="50800">
-            <a:solidFill>
-              <a:srgbClr val="6C0000"/>
-            </a:solidFill>
-            <a:tailEnd type="none" w="med" len="med"/>
-          </a:ln>
-          <a:effectLst/>
-        </p:spPr>
-        <p:style>
-          <a:lnRef idx="2">
-            <a:schemeClr val="accent1"/>
-          </a:lnRef>
-          <a:fillRef idx="0">
-            <a:schemeClr val="accent1"/>
-          </a:fillRef>
-          <a:effectRef idx="1">
-            <a:schemeClr val="accent1"/>
-          </a:effectRef>
-          <a:fontRef idx="minor">
-            <a:schemeClr val="tx1"/>
-          </a:fontRef>
-        </p:style>
-      </p:cxnSp>
-      <p:sp>
-        <p:nvSpPr>
-          <p:cNvPr id="11" name="Rectangle 10"/>
-          <p:cNvSpPr/>
-          <p:nvPr/>
-        </p:nvSpPr>
-        <p:spPr>
-          <a:xfrm>
-            <a:off x="4909979" y="6077515"/>
-            <a:ext cx="622236" cy="707886"/>
-          </a:xfrm>
-          <a:prstGeom prst="rect">
-            <a:avLst/>
-          </a:prstGeom>
-        </p:spPr>
-        <p:txBody>
-          <a:bodyPr wrap="none">
-            <a:spAutoFit/>
-          </a:bodyPr>
-          <a:lstStyle/>
-          <a:p>
-            <a:r>
-              <a:rPr lang="en-US" sz="4000" b="1" i="1" dirty="0" smtClean="0">
-                <a:solidFill>
-                  <a:srgbClr val="800000"/>
-                </a:solidFill>
-                <a:latin typeface="Symbol" charset="2"/>
-                <a:cs typeface="Symbol" charset="2"/>
-              </a:rPr>
-              <a:t>s</a:t>
-            </a:r>
-            <a:endParaRPr lang="en-US" sz="4000" b="1" i="1" dirty="0">
-              <a:latin typeface="Symbol" charset="2"/>
-              <a:cs typeface="Symbol" charset="2"/>
-            </a:endParaRPr>
-          </a:p>
-        </p:txBody>
-      </p:sp>
-      <p:sp>
-        <p:nvSpPr>
-          <p:cNvPr id="15" name="Rectangle 14"/>
-          <p:cNvSpPr/>
-          <p:nvPr/>
-        </p:nvSpPr>
-        <p:spPr>
-          <a:xfrm>
-            <a:off x="158755" y="95253"/>
-            <a:ext cx="900766" cy="707886"/>
-          </a:xfrm>
-          <a:prstGeom prst="rect">
-            <a:avLst/>
-          </a:prstGeom>
-        </p:spPr>
-        <p:txBody>
-          <a:bodyPr wrap="none">
-            <a:spAutoFit/>
-          </a:bodyPr>
-          <a:lstStyle/>
-          <a:p>
-            <a:r>
-              <a:rPr lang="en-US" sz="4000" b="1" i="1" dirty="0" smtClean="0">
-                <a:solidFill>
-                  <a:srgbClr val="800000"/>
-                </a:solidFill>
-                <a:cs typeface="Symbol" charset="2"/>
-              </a:rPr>
-              <a:t>CI</a:t>
-            </a:r>
-            <a:r>
-              <a:rPr lang="en-US" sz="4000" b="1" i="1" baseline="-25000" dirty="0" smtClean="0">
-                <a:solidFill>
-                  <a:srgbClr val="800000"/>
-                </a:solidFill>
-                <a:latin typeface="Symbol" charset="2"/>
-                <a:cs typeface="Symbol" charset="2"/>
-              </a:rPr>
-              <a:t>s</a:t>
-            </a:r>
-            <a:endParaRPr lang="en-US" sz="4000" b="1" i="1" baseline="-25000" dirty="0">
-              <a:latin typeface="Symbol" charset="2"/>
-              <a:cs typeface="Symbol" charset="2"/>
-            </a:endParaRPr>
-          </a:p>
-        </p:txBody>
-      </p:sp>
-      <p:cxnSp>
-        <p:nvCxnSpPr>
-          <p:cNvPr id="16" name="Straight Arrow Connector 15"/>
-          <p:cNvCxnSpPr/>
-          <p:nvPr/>
-        </p:nvCxnSpPr>
-        <p:spPr>
-          <a:xfrm flipV="1">
-            <a:off x="944155" y="90753"/>
-            <a:ext cx="0" cy="6011419"/>
-          </a:xfrm>
-          <a:prstGeom prst="straightConnector1">
-            <a:avLst/>
-          </a:prstGeom>
-          <a:ln w="50800">
-            <a:solidFill>
-              <a:srgbClr val="6C0000"/>
-            </a:solidFill>
-            <a:tailEnd type="none" w="med" len="med"/>
-          </a:ln>
-          <a:effectLst/>
-        </p:spPr>
-        <p:style>
-          <a:lnRef idx="2">
-            <a:schemeClr val="accent1"/>
-          </a:lnRef>
-          <a:fillRef idx="0">
-            <a:schemeClr val="accent1"/>
-          </a:fillRef>
-          <a:effectRef idx="1">
-            <a:schemeClr val="accent1"/>
-          </a:effectRef>
-          <a:fontRef idx="minor">
-            <a:schemeClr val="tx1"/>
-          </a:fontRef>
-        </p:style>
-      </p:cxnSp>
-      <p:sp>
-        <p:nvSpPr>
-          <p:cNvPr id="18" name="Rounded Rectangle 17"/>
-          <p:cNvSpPr/>
-          <p:nvPr/>
-        </p:nvSpPr>
-        <p:spPr>
-          <a:xfrm>
-            <a:off x="5978400" y="3312444"/>
-            <a:ext cx="2750279" cy="2375770"/>
-          </a:xfrm>
-          <a:prstGeom prst="roundRect">
-            <a:avLst/>
-          </a:prstGeom>
-          <a:noFill/>
-          <a:ln w="50800">
-            <a:solidFill>
-              <a:srgbClr val="800000"/>
-            </a:solidFill>
-          </a:ln>
-          <a:effectLst/>
-        </p:spPr>
-        <p:style>
-          <a:lnRef idx="1">
-            <a:schemeClr val="accent1"/>
-          </a:lnRef>
-          <a:fillRef idx="3">
-            <a:schemeClr val="accent1"/>
-          </a:fillRef>
-          <a:effectRef idx="2">
-            <a:schemeClr val="accent1"/>
-          </a:effectRef>
-          <a:fontRef idx="minor">
-            <a:schemeClr val="lt1"/>
-          </a:fontRef>
-        </p:style>
-        <p:txBody>
-          <a:bodyPr rtlCol="0" anchor="ctr"/>
-          <a:lstStyle/>
-          <a:p>
-            <a:pPr algn="ctr"/>
-            <a:r>
-              <a:rPr lang="en-US" sz="2800" b="1" i="1" dirty="0">
-                <a:solidFill>
-                  <a:srgbClr val="800000"/>
-                </a:solidFill>
-              </a:rPr>
-              <a:t>kl</a:t>
-            </a:r>
-            <a:r>
-              <a:rPr lang="en-US" sz="2800" b="1" dirty="0">
-                <a:solidFill>
-                  <a:srgbClr val="800000"/>
-                </a:solidFill>
-              </a:rPr>
-              <a:t> and </a:t>
-            </a:r>
-            <a:r>
-              <a:rPr lang="en-US" sz="2800" b="1" i="1" dirty="0">
-                <a:solidFill>
-                  <a:srgbClr val="800000"/>
-                </a:solidFill>
-              </a:rPr>
-              <a:t>e</a:t>
-            </a:r>
-            <a:r>
-              <a:rPr lang="en-US" sz="2800" b="1" dirty="0">
-                <a:solidFill>
-                  <a:srgbClr val="800000"/>
-                </a:solidFill>
-              </a:rPr>
-              <a:t> are </a:t>
-            </a:r>
-            <a:r>
-              <a:rPr lang="en-US" sz="2800" b="1" dirty="0" smtClean="0">
-                <a:solidFill>
-                  <a:srgbClr val="800000"/>
-                </a:solidFill>
-              </a:rPr>
-              <a:t>substitutes</a:t>
-            </a:r>
-            <a:endParaRPr lang="en-US" sz="2800" b="1" i="1" dirty="0">
-              <a:solidFill>
-                <a:srgbClr val="800000"/>
-              </a:solidFill>
-            </a:endParaRPr>
-          </a:p>
-        </p:txBody>
-      </p:sp>
-      <p:sp>
-        <p:nvSpPr>
-          <p:cNvPr id="22" name="Rectangle 21"/>
-          <p:cNvSpPr/>
-          <p:nvPr/>
-        </p:nvSpPr>
-        <p:spPr>
-          <a:xfrm>
-            <a:off x="807136" y="6104697"/>
-            <a:ext cx="302394" cy="338554"/>
-          </a:xfrm>
-          <a:prstGeom prst="rect">
-            <a:avLst/>
-          </a:prstGeom>
-        </p:spPr>
-        <p:txBody>
-          <a:bodyPr wrap="none">
-            <a:spAutoFit/>
-          </a:bodyPr>
-          <a:lstStyle/>
-          <a:p>
-            <a:pPr algn="ctr"/>
-            <a:r>
-              <a:rPr lang="en-US" sz="1600" dirty="0" smtClean="0">
-                <a:solidFill>
-                  <a:srgbClr val="800000"/>
-                </a:solidFill>
-                <a:cs typeface="Symbol" charset="2"/>
-              </a:rPr>
-              <a:t>0</a:t>
-            </a:r>
-            <a:endParaRPr lang="en-US" sz="1600" baseline="-25000" dirty="0">
-              <a:latin typeface="Symbol" charset="2"/>
-              <a:cs typeface="Symbol" charset="2"/>
-            </a:endParaRPr>
-          </a:p>
-        </p:txBody>
-      </p:sp>
-      <p:sp>
-        <p:nvSpPr>
-          <p:cNvPr id="23" name="Rectangle 22"/>
-          <p:cNvSpPr/>
-          <p:nvPr/>
-        </p:nvSpPr>
-        <p:spPr>
-          <a:xfrm>
-            <a:off x="8485766" y="6104697"/>
-            <a:ext cx="302394" cy="338554"/>
-          </a:xfrm>
-          <a:prstGeom prst="rect">
-            <a:avLst/>
-          </a:prstGeom>
-        </p:spPr>
-        <p:txBody>
-          <a:bodyPr wrap="none">
-            <a:spAutoFit/>
-          </a:bodyPr>
-          <a:lstStyle/>
-          <a:p>
-            <a:pPr algn="ctr"/>
-            <a:r>
-              <a:rPr lang="en-US" sz="1600" dirty="0">
-                <a:solidFill>
-                  <a:srgbClr val="800000"/>
-                </a:solidFill>
-                <a:cs typeface="Symbol" charset="2"/>
-              </a:rPr>
-              <a:t>1</a:t>
-            </a:r>
-            <a:endParaRPr lang="en-US" sz="1600" baseline="-25000" dirty="0">
-              <a:latin typeface="Symbol" charset="2"/>
-              <a:cs typeface="Symbol" charset="2"/>
-            </a:endParaRPr>
-          </a:p>
-        </p:txBody>
-      </p:sp>
-    </p:spTree>
-    <p:extLst>
-      <p:ext uri="{BB962C8B-B14F-4D97-AF65-F5344CB8AC3E}">
-        <p14:creationId xmlns:p14="http://schemas.microsoft.com/office/powerpoint/2010/main" val="3281133316"/>
-      </p:ext>
-    </p:extLst>
-  </p:cSld>
-  <p:clrMapOvr>
-    <a:masterClrMapping/>
-  </p:clrMapOvr>
-</p:sld>
-</file>
-
-<file path=ppt/slides/slide4.xml><?xml version="1.0" encoding="utf-8"?>
-<p:sld xmlns:a="http://schemas.openxmlformats.org/drawingml/2006/main" xmlns:r="http://schemas.openxmlformats.org/officeDocument/2006/relationships" xmlns:p="http://schemas.openxmlformats.org/presentationml/2006/main">
-  <p:cSld>
-    <p:spTree>
-      <p:nvGrpSpPr>
-        <p:cNvPr id="1" name=""/>
-        <p:cNvGrpSpPr/>
-        <p:nvPr/>
-      </p:nvGrpSpPr>
-      <p:grpSpPr>
-        <a:xfrm>
-          <a:off x="0" y="0"/>
-          <a:ext cx="0" cy="0"/>
-          <a:chOff x="0" y="0"/>
-          <a:chExt cx="0" cy="0"/>
-        </a:xfrm>
-      </p:grpSpPr>
-      <p:sp>
-        <p:nvSpPr>
-          <p:cNvPr id="4" name="Rounded Rectangle 3"/>
-          <p:cNvSpPr/>
-          <p:nvPr/>
-        </p:nvSpPr>
-        <p:spPr>
-          <a:xfrm>
-            <a:off x="1210882" y="378727"/>
-            <a:ext cx="7506457" cy="2375770"/>
-          </a:xfrm>
-          <a:prstGeom prst="roundRect">
-            <a:avLst/>
-          </a:prstGeom>
-          <a:noFill/>
-          <a:ln w="50800">
-            <a:solidFill>
-              <a:srgbClr val="800000"/>
-            </a:solidFill>
-          </a:ln>
-          <a:effectLst/>
-        </p:spPr>
-        <p:style>
-          <a:lnRef idx="1">
-            <a:schemeClr val="accent1"/>
-          </a:lnRef>
-          <a:fillRef idx="3">
-            <a:schemeClr val="accent1"/>
-          </a:fillRef>
-          <a:effectRef idx="2">
-            <a:schemeClr val="accent1"/>
-          </a:effectRef>
-          <a:fontRef idx="minor">
-            <a:schemeClr val="lt1"/>
-          </a:fontRef>
-        </p:style>
-        <p:txBody>
-          <a:bodyPr rtlCol="0" anchor="ctr"/>
-          <a:lstStyle/>
-          <a:p>
-            <a:pPr algn="ctr"/>
-            <a:r>
-              <a:rPr lang="en-US" sz="2800" b="1" dirty="0" smtClean="0">
-                <a:solidFill>
-                  <a:srgbClr val="800000"/>
-                </a:solidFill>
-              </a:rPr>
-              <a:t>Split between </a:t>
-            </a:r>
-            <a:r>
-              <a:rPr lang="en-US" sz="2800" b="1" i="1" dirty="0" smtClean="0">
-                <a:solidFill>
-                  <a:srgbClr val="800000"/>
-                </a:solidFill>
-              </a:rPr>
-              <a:t>kl</a:t>
-            </a:r>
-            <a:r>
-              <a:rPr lang="en-US" sz="2800" b="1" dirty="0" smtClean="0">
-                <a:solidFill>
-                  <a:srgbClr val="800000"/>
-                </a:solidFill>
-              </a:rPr>
-              <a:t> and </a:t>
-            </a:r>
-            <a:r>
-              <a:rPr lang="en-US" sz="2800" b="1" i="1" dirty="0" smtClean="0">
-                <a:solidFill>
-                  <a:srgbClr val="800000"/>
-                </a:solidFill>
-              </a:rPr>
-              <a:t>e</a:t>
-            </a:r>
-            <a:r>
-              <a:rPr lang="en-US" sz="2800" b="1" dirty="0" smtClean="0">
-                <a:solidFill>
-                  <a:srgbClr val="800000"/>
-                </a:solidFill>
-              </a:rPr>
-              <a:t> does not meaningfully</a:t>
-            </a:r>
-          </a:p>
-          <a:p>
-            <a:pPr algn="ctr"/>
-            <a:r>
-              <a:rPr lang="en-US" sz="2800" b="1" dirty="0" smtClean="0">
-                <a:solidFill>
-                  <a:srgbClr val="800000"/>
-                </a:solidFill>
-              </a:rPr>
-              <a:t>contribute to “goodness” of fit.</a:t>
-            </a:r>
-            <a:br>
-              <a:rPr lang="en-US" sz="2800" b="1" dirty="0" smtClean="0">
-                <a:solidFill>
-                  <a:srgbClr val="800000"/>
-                </a:solidFill>
-              </a:rPr>
-            </a:br>
-            <a:r>
-              <a:rPr lang="en-US" sz="2800" b="1" dirty="0" smtClean="0">
-                <a:solidFill>
-                  <a:srgbClr val="800000"/>
-                </a:solidFill>
-              </a:rPr>
-              <a:t>Prefer Cobb-Douglas.</a:t>
-            </a:r>
-            <a:endParaRPr lang="en-US" sz="2800" b="1" dirty="0">
-              <a:solidFill>
-                <a:srgbClr val="800000"/>
-              </a:solidFill>
-            </a:endParaRPr>
-          </a:p>
-        </p:txBody>
-      </p:sp>
-      <p:cxnSp>
-        <p:nvCxnSpPr>
-          <p:cNvPr id="6" name="Straight Arrow Connector 5"/>
-          <p:cNvCxnSpPr/>
-          <p:nvPr/>
-        </p:nvCxnSpPr>
-        <p:spPr>
-          <a:xfrm>
-            <a:off x="944155" y="6077515"/>
-            <a:ext cx="7957460" cy="0"/>
-          </a:xfrm>
-          <a:prstGeom prst="straightConnector1">
-            <a:avLst/>
-          </a:prstGeom>
-          <a:ln w="50800">
-            <a:solidFill>
-              <a:srgbClr val="6C0000"/>
-            </a:solidFill>
-            <a:tailEnd type="none" w="med" len="med"/>
-          </a:ln>
-          <a:effectLst/>
-        </p:spPr>
-        <p:style>
-          <a:lnRef idx="2">
-            <a:schemeClr val="accent1"/>
-          </a:lnRef>
-          <a:fillRef idx="0">
-            <a:schemeClr val="accent1"/>
-          </a:fillRef>
-          <a:effectRef idx="1">
-            <a:schemeClr val="accent1"/>
-          </a:effectRef>
-          <a:fontRef idx="minor">
-            <a:schemeClr val="tx1"/>
-          </a:fontRef>
-        </p:style>
-      </p:cxnSp>
-      <p:sp>
-        <p:nvSpPr>
-          <p:cNvPr id="11" name="Rectangle 10"/>
-          <p:cNvSpPr/>
-          <p:nvPr/>
-        </p:nvSpPr>
-        <p:spPr>
-          <a:xfrm>
-            <a:off x="4909979" y="6077515"/>
-            <a:ext cx="622236" cy="707886"/>
-          </a:xfrm>
-          <a:prstGeom prst="rect">
-            <a:avLst/>
-          </a:prstGeom>
-        </p:spPr>
-        <p:txBody>
-          <a:bodyPr wrap="none">
-            <a:spAutoFit/>
-          </a:bodyPr>
-          <a:lstStyle/>
-          <a:p>
-            <a:r>
-              <a:rPr lang="en-US" sz="4000" b="1" i="1" dirty="0" smtClean="0">
-                <a:solidFill>
-                  <a:srgbClr val="800000"/>
-                </a:solidFill>
-                <a:latin typeface="Symbol" charset="2"/>
-                <a:cs typeface="Symbol" charset="2"/>
-              </a:rPr>
-              <a:t>s</a:t>
-            </a:r>
-            <a:endParaRPr lang="en-US" sz="4000" b="1" i="1" dirty="0">
-              <a:latin typeface="Symbol" charset="2"/>
-              <a:cs typeface="Symbol" charset="2"/>
-            </a:endParaRPr>
-          </a:p>
-        </p:txBody>
-      </p:sp>
-      <p:sp>
-        <p:nvSpPr>
-          <p:cNvPr id="15" name="Rectangle 14"/>
-          <p:cNvSpPr/>
-          <p:nvPr/>
-        </p:nvSpPr>
-        <p:spPr>
-          <a:xfrm>
-            <a:off x="158755" y="95253"/>
-            <a:ext cx="900766" cy="707886"/>
-          </a:xfrm>
-          <a:prstGeom prst="rect">
-            <a:avLst/>
-          </a:prstGeom>
-        </p:spPr>
-        <p:txBody>
-          <a:bodyPr wrap="none">
-            <a:spAutoFit/>
-          </a:bodyPr>
-          <a:lstStyle/>
-          <a:p>
-            <a:r>
-              <a:rPr lang="en-US" sz="4000" b="1" i="1" dirty="0" smtClean="0">
-                <a:solidFill>
-                  <a:srgbClr val="800000"/>
-                </a:solidFill>
-                <a:cs typeface="Symbol" charset="2"/>
-              </a:rPr>
-              <a:t>CI</a:t>
-            </a:r>
-            <a:r>
-              <a:rPr lang="en-US" sz="4000" b="1" i="1" baseline="-25000" dirty="0" smtClean="0">
-                <a:solidFill>
-                  <a:srgbClr val="800000"/>
-                </a:solidFill>
-                <a:latin typeface="Symbol" charset="2"/>
-                <a:cs typeface="Symbol" charset="2"/>
-              </a:rPr>
-              <a:t>s</a:t>
-            </a:r>
-            <a:endParaRPr lang="en-US" sz="4000" b="1" i="1" baseline="-25000" dirty="0">
-              <a:latin typeface="Symbol" charset="2"/>
-              <a:cs typeface="Symbol" charset="2"/>
-            </a:endParaRPr>
-          </a:p>
-        </p:txBody>
-      </p:sp>
-      <p:cxnSp>
-        <p:nvCxnSpPr>
-          <p:cNvPr id="16" name="Straight Arrow Connector 15"/>
-          <p:cNvCxnSpPr/>
-          <p:nvPr/>
-        </p:nvCxnSpPr>
-        <p:spPr>
-          <a:xfrm flipV="1">
-            <a:off x="944155" y="90753"/>
-            <a:ext cx="0" cy="6011419"/>
-          </a:xfrm>
-          <a:prstGeom prst="straightConnector1">
-            <a:avLst/>
-          </a:prstGeom>
-          <a:ln w="50800">
-            <a:solidFill>
-              <a:srgbClr val="6C0000"/>
-            </a:solidFill>
-            <a:tailEnd type="none" w="med" len="med"/>
-          </a:ln>
-          <a:effectLst/>
-        </p:spPr>
-        <p:style>
-          <a:lnRef idx="2">
-            <a:schemeClr val="accent1"/>
-          </a:lnRef>
-          <a:fillRef idx="0">
-            <a:schemeClr val="accent1"/>
-          </a:fillRef>
-          <a:effectRef idx="1">
-            <a:schemeClr val="accent1"/>
-          </a:effectRef>
-          <a:fontRef idx="minor">
-            <a:schemeClr val="tx1"/>
-          </a:fontRef>
-        </p:style>
-      </p:cxnSp>
-      <p:sp>
-        <p:nvSpPr>
-          <p:cNvPr id="18" name="Rounded Rectangle 17"/>
-          <p:cNvSpPr/>
-          <p:nvPr/>
-        </p:nvSpPr>
-        <p:spPr>
-          <a:xfrm>
-            <a:off x="5978400" y="3312444"/>
-            <a:ext cx="2750279" cy="2375770"/>
-          </a:xfrm>
-          <a:prstGeom prst="roundRect">
-            <a:avLst/>
-          </a:prstGeom>
-          <a:noFill/>
-          <a:ln w="50800">
-            <a:solidFill>
-              <a:srgbClr val="800000"/>
-            </a:solidFill>
-          </a:ln>
-          <a:effectLst/>
-        </p:spPr>
-        <p:style>
-          <a:lnRef idx="1">
-            <a:schemeClr val="accent1"/>
-          </a:lnRef>
-          <a:fillRef idx="3">
-            <a:schemeClr val="accent1"/>
-          </a:fillRef>
-          <a:effectRef idx="2">
-            <a:schemeClr val="accent1"/>
-          </a:effectRef>
-          <a:fontRef idx="minor">
-            <a:schemeClr val="lt1"/>
-          </a:fontRef>
-        </p:style>
-        <p:txBody>
-          <a:bodyPr rtlCol="0" anchor="ctr"/>
-          <a:lstStyle/>
-          <a:p>
-            <a:pPr algn="ctr"/>
-            <a:r>
-              <a:rPr lang="en-US" sz="2800" b="1" i="1" dirty="0">
-                <a:solidFill>
-                  <a:srgbClr val="800000"/>
-                </a:solidFill>
-              </a:rPr>
-              <a:t>kl</a:t>
-            </a:r>
-            <a:r>
-              <a:rPr lang="en-US" sz="2800" b="1" dirty="0">
-                <a:solidFill>
-                  <a:srgbClr val="800000"/>
-                </a:solidFill>
-              </a:rPr>
-              <a:t> and </a:t>
-            </a:r>
-            <a:r>
-              <a:rPr lang="en-US" sz="2800" b="1" i="1" dirty="0">
-                <a:solidFill>
-                  <a:srgbClr val="800000"/>
-                </a:solidFill>
-              </a:rPr>
-              <a:t>e</a:t>
-            </a:r>
-            <a:r>
-              <a:rPr lang="en-US" sz="2800" b="1" dirty="0">
-                <a:solidFill>
-                  <a:srgbClr val="800000"/>
-                </a:solidFill>
-              </a:rPr>
-              <a:t> are </a:t>
-            </a:r>
-            <a:r>
-              <a:rPr lang="en-US" sz="2800" b="1" dirty="0" smtClean="0">
-                <a:solidFill>
-                  <a:srgbClr val="800000"/>
-                </a:solidFill>
-              </a:rPr>
-              <a:t>substitutes</a:t>
-            </a:r>
-            <a:endParaRPr lang="en-US" sz="2800" b="1" i="1" dirty="0">
-              <a:solidFill>
-                <a:srgbClr val="800000"/>
-              </a:solidFill>
-            </a:endParaRPr>
-          </a:p>
-        </p:txBody>
-      </p:sp>
-      <p:sp>
-        <p:nvSpPr>
-          <p:cNvPr id="19" name="Rounded Rectangle 18"/>
-          <p:cNvSpPr/>
-          <p:nvPr/>
-        </p:nvSpPr>
-        <p:spPr>
-          <a:xfrm>
-            <a:off x="1226011" y="3312444"/>
-            <a:ext cx="2476748" cy="2375770"/>
-          </a:xfrm>
-          <a:prstGeom prst="roundRect">
-            <a:avLst/>
-          </a:prstGeom>
-          <a:noFill/>
-          <a:ln w="50800">
-            <a:solidFill>
-              <a:srgbClr val="800000"/>
-            </a:solidFill>
-          </a:ln>
-          <a:effectLst/>
-        </p:spPr>
-        <p:style>
-          <a:lnRef idx="1">
-            <a:schemeClr val="accent1"/>
-          </a:lnRef>
-          <a:fillRef idx="3">
-            <a:schemeClr val="accent1"/>
-          </a:fillRef>
-          <a:effectRef idx="2">
-            <a:schemeClr val="accent1"/>
-          </a:effectRef>
-          <a:fontRef idx="minor">
-            <a:schemeClr val="lt1"/>
-          </a:fontRef>
-        </p:style>
-        <p:txBody>
-          <a:bodyPr rtlCol="0" anchor="ctr"/>
-          <a:lstStyle/>
-          <a:p>
-            <a:pPr algn="ctr"/>
-            <a:r>
-              <a:rPr lang="en-US" sz="2800" b="1" i="1" dirty="0" smtClean="0">
-                <a:solidFill>
-                  <a:srgbClr val="800000"/>
-                </a:solidFill>
-              </a:rPr>
-              <a:t>kl</a:t>
-            </a:r>
-            <a:r>
-              <a:rPr lang="en-US" sz="2800" b="1" dirty="0" smtClean="0">
-                <a:solidFill>
-                  <a:srgbClr val="800000"/>
-                </a:solidFill>
-              </a:rPr>
-              <a:t> and </a:t>
-            </a:r>
-            <a:r>
-              <a:rPr lang="en-US" sz="2800" b="1" i="1" dirty="0" smtClean="0">
-                <a:solidFill>
-                  <a:srgbClr val="800000"/>
-                </a:solidFill>
-              </a:rPr>
-              <a:t>e</a:t>
-            </a:r>
-            <a:r>
-              <a:rPr lang="en-US" sz="2800" b="1" dirty="0" smtClean="0">
-                <a:solidFill>
-                  <a:srgbClr val="800000"/>
-                </a:solidFill>
-              </a:rPr>
-              <a:t> are </a:t>
-            </a:r>
-            <a:r>
-              <a:rPr lang="en-US" sz="2800" b="1" dirty="0" err="1" smtClean="0">
-                <a:solidFill>
-                  <a:srgbClr val="800000"/>
-                </a:solidFill>
-              </a:rPr>
-              <a:t>complemen-tary</a:t>
-            </a:r>
-            <a:endParaRPr lang="en-US" sz="2800" b="1" i="1" dirty="0">
-              <a:solidFill>
-                <a:srgbClr val="800000"/>
-              </a:solidFill>
-            </a:endParaRPr>
-          </a:p>
-        </p:txBody>
-      </p:sp>
-      <p:sp>
-        <p:nvSpPr>
-          <p:cNvPr id="22" name="Rectangle 21"/>
-          <p:cNvSpPr/>
-          <p:nvPr/>
-        </p:nvSpPr>
-        <p:spPr>
-          <a:xfrm>
-            <a:off x="807136" y="6104697"/>
-            <a:ext cx="302394" cy="338554"/>
-          </a:xfrm>
-          <a:prstGeom prst="rect">
-            <a:avLst/>
-          </a:prstGeom>
-        </p:spPr>
-        <p:txBody>
-          <a:bodyPr wrap="none">
-            <a:spAutoFit/>
-          </a:bodyPr>
-          <a:lstStyle/>
-          <a:p>
-            <a:pPr algn="ctr"/>
-            <a:r>
-              <a:rPr lang="en-US" sz="1600" dirty="0" smtClean="0">
-                <a:solidFill>
-                  <a:srgbClr val="800000"/>
-                </a:solidFill>
-                <a:cs typeface="Symbol" charset="2"/>
-              </a:rPr>
-              <a:t>0</a:t>
-            </a:r>
-            <a:endParaRPr lang="en-US" sz="1600" baseline="-25000" dirty="0">
-              <a:latin typeface="Symbol" charset="2"/>
-              <a:cs typeface="Symbol" charset="2"/>
-            </a:endParaRPr>
-          </a:p>
-        </p:txBody>
-      </p:sp>
-      <p:sp>
-        <p:nvSpPr>
-          <p:cNvPr id="23" name="Rectangle 22"/>
-          <p:cNvSpPr/>
-          <p:nvPr/>
-        </p:nvSpPr>
-        <p:spPr>
-          <a:xfrm>
-            <a:off x="8485766" y="6104697"/>
-            <a:ext cx="302394" cy="338554"/>
-          </a:xfrm>
-          <a:prstGeom prst="rect">
-            <a:avLst/>
-          </a:prstGeom>
-        </p:spPr>
-        <p:txBody>
-          <a:bodyPr wrap="none">
-            <a:spAutoFit/>
-          </a:bodyPr>
-          <a:lstStyle/>
-          <a:p>
-            <a:pPr algn="ctr"/>
-            <a:r>
-              <a:rPr lang="en-US" sz="1600" dirty="0">
-                <a:solidFill>
-                  <a:srgbClr val="800000"/>
-                </a:solidFill>
-                <a:cs typeface="Symbol" charset="2"/>
-              </a:rPr>
-              <a:t>1</a:t>
-            </a:r>
-            <a:endParaRPr lang="en-US" sz="1600" baseline="-25000" dirty="0">
-              <a:latin typeface="Symbol" charset="2"/>
-              <a:cs typeface="Symbol" charset="2"/>
-            </a:endParaRPr>
-          </a:p>
-        </p:txBody>
-      </p:sp>
-    </p:spTree>
-    <p:extLst>
-      <p:ext uri="{BB962C8B-B14F-4D97-AF65-F5344CB8AC3E}">
-        <p14:creationId xmlns:p14="http://schemas.microsoft.com/office/powerpoint/2010/main" val="1410317265"/>
-      </p:ext>
-    </p:extLst>
-  </p:cSld>
-  <p:clrMapOvr>
-    <a:masterClrMapping/>
-  </p:clrMapOvr>
-</p:sld>
-</file>
-
-<file path=ppt/slides/slide5.xml><?xml version="1.0" encoding="utf-8"?>
-<p:sld xmlns:a="http://schemas.openxmlformats.org/drawingml/2006/main" xmlns:r="http://schemas.openxmlformats.org/officeDocument/2006/relationships" xmlns:p="http://schemas.openxmlformats.org/presentationml/2006/main">
-  <p:cSld>
-    <p:spTree>
-      <p:nvGrpSpPr>
-        <p:cNvPr id="1" name=""/>
-        <p:cNvGrpSpPr/>
-        <p:nvPr/>
-      </p:nvGrpSpPr>
-      <p:grpSpPr>
-        <a:xfrm>
-          <a:off x="0" y="0"/>
-          <a:ext cx="0" cy="0"/>
-          <a:chOff x="0" y="0"/>
-          <a:chExt cx="0" cy="0"/>
-        </a:xfrm>
-      </p:grpSpPr>
-      <p:cxnSp>
-        <p:nvCxnSpPr>
-          <p:cNvPr id="6" name="Straight Arrow Connector 5"/>
-          <p:cNvCxnSpPr/>
-          <p:nvPr/>
-        </p:nvCxnSpPr>
-        <p:spPr>
-          <a:xfrm>
-            <a:off x="944155" y="6077515"/>
-            <a:ext cx="7957460" cy="0"/>
-          </a:xfrm>
-          <a:prstGeom prst="straightConnector1">
-            <a:avLst/>
-          </a:prstGeom>
-          <a:ln w="50800">
-            <a:solidFill>
-              <a:srgbClr val="6C0000"/>
-            </a:solidFill>
-            <a:tailEnd type="none" w="med" len="med"/>
-          </a:ln>
-          <a:effectLst/>
-        </p:spPr>
-        <p:style>
-          <a:lnRef idx="2">
-            <a:schemeClr val="accent1"/>
-          </a:lnRef>
-          <a:fillRef idx="0">
-            <a:schemeClr val="accent1"/>
-          </a:fillRef>
-          <a:effectRef idx="1">
-            <a:schemeClr val="accent1"/>
-          </a:effectRef>
-          <a:fontRef idx="minor">
-            <a:schemeClr val="tx1"/>
-          </a:fontRef>
-        </p:style>
-      </p:cxnSp>
-      <p:sp>
-        <p:nvSpPr>
-          <p:cNvPr id="11" name="Rectangle 10"/>
-          <p:cNvSpPr/>
-          <p:nvPr/>
-        </p:nvSpPr>
-        <p:spPr>
-          <a:xfrm>
-            <a:off x="4909979" y="6077515"/>
-            <a:ext cx="622236" cy="707886"/>
-          </a:xfrm>
-          <a:prstGeom prst="rect">
-            <a:avLst/>
-          </a:prstGeom>
-        </p:spPr>
-        <p:txBody>
-          <a:bodyPr wrap="none">
-            <a:spAutoFit/>
-          </a:bodyPr>
-          <a:lstStyle/>
-          <a:p>
-            <a:r>
-              <a:rPr lang="en-US" sz="4000" b="1" i="1" dirty="0" smtClean="0">
-                <a:solidFill>
-                  <a:srgbClr val="800000"/>
-                </a:solidFill>
-                <a:latin typeface="Symbol" charset="2"/>
-                <a:cs typeface="Symbol" charset="2"/>
-              </a:rPr>
-              <a:t>s</a:t>
-            </a:r>
-            <a:endParaRPr lang="en-US" sz="4000" b="1" i="1" dirty="0">
-              <a:latin typeface="Symbol" charset="2"/>
-              <a:cs typeface="Symbol" charset="2"/>
-            </a:endParaRPr>
-          </a:p>
-        </p:txBody>
-      </p:sp>
-      <p:sp>
-        <p:nvSpPr>
-          <p:cNvPr id="15" name="Rectangle 14"/>
-          <p:cNvSpPr/>
-          <p:nvPr/>
-        </p:nvSpPr>
-        <p:spPr>
-          <a:xfrm rot="16200000">
-            <a:off x="-997038" y="2754497"/>
-            <a:ext cx="2843780" cy="707886"/>
-          </a:xfrm>
-          <a:prstGeom prst="rect">
-            <a:avLst/>
-          </a:prstGeom>
-        </p:spPr>
-        <p:txBody>
-          <a:bodyPr wrap="none">
-            <a:spAutoFit/>
-          </a:bodyPr>
-          <a:lstStyle/>
-          <a:p>
-            <a:pPr algn="ctr"/>
-            <a:r>
-              <a:rPr lang="en-US" sz="4000" b="1" dirty="0" smtClean="0">
-                <a:solidFill>
-                  <a:srgbClr val="800000"/>
-                </a:solidFill>
-                <a:cs typeface="Symbol" charset="2"/>
-              </a:rPr>
-              <a:t>Width of </a:t>
-            </a:r>
-            <a:r>
-              <a:rPr lang="en-US" sz="4000" b="1" i="1" dirty="0" smtClean="0">
-                <a:solidFill>
-                  <a:srgbClr val="800000"/>
-                </a:solidFill>
-                <a:cs typeface="Symbol" charset="2"/>
-              </a:rPr>
-              <a:t>CI</a:t>
-            </a:r>
-            <a:r>
-              <a:rPr lang="en-US" sz="4000" b="1" i="1" baseline="-25000" dirty="0" smtClean="0">
-                <a:solidFill>
-                  <a:srgbClr val="800000"/>
-                </a:solidFill>
-                <a:latin typeface="Symbol" charset="2"/>
-                <a:cs typeface="Symbol" charset="2"/>
-              </a:rPr>
-              <a:t>s</a:t>
+              <a:t>g</a:t>
             </a:r>
             <a:endParaRPr lang="en-US" sz="4000" b="1" i="1" baseline="-25000" dirty="0">
               <a:latin typeface="Symbol" charset="2"/>
@@ -5221,6 +3899,483 @@
           </p:txBody>
         </p:sp>
       </p:grpSp>
+    </p:spTree>
+    <p:extLst>
+      <p:ext uri="{BB962C8B-B14F-4D97-AF65-F5344CB8AC3E}">
+        <p14:creationId xmlns:p14="http://schemas.microsoft.com/office/powerpoint/2010/main" val="3257792391"/>
+      </p:ext>
+    </p:extLst>
+  </p:cSld>
+  <p:clrMapOvr>
+    <a:masterClrMapping/>
+  </p:clrMapOvr>
+</p:sld>
+</file>
+
+<file path=ppt/slides/slide3.xml><?xml version="1.0" encoding="utf-8"?>
+<p:sld xmlns:a="http://schemas.openxmlformats.org/drawingml/2006/main" xmlns:r="http://schemas.openxmlformats.org/officeDocument/2006/relationships" xmlns:p="http://schemas.openxmlformats.org/presentationml/2006/main">
+  <p:cSld>
+    <p:spTree>
+      <p:nvGrpSpPr>
+        <p:cNvPr id="1" name=""/>
+        <p:cNvGrpSpPr/>
+        <p:nvPr/>
+      </p:nvGrpSpPr>
+      <p:grpSpPr>
+        <a:xfrm>
+          <a:off x="0" y="0"/>
+          <a:ext cx="0" cy="0"/>
+          <a:chOff x="0" y="0"/>
+          <a:chExt cx="0" cy="0"/>
+        </a:xfrm>
+      </p:grpSpPr>
+      <p:cxnSp>
+        <p:nvCxnSpPr>
+          <p:cNvPr id="6" name="Straight Arrow Connector 5"/>
+          <p:cNvCxnSpPr/>
+          <p:nvPr/>
+        </p:nvCxnSpPr>
+        <p:spPr>
+          <a:xfrm>
+            <a:off x="944155" y="6077515"/>
+            <a:ext cx="7957460" cy="0"/>
+          </a:xfrm>
+          <a:prstGeom prst="straightConnector1">
+            <a:avLst/>
+          </a:prstGeom>
+          <a:ln w="50800">
+            <a:solidFill>
+              <a:srgbClr val="6C0000"/>
+            </a:solidFill>
+            <a:tailEnd type="none" w="med" len="med"/>
+          </a:ln>
+          <a:effectLst/>
+        </p:spPr>
+        <p:style>
+          <a:lnRef idx="2">
+            <a:schemeClr val="accent1"/>
+          </a:lnRef>
+          <a:fillRef idx="0">
+            <a:schemeClr val="accent1"/>
+          </a:fillRef>
+          <a:effectRef idx="1">
+            <a:schemeClr val="accent1"/>
+          </a:effectRef>
+          <a:fontRef idx="minor">
+            <a:schemeClr val="tx1"/>
+          </a:fontRef>
+        </p:style>
+      </p:cxnSp>
+      <p:sp>
+        <p:nvSpPr>
+          <p:cNvPr id="11" name="Rectangle 10"/>
+          <p:cNvSpPr/>
+          <p:nvPr/>
+        </p:nvSpPr>
+        <p:spPr>
+          <a:xfrm>
+            <a:off x="4909979" y="6077515"/>
+            <a:ext cx="523801" cy="707886"/>
+          </a:xfrm>
+          <a:prstGeom prst="rect">
+            <a:avLst/>
+          </a:prstGeom>
+        </p:spPr>
+        <p:txBody>
+          <a:bodyPr wrap="none">
+            <a:spAutoFit/>
+          </a:bodyPr>
+          <a:lstStyle/>
+          <a:p>
+            <a:r>
+              <a:rPr lang="en-US" sz="4000" b="1" i="1" dirty="0" smtClean="0">
+                <a:solidFill>
+                  <a:srgbClr val="800000"/>
+                </a:solidFill>
+                <a:latin typeface="Symbol" charset="2"/>
+                <a:cs typeface="Symbol" charset="2"/>
+              </a:rPr>
+              <a:t>g</a:t>
+            </a:r>
+            <a:endParaRPr lang="en-US" sz="4000" b="1" i="1" dirty="0">
+              <a:latin typeface="Symbol" charset="2"/>
+              <a:cs typeface="Symbol" charset="2"/>
+            </a:endParaRPr>
+          </a:p>
+        </p:txBody>
+      </p:sp>
+      <p:sp>
+        <p:nvSpPr>
+          <p:cNvPr id="15" name="Rectangle 14"/>
+          <p:cNvSpPr/>
+          <p:nvPr/>
+        </p:nvSpPr>
+        <p:spPr>
+          <a:xfrm rot="16200000">
+            <a:off x="-964227" y="2754497"/>
+            <a:ext cx="2778158" cy="707886"/>
+          </a:xfrm>
+          <a:prstGeom prst="rect">
+            <a:avLst/>
+          </a:prstGeom>
+        </p:spPr>
+        <p:txBody>
+          <a:bodyPr wrap="none">
+            <a:spAutoFit/>
+          </a:bodyPr>
+          <a:lstStyle/>
+          <a:p>
+            <a:pPr algn="ctr"/>
+            <a:r>
+              <a:rPr lang="en-US" sz="4000" b="1" dirty="0" smtClean="0">
+                <a:solidFill>
+                  <a:srgbClr val="800000"/>
+                </a:solidFill>
+                <a:cs typeface="Symbol" charset="2"/>
+              </a:rPr>
+              <a:t>Width of </a:t>
+            </a:r>
+            <a:r>
+              <a:rPr lang="en-US" sz="4000" b="1" i="1" dirty="0" err="1" smtClean="0">
+                <a:solidFill>
+                  <a:srgbClr val="800000"/>
+                </a:solidFill>
+                <a:cs typeface="Symbol" charset="2"/>
+              </a:rPr>
+              <a:t>CI</a:t>
+            </a:r>
+            <a:r>
+              <a:rPr lang="en-US" sz="4000" b="1" i="1" baseline="-25000" dirty="0" err="1" smtClean="0">
+                <a:solidFill>
+                  <a:srgbClr val="800000"/>
+                </a:solidFill>
+                <a:latin typeface="Symbol" charset="2"/>
+                <a:cs typeface="Symbol" charset="2"/>
+              </a:rPr>
+              <a:t>g</a:t>
+            </a:r>
+            <a:endParaRPr lang="en-US" sz="4000" b="1" i="1" baseline="-25000" dirty="0">
+              <a:latin typeface="Symbol" charset="2"/>
+              <a:cs typeface="Symbol" charset="2"/>
+            </a:endParaRPr>
+          </a:p>
+        </p:txBody>
+      </p:sp>
+      <p:cxnSp>
+        <p:nvCxnSpPr>
+          <p:cNvPr id="16" name="Straight Arrow Connector 15"/>
+          <p:cNvCxnSpPr/>
+          <p:nvPr/>
+        </p:nvCxnSpPr>
+        <p:spPr>
+          <a:xfrm flipV="1">
+            <a:off x="944155" y="90753"/>
+            <a:ext cx="0" cy="6011419"/>
+          </a:xfrm>
+          <a:prstGeom prst="straightConnector1">
+            <a:avLst/>
+          </a:prstGeom>
+          <a:ln w="50800">
+            <a:solidFill>
+              <a:srgbClr val="6C0000"/>
+            </a:solidFill>
+            <a:tailEnd type="none" w="med" len="med"/>
+          </a:ln>
+          <a:effectLst/>
+        </p:spPr>
+        <p:style>
+          <a:lnRef idx="2">
+            <a:schemeClr val="accent1"/>
+          </a:lnRef>
+          <a:fillRef idx="0">
+            <a:schemeClr val="accent1"/>
+          </a:fillRef>
+          <a:effectRef idx="1">
+            <a:schemeClr val="accent1"/>
+          </a:effectRef>
+          <a:fontRef idx="minor">
+            <a:schemeClr val="tx1"/>
+          </a:fontRef>
+        </p:style>
+      </p:cxnSp>
+      <p:sp>
+        <p:nvSpPr>
+          <p:cNvPr id="22" name="Rectangle 21"/>
+          <p:cNvSpPr/>
+          <p:nvPr/>
+        </p:nvSpPr>
+        <p:spPr>
+          <a:xfrm>
+            <a:off x="807136" y="6104697"/>
+            <a:ext cx="302394" cy="338554"/>
+          </a:xfrm>
+          <a:prstGeom prst="rect">
+            <a:avLst/>
+          </a:prstGeom>
+        </p:spPr>
+        <p:txBody>
+          <a:bodyPr wrap="none">
+            <a:spAutoFit/>
+          </a:bodyPr>
+          <a:lstStyle/>
+          <a:p>
+            <a:pPr algn="ctr"/>
+            <a:r>
+              <a:rPr lang="en-US" sz="1600" dirty="0" smtClean="0">
+                <a:solidFill>
+                  <a:srgbClr val="800000"/>
+                </a:solidFill>
+                <a:cs typeface="Symbol" charset="2"/>
+              </a:rPr>
+              <a:t>0</a:t>
+            </a:r>
+            <a:endParaRPr lang="en-US" sz="1600" baseline="-25000" dirty="0">
+              <a:latin typeface="Symbol" charset="2"/>
+              <a:cs typeface="Symbol" charset="2"/>
+            </a:endParaRPr>
+          </a:p>
+        </p:txBody>
+      </p:sp>
+      <p:sp>
+        <p:nvSpPr>
+          <p:cNvPr id="23" name="Rectangle 22"/>
+          <p:cNvSpPr/>
+          <p:nvPr/>
+        </p:nvSpPr>
+        <p:spPr>
+          <a:xfrm>
+            <a:off x="8485766" y="6104697"/>
+            <a:ext cx="302394" cy="338554"/>
+          </a:xfrm>
+          <a:prstGeom prst="rect">
+            <a:avLst/>
+          </a:prstGeom>
+        </p:spPr>
+        <p:txBody>
+          <a:bodyPr wrap="none">
+            <a:spAutoFit/>
+          </a:bodyPr>
+          <a:lstStyle/>
+          <a:p>
+            <a:pPr algn="ctr"/>
+            <a:r>
+              <a:rPr lang="en-US" sz="1600" dirty="0">
+                <a:solidFill>
+                  <a:srgbClr val="800000"/>
+                </a:solidFill>
+                <a:cs typeface="Symbol" charset="2"/>
+              </a:rPr>
+              <a:t>1</a:t>
+            </a:r>
+            <a:endParaRPr lang="en-US" sz="1600" baseline="-25000" dirty="0">
+              <a:latin typeface="Symbol" charset="2"/>
+              <a:cs typeface="Symbol" charset="2"/>
+            </a:endParaRPr>
+          </a:p>
+        </p:txBody>
+      </p:sp>
+      <p:sp>
+        <p:nvSpPr>
+          <p:cNvPr id="12" name="Rectangle 11"/>
+          <p:cNvSpPr/>
+          <p:nvPr/>
+        </p:nvSpPr>
+        <p:spPr>
+          <a:xfrm rot="16200000">
+            <a:off x="561442" y="5738138"/>
+            <a:ext cx="302394" cy="338554"/>
+          </a:xfrm>
+          <a:prstGeom prst="rect">
+            <a:avLst/>
+          </a:prstGeom>
+        </p:spPr>
+        <p:txBody>
+          <a:bodyPr wrap="none">
+            <a:spAutoFit/>
+          </a:bodyPr>
+          <a:lstStyle/>
+          <a:p>
+            <a:pPr algn="ctr"/>
+            <a:r>
+              <a:rPr lang="en-US" sz="1600" dirty="0" smtClean="0">
+                <a:solidFill>
+                  <a:srgbClr val="800000"/>
+                </a:solidFill>
+                <a:cs typeface="Symbol" charset="2"/>
+              </a:rPr>
+              <a:t>0</a:t>
+            </a:r>
+            <a:endParaRPr lang="en-US" sz="1600" baseline="-25000" dirty="0">
+              <a:latin typeface="Symbol" charset="2"/>
+              <a:cs typeface="Symbol" charset="2"/>
+            </a:endParaRPr>
+          </a:p>
+        </p:txBody>
+      </p:sp>
+      <p:sp>
+        <p:nvSpPr>
+          <p:cNvPr id="13" name="Rectangle 12"/>
+          <p:cNvSpPr/>
+          <p:nvPr/>
+        </p:nvSpPr>
+        <p:spPr>
+          <a:xfrm rot="16200000">
+            <a:off x="568308" y="72573"/>
+            <a:ext cx="288661" cy="338554"/>
+          </a:xfrm>
+          <a:prstGeom prst="rect">
+            <a:avLst/>
+          </a:prstGeom>
+        </p:spPr>
+        <p:txBody>
+          <a:bodyPr wrap="none">
+            <a:spAutoFit/>
+          </a:bodyPr>
+          <a:lstStyle/>
+          <a:p>
+            <a:pPr algn="ctr"/>
+            <a:r>
+              <a:rPr lang="en-US" sz="1600" dirty="0" smtClean="0">
+                <a:solidFill>
+                  <a:srgbClr val="800000"/>
+                </a:solidFill>
+                <a:cs typeface="Symbol" charset="2"/>
+              </a:rPr>
+              <a:t>2</a:t>
+            </a:r>
+            <a:endParaRPr lang="en-US" sz="1600" baseline="-25000" dirty="0">
+              <a:latin typeface="Symbol" charset="2"/>
+              <a:cs typeface="Symbol" charset="2"/>
+            </a:endParaRPr>
+          </a:p>
+        </p:txBody>
+      </p:sp>
+      <p:grpSp>
+        <p:nvGrpSpPr>
+          <p:cNvPr id="2" name="Group 1"/>
+          <p:cNvGrpSpPr/>
+          <p:nvPr/>
+        </p:nvGrpSpPr>
+        <p:grpSpPr>
+          <a:xfrm>
+            <a:off x="1109529" y="233018"/>
+            <a:ext cx="7489733" cy="5423298"/>
+            <a:chOff x="1109529" y="233018"/>
+            <a:chExt cx="7489733" cy="5423298"/>
+          </a:xfrm>
+        </p:grpSpPr>
+        <p:sp>
+          <p:nvSpPr>
+            <p:cNvPr id="3" name="Right Triangle 2"/>
+            <p:cNvSpPr/>
+            <p:nvPr/>
+          </p:nvSpPr>
+          <p:spPr>
+            <a:xfrm rot="5400000">
+              <a:off x="2142747" y="-800200"/>
+              <a:ext cx="5423298" cy="7489733"/>
+            </a:xfrm>
+            <a:prstGeom prst="rtTriangle">
+              <a:avLst/>
+            </a:prstGeom>
+            <a:noFill/>
+            <a:ln w="50800">
+              <a:solidFill>
+                <a:srgbClr val="6C0000"/>
+              </a:solidFill>
+            </a:ln>
+            <a:effectLst/>
+          </p:spPr>
+          <p:style>
+            <a:lnRef idx="1">
+              <a:schemeClr val="accent1"/>
+            </a:lnRef>
+            <a:fillRef idx="3">
+              <a:schemeClr val="accent1"/>
+            </a:fillRef>
+            <a:effectRef idx="2">
+              <a:schemeClr val="accent1"/>
+            </a:effectRef>
+            <a:fontRef idx="minor">
+              <a:schemeClr val="lt1"/>
+            </a:fontRef>
+          </p:style>
+          <p:txBody>
+            <a:bodyPr rot="0" spcFirstLastPara="0" vertOverflow="overflow" horzOverflow="overflow" vert="vert270" wrap="square" lIns="0" tIns="0" rIns="0" bIns="0" numCol="1" spcCol="0" rtlCol="0" fromWordArt="0" anchor="t" anchorCtr="0" forceAA="0" compatLnSpc="1">
+              <a:prstTxWarp prst="textNoShape">
+                <a:avLst/>
+              </a:prstTxWarp>
+              <a:noAutofit/>
+            </a:bodyPr>
+            <a:lstStyle/>
+            <a:p>
+              <a:endParaRPr lang="en-US" sz="2800" b="1" dirty="0">
+                <a:solidFill>
+                  <a:srgbClr val="6C0000"/>
+                </a:solidFill>
+              </a:endParaRPr>
+            </a:p>
+          </p:txBody>
+        </p:sp>
+        <p:sp>
+          <p:nvSpPr>
+            <p:cNvPr id="5" name="TextBox 4"/>
+            <p:cNvSpPr txBox="1"/>
+            <p:nvPr/>
+          </p:nvSpPr>
+          <p:spPr>
+            <a:xfrm>
+              <a:off x="1165212" y="287761"/>
+              <a:ext cx="3989293" cy="1384995"/>
+            </a:xfrm>
+            <a:prstGeom prst="rect">
+              <a:avLst/>
+            </a:prstGeom>
+            <a:noFill/>
+          </p:spPr>
+          <p:txBody>
+            <a:bodyPr wrap="none" rtlCol="0">
+              <a:spAutoFit/>
+            </a:bodyPr>
+            <a:lstStyle/>
+            <a:p>
+              <a:r>
+                <a:rPr lang="en-US" sz="2800" b="1" dirty="0">
+                  <a:solidFill>
+                    <a:srgbClr val="6C0000"/>
+                  </a:solidFill>
+                </a:rPr>
+                <a:t>Can’t determine if energy</a:t>
+              </a:r>
+            </a:p>
+            <a:p>
+              <a:r>
+                <a:rPr lang="en-US" sz="2800" b="1" dirty="0">
+                  <a:solidFill>
+                    <a:srgbClr val="6C0000"/>
+                  </a:solidFill>
+                </a:rPr>
+                <a:t>meaningfully contributes</a:t>
+              </a:r>
+            </a:p>
+            <a:p>
+              <a:r>
+                <a:rPr lang="en-US" sz="2800" b="1" dirty="0">
+                  <a:solidFill>
+                    <a:srgbClr val="6C0000"/>
+                  </a:solidFill>
+                </a:rPr>
+                <a:t>to model</a:t>
+              </a:r>
+              <a:endParaRPr lang="en-US" sz="2800" b="1" dirty="0">
+                <a:solidFill>
+                  <a:srgbClr val="6C0000"/>
+                </a:solidFill>
+              </a:endParaRPr>
+            </a:p>
+          </p:txBody>
+        </p:sp>
+      </p:grpSp>
       <p:grpSp>
         <p:nvGrpSpPr>
           <p:cNvPr id="14" name="Group 13"/>
@@ -5296,8 +4451,8 @@
           </p:nvSpPr>
           <p:spPr>
             <a:xfrm>
-              <a:off x="862262" y="5188775"/>
-              <a:ext cx="2283816" cy="738664"/>
+              <a:off x="862262" y="4984655"/>
+              <a:ext cx="2283816" cy="954107"/>
             </a:xfrm>
             <a:prstGeom prst="rect">
               <a:avLst/>
@@ -5312,28 +4467,12 @@
             <a:p>
               <a:pPr algn="r"/>
               <a:r>
-                <a:rPr lang="en-US" sz="1400" b="1" i="1" dirty="0" smtClean="0">
-                  <a:solidFill>
-                    <a:srgbClr val="6C0000"/>
-                  </a:solidFill>
-                </a:rPr>
-                <a:t>kl</a:t>
-              </a:r>
-              <a:r>
                 <a:rPr lang="en-US" sz="1400" b="1" dirty="0" smtClean="0">
                   <a:solidFill>
                     <a:srgbClr val="6C0000"/>
                   </a:solidFill>
                 </a:rPr>
-                <a:t> and </a:t>
-              </a:r>
-              <a:r>
-                <a:rPr lang="en-US" sz="1400" b="1" i="1" dirty="0" smtClean="0">
-                  <a:solidFill>
-                    <a:srgbClr val="6C0000"/>
-                  </a:solidFill>
-                </a:rPr>
-                <a:t>e</a:t>
+                <a:t>Energy </a:t>
               </a:r>
             </a:p>
             <a:p>
@@ -5344,7 +4483,7 @@
                     <a:srgbClr val="6C0000"/>
                   </a:solidFill>
                 </a:rPr>
-                <a:t>are</a:t>
+                <a:t>seemingly </a:t>
               </a:r>
             </a:p>
             <a:p>
@@ -5355,13 +4494,631 @@
                     <a:srgbClr val="6C0000"/>
                   </a:solidFill>
                 </a:rPr>
-                <a:t>complements</a:t>
+                <a:t>unimportant </a:t>
               </a:r>
-              <a:endParaRPr lang="en-US" sz="1400" b="1" dirty="0">
+            </a:p>
+            <a:p>
+              <a:pPr algn="r"/>
+              <a:r>
+                <a:rPr lang="en-US" sz="1400" b="1" dirty="0" smtClean="0">
+                  <a:solidFill>
+                    <a:srgbClr val="6C0000"/>
+                  </a:solidFill>
+                </a:rPr>
+                <a:t>for economic growth</a:t>
+              </a:r>
+            </a:p>
+          </p:txBody>
+        </p:sp>
+      </p:grpSp>
+    </p:spTree>
+    <p:extLst>
+      <p:ext uri="{BB962C8B-B14F-4D97-AF65-F5344CB8AC3E}">
+        <p14:creationId xmlns:p14="http://schemas.microsoft.com/office/powerpoint/2010/main" val="2896014173"/>
+      </p:ext>
+    </p:extLst>
+  </p:cSld>
+  <p:clrMapOvr>
+    <a:masterClrMapping/>
+  </p:clrMapOvr>
+</p:sld>
+</file>
+
+<file path=ppt/slides/slide4.xml><?xml version="1.0" encoding="utf-8"?>
+<p:sld xmlns:a="http://schemas.openxmlformats.org/drawingml/2006/main" xmlns:r="http://schemas.openxmlformats.org/officeDocument/2006/relationships" xmlns:p="http://schemas.openxmlformats.org/presentationml/2006/main">
+  <p:cSld>
+    <p:spTree>
+      <p:nvGrpSpPr>
+        <p:cNvPr id="1" name=""/>
+        <p:cNvGrpSpPr/>
+        <p:nvPr/>
+      </p:nvGrpSpPr>
+      <p:grpSpPr>
+        <a:xfrm>
+          <a:off x="0" y="0"/>
+          <a:ext cx="0" cy="0"/>
+          <a:chOff x="0" y="0"/>
+          <a:chExt cx="0" cy="0"/>
+        </a:xfrm>
+      </p:grpSpPr>
+      <p:cxnSp>
+        <p:nvCxnSpPr>
+          <p:cNvPr id="6" name="Straight Arrow Connector 5"/>
+          <p:cNvCxnSpPr/>
+          <p:nvPr/>
+        </p:nvCxnSpPr>
+        <p:spPr>
+          <a:xfrm>
+            <a:off x="944155" y="6077515"/>
+            <a:ext cx="7957460" cy="0"/>
+          </a:xfrm>
+          <a:prstGeom prst="straightConnector1">
+            <a:avLst/>
+          </a:prstGeom>
+          <a:ln w="50800">
+            <a:solidFill>
+              <a:srgbClr val="6C0000"/>
+            </a:solidFill>
+            <a:tailEnd type="none" w="med" len="med"/>
+          </a:ln>
+          <a:effectLst/>
+        </p:spPr>
+        <p:style>
+          <a:lnRef idx="2">
+            <a:schemeClr val="accent1"/>
+          </a:lnRef>
+          <a:fillRef idx="0">
+            <a:schemeClr val="accent1"/>
+          </a:fillRef>
+          <a:effectRef idx="1">
+            <a:schemeClr val="accent1"/>
+          </a:effectRef>
+          <a:fontRef idx="minor">
+            <a:schemeClr val="tx1"/>
+          </a:fontRef>
+        </p:style>
+      </p:cxnSp>
+      <p:sp>
+        <p:nvSpPr>
+          <p:cNvPr id="11" name="Rectangle 10"/>
+          <p:cNvSpPr/>
+          <p:nvPr/>
+        </p:nvSpPr>
+        <p:spPr>
+          <a:xfrm>
+            <a:off x="4909979" y="6077515"/>
+            <a:ext cx="523801" cy="707886"/>
+          </a:xfrm>
+          <a:prstGeom prst="rect">
+            <a:avLst/>
+          </a:prstGeom>
+        </p:spPr>
+        <p:txBody>
+          <a:bodyPr wrap="none">
+            <a:spAutoFit/>
+          </a:bodyPr>
+          <a:lstStyle/>
+          <a:p>
+            <a:r>
+              <a:rPr lang="en-US" sz="4000" b="1" i="1" dirty="0" smtClean="0">
+                <a:solidFill>
+                  <a:srgbClr val="800000"/>
+                </a:solidFill>
+                <a:latin typeface="Symbol" charset="2"/>
+                <a:cs typeface="Symbol" charset="2"/>
+              </a:rPr>
+              <a:t>g</a:t>
+            </a:r>
+            <a:endParaRPr lang="en-US" sz="4000" b="1" i="1" dirty="0">
+              <a:latin typeface="Symbol" charset="2"/>
+              <a:cs typeface="Symbol" charset="2"/>
+            </a:endParaRPr>
+          </a:p>
+        </p:txBody>
+      </p:sp>
+      <p:sp>
+        <p:nvSpPr>
+          <p:cNvPr id="15" name="Rectangle 14"/>
+          <p:cNvSpPr/>
+          <p:nvPr/>
+        </p:nvSpPr>
+        <p:spPr>
+          <a:xfrm rot="16200000">
+            <a:off x="-964227" y="2754497"/>
+            <a:ext cx="2778158" cy="707886"/>
+          </a:xfrm>
+          <a:prstGeom prst="rect">
+            <a:avLst/>
+          </a:prstGeom>
+        </p:spPr>
+        <p:txBody>
+          <a:bodyPr wrap="none">
+            <a:spAutoFit/>
+          </a:bodyPr>
+          <a:lstStyle/>
+          <a:p>
+            <a:pPr algn="ctr"/>
+            <a:r>
+              <a:rPr lang="en-US" sz="4000" b="1" dirty="0" smtClean="0">
+                <a:solidFill>
+                  <a:srgbClr val="800000"/>
+                </a:solidFill>
+                <a:cs typeface="Symbol" charset="2"/>
+              </a:rPr>
+              <a:t>Width of </a:t>
+            </a:r>
+            <a:r>
+              <a:rPr lang="en-US" sz="4000" b="1" i="1" dirty="0" err="1" smtClean="0">
+                <a:solidFill>
+                  <a:srgbClr val="800000"/>
+                </a:solidFill>
+                <a:cs typeface="Symbol" charset="2"/>
+              </a:rPr>
+              <a:t>CI</a:t>
+            </a:r>
+            <a:r>
+              <a:rPr lang="en-US" sz="4000" b="1" i="1" baseline="-25000" dirty="0" err="1" smtClean="0">
+                <a:solidFill>
+                  <a:srgbClr val="800000"/>
+                </a:solidFill>
+                <a:latin typeface="Symbol" charset="2"/>
+                <a:cs typeface="Symbol" charset="2"/>
+              </a:rPr>
+              <a:t>g</a:t>
+            </a:r>
+            <a:endParaRPr lang="en-US" sz="4000" b="1" i="1" baseline="-25000" dirty="0">
+              <a:latin typeface="Symbol" charset="2"/>
+              <a:cs typeface="Symbol" charset="2"/>
+            </a:endParaRPr>
+          </a:p>
+        </p:txBody>
+      </p:sp>
+      <p:cxnSp>
+        <p:nvCxnSpPr>
+          <p:cNvPr id="16" name="Straight Arrow Connector 15"/>
+          <p:cNvCxnSpPr/>
+          <p:nvPr/>
+        </p:nvCxnSpPr>
+        <p:spPr>
+          <a:xfrm flipV="1">
+            <a:off x="944155" y="90753"/>
+            <a:ext cx="0" cy="6011419"/>
+          </a:xfrm>
+          <a:prstGeom prst="straightConnector1">
+            <a:avLst/>
+          </a:prstGeom>
+          <a:ln w="50800">
+            <a:solidFill>
+              <a:srgbClr val="6C0000"/>
+            </a:solidFill>
+            <a:tailEnd type="none" w="med" len="med"/>
+          </a:ln>
+          <a:effectLst/>
+        </p:spPr>
+        <p:style>
+          <a:lnRef idx="2">
+            <a:schemeClr val="accent1"/>
+          </a:lnRef>
+          <a:fillRef idx="0">
+            <a:schemeClr val="accent1"/>
+          </a:fillRef>
+          <a:effectRef idx="1">
+            <a:schemeClr val="accent1"/>
+          </a:effectRef>
+          <a:fontRef idx="minor">
+            <a:schemeClr val="tx1"/>
+          </a:fontRef>
+        </p:style>
+      </p:cxnSp>
+      <p:sp>
+        <p:nvSpPr>
+          <p:cNvPr id="22" name="Rectangle 21"/>
+          <p:cNvSpPr/>
+          <p:nvPr/>
+        </p:nvSpPr>
+        <p:spPr>
+          <a:xfrm>
+            <a:off x="807136" y="6104697"/>
+            <a:ext cx="302394" cy="338554"/>
+          </a:xfrm>
+          <a:prstGeom prst="rect">
+            <a:avLst/>
+          </a:prstGeom>
+        </p:spPr>
+        <p:txBody>
+          <a:bodyPr wrap="none">
+            <a:spAutoFit/>
+          </a:bodyPr>
+          <a:lstStyle/>
+          <a:p>
+            <a:pPr algn="ctr"/>
+            <a:r>
+              <a:rPr lang="en-US" sz="1600" dirty="0" smtClean="0">
+                <a:solidFill>
+                  <a:srgbClr val="800000"/>
+                </a:solidFill>
+                <a:cs typeface="Symbol" charset="2"/>
+              </a:rPr>
+              <a:t>0</a:t>
+            </a:r>
+            <a:endParaRPr lang="en-US" sz="1600" baseline="-25000" dirty="0">
+              <a:latin typeface="Symbol" charset="2"/>
+              <a:cs typeface="Symbol" charset="2"/>
+            </a:endParaRPr>
+          </a:p>
+        </p:txBody>
+      </p:sp>
+      <p:sp>
+        <p:nvSpPr>
+          <p:cNvPr id="23" name="Rectangle 22"/>
+          <p:cNvSpPr/>
+          <p:nvPr/>
+        </p:nvSpPr>
+        <p:spPr>
+          <a:xfrm>
+            <a:off x="8485766" y="6104697"/>
+            <a:ext cx="302394" cy="338554"/>
+          </a:xfrm>
+          <a:prstGeom prst="rect">
+            <a:avLst/>
+          </a:prstGeom>
+        </p:spPr>
+        <p:txBody>
+          <a:bodyPr wrap="none">
+            <a:spAutoFit/>
+          </a:bodyPr>
+          <a:lstStyle/>
+          <a:p>
+            <a:pPr algn="ctr"/>
+            <a:r>
+              <a:rPr lang="en-US" sz="1600" dirty="0">
+                <a:solidFill>
+                  <a:srgbClr val="800000"/>
+                </a:solidFill>
+                <a:cs typeface="Symbol" charset="2"/>
+              </a:rPr>
+              <a:t>1</a:t>
+            </a:r>
+            <a:endParaRPr lang="en-US" sz="1600" baseline="-25000" dirty="0">
+              <a:latin typeface="Symbol" charset="2"/>
+              <a:cs typeface="Symbol" charset="2"/>
+            </a:endParaRPr>
+          </a:p>
+        </p:txBody>
+      </p:sp>
+      <p:sp>
+        <p:nvSpPr>
+          <p:cNvPr id="12" name="Rectangle 11"/>
+          <p:cNvSpPr/>
+          <p:nvPr/>
+        </p:nvSpPr>
+        <p:spPr>
+          <a:xfrm rot="16200000">
+            <a:off x="561442" y="5738138"/>
+            <a:ext cx="302394" cy="338554"/>
+          </a:xfrm>
+          <a:prstGeom prst="rect">
+            <a:avLst/>
+          </a:prstGeom>
+        </p:spPr>
+        <p:txBody>
+          <a:bodyPr wrap="none">
+            <a:spAutoFit/>
+          </a:bodyPr>
+          <a:lstStyle/>
+          <a:p>
+            <a:pPr algn="ctr"/>
+            <a:r>
+              <a:rPr lang="en-US" sz="1600" dirty="0" smtClean="0">
+                <a:solidFill>
+                  <a:srgbClr val="800000"/>
+                </a:solidFill>
+                <a:cs typeface="Symbol" charset="2"/>
+              </a:rPr>
+              <a:t>0</a:t>
+            </a:r>
+            <a:endParaRPr lang="en-US" sz="1600" baseline="-25000" dirty="0">
+              <a:latin typeface="Symbol" charset="2"/>
+              <a:cs typeface="Symbol" charset="2"/>
+            </a:endParaRPr>
+          </a:p>
+        </p:txBody>
+      </p:sp>
+      <p:sp>
+        <p:nvSpPr>
+          <p:cNvPr id="13" name="Rectangle 12"/>
+          <p:cNvSpPr/>
+          <p:nvPr/>
+        </p:nvSpPr>
+        <p:spPr>
+          <a:xfrm rot="16200000">
+            <a:off x="568308" y="72573"/>
+            <a:ext cx="288661" cy="338554"/>
+          </a:xfrm>
+          <a:prstGeom prst="rect">
+            <a:avLst/>
+          </a:prstGeom>
+        </p:spPr>
+        <p:txBody>
+          <a:bodyPr wrap="none">
+            <a:spAutoFit/>
+          </a:bodyPr>
+          <a:lstStyle/>
+          <a:p>
+            <a:pPr algn="ctr"/>
+            <a:r>
+              <a:rPr lang="en-US" sz="1600" dirty="0" smtClean="0">
+                <a:solidFill>
+                  <a:srgbClr val="800000"/>
+                </a:solidFill>
+                <a:cs typeface="Symbol" charset="2"/>
+              </a:rPr>
+              <a:t>2</a:t>
+            </a:r>
+            <a:endParaRPr lang="en-US" sz="1600" baseline="-25000" dirty="0">
+              <a:latin typeface="Symbol" charset="2"/>
+              <a:cs typeface="Symbol" charset="2"/>
+            </a:endParaRPr>
+          </a:p>
+        </p:txBody>
+      </p:sp>
+      <p:grpSp>
+        <p:nvGrpSpPr>
+          <p:cNvPr id="2" name="Group 1"/>
+          <p:cNvGrpSpPr/>
+          <p:nvPr/>
+        </p:nvGrpSpPr>
+        <p:grpSpPr>
+          <a:xfrm>
+            <a:off x="1109529" y="233018"/>
+            <a:ext cx="7489733" cy="5423298"/>
+            <a:chOff x="1109529" y="233018"/>
+            <a:chExt cx="7489733" cy="5423298"/>
+          </a:xfrm>
+        </p:grpSpPr>
+        <p:sp>
+          <p:nvSpPr>
+            <p:cNvPr id="3" name="Right Triangle 2"/>
+            <p:cNvSpPr/>
+            <p:nvPr/>
+          </p:nvSpPr>
+          <p:spPr>
+            <a:xfrm rot="5400000">
+              <a:off x="2142747" y="-800200"/>
+              <a:ext cx="5423298" cy="7489733"/>
+            </a:xfrm>
+            <a:prstGeom prst="rtTriangle">
+              <a:avLst/>
+            </a:prstGeom>
+            <a:noFill/>
+            <a:ln w="50800">
+              <a:solidFill>
+                <a:srgbClr val="6C0000"/>
+              </a:solidFill>
+            </a:ln>
+            <a:effectLst/>
+          </p:spPr>
+          <p:style>
+            <a:lnRef idx="1">
+              <a:schemeClr val="accent1"/>
+            </a:lnRef>
+            <a:fillRef idx="3">
+              <a:schemeClr val="accent1"/>
+            </a:fillRef>
+            <a:effectRef idx="2">
+              <a:schemeClr val="accent1"/>
+            </a:effectRef>
+            <a:fontRef idx="minor">
+              <a:schemeClr val="lt1"/>
+            </a:fontRef>
+          </p:style>
+          <p:txBody>
+            <a:bodyPr rot="0" spcFirstLastPara="0" vertOverflow="overflow" horzOverflow="overflow" vert="vert270" wrap="square" lIns="0" tIns="0" rIns="0" bIns="0" numCol="1" spcCol="0" rtlCol="0" fromWordArt="0" anchor="t" anchorCtr="0" forceAA="0" compatLnSpc="1">
+              <a:prstTxWarp prst="textNoShape">
+                <a:avLst/>
+              </a:prstTxWarp>
+              <a:noAutofit/>
+            </a:bodyPr>
+            <a:lstStyle/>
+            <a:p>
+              <a:endParaRPr lang="en-US" sz="2800" b="1" dirty="0">
                 <a:solidFill>
                   <a:srgbClr val="6C0000"/>
                 </a:solidFill>
               </a:endParaRPr>
+            </a:p>
+          </p:txBody>
+        </p:sp>
+        <p:sp>
+          <p:nvSpPr>
+            <p:cNvPr id="5" name="TextBox 4"/>
+            <p:cNvSpPr txBox="1"/>
+            <p:nvPr/>
+          </p:nvSpPr>
+          <p:spPr>
+            <a:xfrm>
+              <a:off x="1165212" y="287761"/>
+              <a:ext cx="3989293" cy="1384995"/>
+            </a:xfrm>
+            <a:prstGeom prst="rect">
+              <a:avLst/>
+            </a:prstGeom>
+            <a:noFill/>
+          </p:spPr>
+          <p:txBody>
+            <a:bodyPr wrap="none" rtlCol="0">
+              <a:spAutoFit/>
+            </a:bodyPr>
+            <a:lstStyle/>
+            <a:p>
+              <a:r>
+                <a:rPr lang="en-US" sz="2800" b="1" dirty="0">
+                  <a:solidFill>
+                    <a:srgbClr val="6C0000"/>
+                  </a:solidFill>
+                </a:rPr>
+                <a:t>Can’t determine if energy</a:t>
+              </a:r>
+            </a:p>
+            <a:p>
+              <a:r>
+                <a:rPr lang="en-US" sz="2800" b="1" dirty="0">
+                  <a:solidFill>
+                    <a:srgbClr val="6C0000"/>
+                  </a:solidFill>
+                </a:rPr>
+                <a:t>meaningfully contributes</a:t>
+              </a:r>
+            </a:p>
+            <a:p>
+              <a:r>
+                <a:rPr lang="en-US" sz="2800" b="1" dirty="0">
+                  <a:solidFill>
+                    <a:srgbClr val="6C0000"/>
+                  </a:solidFill>
+                </a:rPr>
+                <a:t>to model</a:t>
+              </a:r>
+              <a:endParaRPr lang="en-US" sz="2800" b="1" dirty="0">
+                <a:solidFill>
+                  <a:srgbClr val="6C0000"/>
+                </a:solidFill>
+              </a:endParaRPr>
+            </a:p>
+          </p:txBody>
+        </p:sp>
+      </p:grpSp>
+      <p:grpSp>
+        <p:nvGrpSpPr>
+          <p:cNvPr id="14" name="Group 13"/>
+          <p:cNvGrpSpPr/>
+          <p:nvPr/>
+        </p:nvGrpSpPr>
+        <p:grpSpPr>
+          <a:xfrm>
+            <a:off x="1055042" y="4497518"/>
+            <a:ext cx="2283816" cy="1442049"/>
+            <a:chOff x="862262" y="4497518"/>
+            <a:chExt cx="2283816" cy="1442049"/>
+          </a:xfrm>
+        </p:grpSpPr>
+        <p:sp>
+          <p:nvSpPr>
+            <p:cNvPr id="7" name="Right Triangle 6"/>
+            <p:cNvSpPr/>
+            <p:nvPr/>
+          </p:nvSpPr>
+          <p:spPr>
+            <a:xfrm flipH="1">
+              <a:off x="1109528" y="4497518"/>
+              <a:ext cx="2036544" cy="1442049"/>
+            </a:xfrm>
+            <a:prstGeom prst="rtTriangle">
+              <a:avLst/>
+            </a:prstGeom>
+            <a:noFill/>
+            <a:ln w="50800">
+              <a:solidFill>
+                <a:srgbClr val="6C0000"/>
+              </a:solidFill>
+            </a:ln>
+            <a:effectLst/>
+          </p:spPr>
+          <p:style>
+            <a:lnRef idx="1">
+              <a:schemeClr val="accent1"/>
+            </a:lnRef>
+            <a:fillRef idx="3">
+              <a:schemeClr val="accent1"/>
+            </a:fillRef>
+            <a:effectRef idx="2">
+              <a:schemeClr val="accent1"/>
+            </a:effectRef>
+            <a:fontRef idx="minor">
+              <a:schemeClr val="lt1"/>
+            </a:fontRef>
+          </p:style>
+          <p:txBody>
+            <a:bodyPr rot="0" spcFirstLastPara="0" vertOverflow="overflow" horzOverflow="overflow" vert="vert270" wrap="square" lIns="0" tIns="0" rIns="0" bIns="0" numCol="1" spcCol="0" rtlCol="0" fromWordArt="0" anchor="t" anchorCtr="0" forceAA="0" compatLnSpc="1">
+              <a:prstTxWarp prst="textNoShape">
+                <a:avLst/>
+              </a:prstTxWarp>
+              <a:noAutofit/>
+            </a:bodyPr>
+            <a:lstStyle/>
+            <a:p>
+              <a:endParaRPr lang="en-US" sz="2800" b="1">
+                <a:solidFill>
+                  <a:srgbClr val="6C0000"/>
+                </a:solidFill>
+              </a:endParaRPr>
+            </a:p>
+          </p:txBody>
+        </p:sp>
+        <p:sp>
+          <p:nvSpPr>
+            <p:cNvPr id="17" name="TextBox 16"/>
+            <p:cNvSpPr txBox="1"/>
+            <p:nvPr/>
+          </p:nvSpPr>
+          <p:spPr>
+            <a:xfrm>
+              <a:off x="862262" y="4984655"/>
+              <a:ext cx="2283816" cy="954107"/>
+            </a:xfrm>
+            <a:prstGeom prst="rect">
+              <a:avLst/>
+            </a:prstGeom>
+            <a:noFill/>
+          </p:spPr>
+          <p:txBody>
+            <a:bodyPr wrap="square" rtlCol="0">
+              <a:spAutoFit/>
+            </a:bodyPr>
+            <a:lstStyle/>
+            <a:p>
+              <a:pPr algn="r"/>
+              <a:r>
+                <a:rPr lang="en-US" sz="1400" b="1" dirty="0" smtClean="0">
+                  <a:solidFill>
+                    <a:srgbClr val="6C0000"/>
+                  </a:solidFill>
+                </a:rPr>
+                <a:t>Energy </a:t>
+              </a:r>
+            </a:p>
+            <a:p>
+              <a:pPr algn="r"/>
+              <a:r>
+                <a:rPr lang="en-US" sz="1400" b="1" dirty="0" smtClean="0">
+                  <a:solidFill>
+                    <a:srgbClr val="6C0000"/>
+                  </a:solidFill>
+                </a:rPr>
+                <a:t>seemingly </a:t>
+              </a:r>
+            </a:p>
+            <a:p>
+              <a:pPr algn="r"/>
+              <a:r>
+                <a:rPr lang="en-US" sz="1400" b="1" dirty="0" smtClean="0">
+                  <a:solidFill>
+                    <a:srgbClr val="6C0000"/>
+                  </a:solidFill>
+                </a:rPr>
+                <a:t>unimportant </a:t>
+              </a:r>
+            </a:p>
+            <a:p>
+              <a:pPr algn="r"/>
+              <a:r>
+                <a:rPr lang="en-US" sz="1400" b="1" dirty="0" smtClean="0">
+                  <a:solidFill>
+                    <a:srgbClr val="6C0000"/>
+                  </a:solidFill>
+                </a:rPr>
+                <a:t>for economic growth</a:t>
+              </a:r>
             </a:p>
           </p:txBody>
         </p:sp>
@@ -5512,8 +5269,8 @@
           </p:nvSpPr>
           <p:spPr>
             <a:xfrm>
-              <a:off x="5096246" y="4897709"/>
-              <a:ext cx="3305042" cy="954107"/>
+              <a:off x="5767799" y="3979169"/>
+              <a:ext cx="2633488" cy="1815882"/>
             </a:xfrm>
             <a:prstGeom prst="rect">
               <a:avLst/>
@@ -5528,12 +5285,34 @@
             <a:p>
               <a:pPr algn="r"/>
               <a:r>
-                <a:rPr lang="en-US" sz="2800" b="1" i="1" dirty="0" smtClean="0">
+                <a:rPr lang="en-US" sz="2800" b="1" dirty="0" smtClean="0">
                   <a:solidFill>
                     <a:srgbClr val="6C0000"/>
                   </a:solidFill>
                 </a:rPr>
-                <a:t>kl</a:t>
+                <a:t>Energy</a:t>
+              </a:r>
+            </a:p>
+            <a:p>
+              <a:pPr algn="r"/>
+              <a:r>
+                <a:rPr lang="en-US" sz="2800" b="1" dirty="0" smtClean="0">
+                  <a:solidFill>
+                    <a:srgbClr val="6C0000"/>
+                  </a:solidFill>
+                </a:rPr>
+                <a:t>significant</a:t>
+              </a:r>
+            </a:p>
+            <a:p>
+              <a:pPr algn="r"/>
+              <a:r>
+                <a:rPr lang="en-US" sz="2800" b="1" dirty="0">
+                  <a:solidFill>
+                    <a:srgbClr val="6C0000"/>
+                  </a:solidFill>
+                </a:rPr>
+                <a:t>f</a:t>
               </a:r>
               <a:r>
                 <a:rPr lang="en-US" sz="2800" b="1" dirty="0" smtClean="0">
@@ -5541,23 +5320,18 @@
                     <a:srgbClr val="6C0000"/>
                   </a:solidFill>
                 </a:rPr>
-                <a:t> and </a:t>
+                <a:t>or economic</a:t>
               </a:r>
-              <a:r>
-                <a:rPr lang="en-US" sz="2800" b="1" i="1" dirty="0" smtClean="0">
-                  <a:solidFill>
-                    <a:srgbClr val="6C0000"/>
-                  </a:solidFill>
-                </a:rPr>
-                <a:t>e</a:t>
-              </a:r>
+            </a:p>
+            <a:p>
+              <a:pPr algn="r"/>
               <a:r>
                 <a:rPr lang="en-US" sz="2800" b="1" dirty="0" smtClean="0">
                   <a:solidFill>
                     <a:srgbClr val="6C0000"/>
                   </a:solidFill>
                 </a:rPr>
-                <a:t> are substitutes</a:t>
+                <a:t>growth</a:t>
               </a:r>
               <a:endParaRPr lang="en-US" sz="2800" b="1" dirty="0">
                 <a:solidFill>
@@ -5571,7 +5345,7 @@
     </p:spTree>
     <p:extLst>
       <p:ext uri="{BB962C8B-B14F-4D97-AF65-F5344CB8AC3E}">
-        <p14:creationId xmlns:p14="http://schemas.microsoft.com/office/powerpoint/2010/main" val="13516895"/>
+        <p14:creationId xmlns:p14="http://schemas.microsoft.com/office/powerpoint/2010/main" val="2162229144"/>
       </p:ext>
     </p:extLst>
   </p:cSld>
@@ -5581,7 +5355,7 @@
 </p:sld>
 </file>
 
-<file path=ppt/slides/slide6.xml><?xml version="1.0" encoding="utf-8"?>
+<file path=ppt/slides/slide5.xml><?xml version="1.0" encoding="utf-8"?>
 <p:sld xmlns:a="http://schemas.openxmlformats.org/drawingml/2006/main" xmlns:r="http://schemas.openxmlformats.org/officeDocument/2006/relationships" xmlns:p="http://schemas.openxmlformats.org/presentationml/2006/main">
   <p:cSld>
     <p:spTree>
@@ -6398,7 +6172,7 @@
 </p:sld>
 </file>
 
-<file path=ppt/slides/slide7.xml><?xml version="1.0" encoding="utf-8"?>
+<file path=ppt/slides/slide6.xml><?xml version="1.0" encoding="utf-8"?>
 <p:sld xmlns:a="http://schemas.openxmlformats.org/drawingml/2006/main" xmlns:r="http://schemas.openxmlformats.org/officeDocument/2006/relationships" xmlns:p="http://schemas.openxmlformats.org/presentationml/2006/main">
   <p:cSld>
     <p:spTree>
@@ -6461,7 +6235,7 @@
         <p:spPr>
           <a:xfrm>
             <a:off x="4909979" y="6077515"/>
-            <a:ext cx="523801" cy="707886"/>
+            <a:ext cx="622236" cy="707886"/>
           </a:xfrm>
           <a:prstGeom prst="rect">
             <a:avLst/>
@@ -6481,7 +6255,7 @@
                 <a:latin typeface="Symbol" charset="2"/>
                 <a:cs typeface="Symbol" charset="2"/>
               </a:rPr>
-              <a:t>g</a:t>
+              <a:t>s</a:t>
             </a:r>
             <a:endParaRPr lang="en-US" sz="4000" b="1" i="1" dirty="0">
               <a:latin typeface="Symbol" charset="2"/>
@@ -6498,8 +6272,8 @@
         </p:nvSpPr>
         <p:spPr>
           <a:xfrm rot="16200000">
-            <a:off x="-964227" y="2754497"/>
-            <a:ext cx="2778158" cy="707886"/>
+            <a:off x="-997038" y="2754497"/>
+            <a:ext cx="2843780" cy="707886"/>
           </a:xfrm>
           <a:prstGeom prst="rect">
             <a:avLst/>
@@ -6522,7 +6296,7 @@
               <a:t>Width of </a:t>
             </a:r>
             <a:r>
-              <a:rPr lang="en-US" sz="4000" b="1" i="1" dirty="0" err="1" smtClean="0">
+              <a:rPr lang="en-US" sz="4000" b="1" i="1" dirty="0" smtClean="0">
                 <a:solidFill>
                   <a:srgbClr val="800000"/>
                 </a:solidFill>
@@ -6531,14 +6305,14 @@
               <a:t>CI</a:t>
             </a:r>
             <a:r>
-              <a:rPr lang="en-US" sz="4000" b="1" i="1" baseline="-25000" dirty="0" err="1" smtClean="0">
+              <a:rPr lang="en-US" sz="4000" b="1" i="1" baseline="-25000" dirty="0" smtClean="0">
                 <a:solidFill>
                   <a:srgbClr val="800000"/>
                 </a:solidFill>
                 <a:latin typeface="Symbol" charset="2"/>
                 <a:cs typeface="Symbol" charset="2"/>
               </a:rPr>
-              <a:t>g</a:t>
+              <a:t>s</a:t>
             </a:r>
             <a:endParaRPr lang="en-US" sz="4000" b="1" i="1" baseline="-25000" dirty="0">
               <a:latin typeface="Symbol" charset="2"/>
@@ -6937,8 +6711,8 @@
           </p:nvSpPr>
           <p:spPr>
             <a:xfrm>
-              <a:off x="862262" y="4984655"/>
-              <a:ext cx="2283816" cy="954107"/>
+              <a:off x="862262" y="5188775"/>
+              <a:ext cx="2283816" cy="738664"/>
             </a:xfrm>
             <a:prstGeom prst="rect">
               <a:avLst/>
@@ -6953,12 +6727,28 @@
             <a:p>
               <a:pPr algn="r"/>
               <a:r>
+                <a:rPr lang="en-US" sz="1400" b="1" i="1" dirty="0" smtClean="0">
+                  <a:solidFill>
+                    <a:srgbClr val="6C0000"/>
+                  </a:solidFill>
+                </a:rPr>
+                <a:t>kl</a:t>
+              </a:r>
+              <a:r>
                 <a:rPr lang="en-US" sz="1400" b="1" dirty="0" smtClean="0">
                   <a:solidFill>
                     <a:srgbClr val="6C0000"/>
                   </a:solidFill>
                 </a:rPr>
-                <a:t>Energy </a:t>
+                <a:t> and </a:t>
+              </a:r>
+              <a:r>
+                <a:rPr lang="en-US" sz="1400" b="1" i="1" dirty="0" smtClean="0">
+                  <a:solidFill>
+                    <a:srgbClr val="6C0000"/>
+                  </a:solidFill>
+                </a:rPr>
+                <a:t>e</a:t>
               </a:r>
             </a:p>
             <a:p>
@@ -6969,7 +6759,7 @@
                     <a:srgbClr val="6C0000"/>
                   </a:solidFill>
                 </a:rPr>
-                <a:t>seemingly </a:t>
+                <a:t>are</a:t>
               </a:r>
             </a:p>
             <a:p>
@@ -6980,19 +6770,13 @@
                     <a:srgbClr val="6C0000"/>
                   </a:solidFill>
                 </a:rPr>
-                <a:t>unimportant </a:t>
+                <a:t>complements</a:t>
               </a:r>
-            </a:p>
-            <a:p>
-              <a:pPr algn="r"/>
-              <a:r>
-                <a:rPr lang="en-US" sz="1400" b="1" dirty="0" smtClean="0">
-                  <a:solidFill>
-                    <a:srgbClr val="6C0000"/>
-                  </a:solidFill>
-                </a:rPr>
-                <a:t>for economic growth</a:t>
-              </a:r>
+              <a:endParaRPr lang="en-US" sz="1400" b="1" dirty="0">
+                <a:solidFill>
+                  <a:srgbClr val="6C0000"/>
+                </a:solidFill>
+              </a:endParaRPr>
             </a:p>
           </p:txBody>
         </p:sp>
@@ -7143,8 +6927,8 @@
           </p:nvSpPr>
           <p:spPr>
             <a:xfrm>
-              <a:off x="5767799" y="3979169"/>
-              <a:ext cx="2633488" cy="1815882"/>
+              <a:off x="5096246" y="4897709"/>
+              <a:ext cx="3305042" cy="954107"/>
             </a:xfrm>
             <a:prstGeom prst="rect">
               <a:avLst/>
@@ -7159,34 +6943,12 @@
             <a:p>
               <a:pPr algn="r"/>
               <a:r>
-                <a:rPr lang="en-US" sz="2800" b="1" dirty="0" smtClean="0">
+                <a:rPr lang="en-US" sz="2800" b="1" i="1" dirty="0" smtClean="0">
                   <a:solidFill>
                     <a:srgbClr val="6C0000"/>
                   </a:solidFill>
                 </a:rPr>
-                <a:t>Energy</a:t>
-              </a:r>
-            </a:p>
-            <a:p>
-              <a:pPr algn="r"/>
-              <a:r>
-                <a:rPr lang="en-US" sz="2800" b="1" dirty="0" smtClean="0">
-                  <a:solidFill>
-                    <a:srgbClr val="6C0000"/>
-                  </a:solidFill>
-                </a:rPr>
-                <a:t>significant</a:t>
-              </a:r>
-            </a:p>
-            <a:p>
-              <a:pPr algn="r"/>
-              <a:r>
-                <a:rPr lang="en-US" sz="2800" b="1" dirty="0">
-                  <a:solidFill>
-                    <a:srgbClr val="6C0000"/>
-                  </a:solidFill>
-                </a:rPr>
-                <a:t>f</a:t>
+                <a:t>kl</a:t>
               </a:r>
               <a:r>
                 <a:rPr lang="en-US" sz="2800" b="1" dirty="0" smtClean="0">
@@ -7194,18 +6956,23 @@
                     <a:srgbClr val="6C0000"/>
                   </a:solidFill>
                 </a:rPr>
-                <a:t>or economic</a:t>
+                <a:t> and </a:t>
               </a:r>
-            </a:p>
-            <a:p>
-              <a:pPr algn="r"/>
+              <a:r>
+                <a:rPr lang="en-US" sz="2800" b="1" i="1" dirty="0" smtClean="0">
+                  <a:solidFill>
+                    <a:srgbClr val="6C0000"/>
+                  </a:solidFill>
+                </a:rPr>
+                <a:t>e</a:t>
+              </a:r>
               <a:r>
                 <a:rPr lang="en-US" sz="2800" b="1" dirty="0" smtClean="0">
                   <a:solidFill>
                     <a:srgbClr val="6C0000"/>
                   </a:solidFill>
                 </a:rPr>
-                <a:t>growth</a:t>
+                <a:t> are substitutes</a:t>
               </a:r>
               <a:endParaRPr lang="en-US" sz="2800" b="1" dirty="0">
                 <a:solidFill>
@@ -7219,7 +6986,7 @@
     </p:spTree>
     <p:extLst>
       <p:ext uri="{BB962C8B-B14F-4D97-AF65-F5344CB8AC3E}">
-        <p14:creationId xmlns:p14="http://schemas.microsoft.com/office/powerpoint/2010/main" val="4234590376"/>
+        <p14:creationId xmlns:p14="http://schemas.microsoft.com/office/powerpoint/2010/main" val="13516895"/>
       </p:ext>
     </p:extLst>
   </p:cSld>
@@ -7229,7 +6996,7 @@
 </p:sld>
 </file>
 
-<file path=ppt/slides/slide8.xml><?xml version="1.0" encoding="utf-8"?>
+<file path=ppt/slides/slide7.xml><?xml version="1.0" encoding="utf-8"?>
 <p:sld xmlns:a="http://schemas.openxmlformats.org/drawingml/2006/main" xmlns:r="http://schemas.openxmlformats.org/officeDocument/2006/relationships" xmlns:p="http://schemas.openxmlformats.org/presentationml/2006/main">
   <p:cSld>
     <p:spTree>
@@ -7254,7 +7021,7 @@
         </p:nvSpPr>
         <p:spPr>
           <a:xfrm>
-            <a:off x="3288495" y="2097941"/>
+            <a:off x="4070955" y="2097941"/>
             <a:ext cx="3039023" cy="2245365"/>
           </a:xfrm>
           <a:prstGeom prst="roundRect">
@@ -7313,7 +7080,7 @@
         </p:nvCxnSpPr>
         <p:spPr>
           <a:xfrm>
-            <a:off x="6327518" y="3220624"/>
+            <a:off x="7109978" y="3220624"/>
             <a:ext cx="1111284" cy="11340"/>
           </a:xfrm>
           <a:prstGeom prst="straightConnector1">
@@ -7350,7 +7117,7 @@
         </p:nvCxnSpPr>
         <p:spPr>
           <a:xfrm>
-            <a:off x="2177211" y="2438149"/>
+            <a:off x="2959671" y="2438149"/>
             <a:ext cx="1111284" cy="11340"/>
           </a:xfrm>
           <a:prstGeom prst="straightConnector1">
@@ -7387,7 +7154,7 @@
         </p:nvCxnSpPr>
         <p:spPr>
           <a:xfrm>
-            <a:off x="2177211" y="3209284"/>
+            <a:off x="2959671" y="3209284"/>
             <a:ext cx="1111284" cy="11340"/>
           </a:xfrm>
           <a:prstGeom prst="straightConnector1">
@@ -7424,7 +7191,7 @@
         </p:nvCxnSpPr>
         <p:spPr>
           <a:xfrm>
-            <a:off x="2177211" y="3980420"/>
+            <a:off x="2959671" y="3980420"/>
             <a:ext cx="1111284" cy="11340"/>
           </a:xfrm>
           <a:prstGeom prst="straightConnector1">
@@ -7462,7 +7229,7 @@
         </p:nvSpPr>
         <p:spPr>
           <a:xfrm>
-            <a:off x="7438802" y="2897458"/>
+            <a:off x="8221262" y="2897458"/>
             <a:ext cx="537477" cy="646331"/>
           </a:xfrm>
           <a:prstGeom prst="rect">
@@ -7495,7 +7262,7 @@
         </p:nvSpPr>
         <p:spPr>
           <a:xfrm>
-            <a:off x="1553530" y="2114983"/>
+            <a:off x="2335990" y="2114983"/>
             <a:ext cx="550100" cy="646331"/>
           </a:xfrm>
           <a:prstGeom prst="rect">
@@ -7528,7 +7295,7 @@
         </p:nvSpPr>
         <p:spPr>
           <a:xfrm>
-            <a:off x="1553530" y="2818078"/>
+            <a:off x="2335990" y="2818078"/>
             <a:ext cx="492843" cy="646331"/>
           </a:xfrm>
           <a:prstGeom prst="rect">
@@ -7561,7 +7328,7 @@
         </p:nvSpPr>
         <p:spPr>
           <a:xfrm>
-            <a:off x="882754" y="3623234"/>
+            <a:off x="1665214" y="3623234"/>
             <a:ext cx="1813092" cy="1200329"/>
           </a:xfrm>
           <a:prstGeom prst="rect">
@@ -7646,6 +7413,99 @@
           </a:p>
         </p:txBody>
       </p:sp>
+      <p:grpSp>
+        <p:nvGrpSpPr>
+          <p:cNvPr id="3" name="Group 2"/>
+          <p:cNvGrpSpPr/>
+          <p:nvPr/>
+        </p:nvGrpSpPr>
+        <p:grpSpPr>
+          <a:xfrm>
+            <a:off x="871578" y="1999244"/>
+            <a:ext cx="874746" cy="2465438"/>
+            <a:chOff x="304578" y="1987904"/>
+            <a:chExt cx="874746" cy="2465438"/>
+          </a:xfrm>
+        </p:grpSpPr>
+        <p:sp>
+          <p:nvSpPr>
+            <p:cNvPr id="2" name="Left Brace 1"/>
+            <p:cNvSpPr/>
+            <p:nvPr/>
+          </p:nvSpPr>
+          <p:spPr>
+            <a:xfrm>
+              <a:off x="827795" y="2245364"/>
+              <a:ext cx="351529" cy="1961859"/>
+            </a:xfrm>
+            <a:prstGeom prst="leftBrace">
+              <a:avLst/>
+            </a:prstGeom>
+            <a:ln w="50800">
+              <a:solidFill>
+                <a:srgbClr val="6C0000"/>
+              </a:solidFill>
+            </a:ln>
+            <a:effectLst/>
+          </p:spPr>
+          <p:style>
+            <a:lnRef idx="2">
+              <a:schemeClr val="accent1"/>
+            </a:lnRef>
+            <a:fillRef idx="0">
+              <a:schemeClr val="accent1"/>
+            </a:fillRef>
+            <a:effectRef idx="1">
+              <a:schemeClr val="accent1"/>
+            </a:effectRef>
+            <a:fontRef idx="minor">
+              <a:schemeClr val="tx1"/>
+            </a:fontRef>
+          </p:style>
+          <p:txBody>
+            <a:bodyPr rtlCol="0" anchor="ctr"/>
+            <a:lstStyle/>
+            <a:p>
+              <a:pPr algn="ctr"/>
+              <a:endParaRPr lang="en-US"/>
+            </a:p>
+          </p:txBody>
+        </p:sp>
+        <p:sp>
+          <p:nvSpPr>
+            <p:cNvPr id="15" name="Rectangle 14"/>
+            <p:cNvSpPr/>
+            <p:nvPr/>
+          </p:nvSpPr>
+          <p:spPr>
+            <a:xfrm rot="16200000">
+              <a:off x="-728086" y="3020568"/>
+              <a:ext cx="2465438" cy="400110"/>
+            </a:xfrm>
+            <a:prstGeom prst="rect">
+              <a:avLst/>
+            </a:prstGeom>
+          </p:spPr>
+          <p:txBody>
+            <a:bodyPr wrap="none">
+              <a:spAutoFit/>
+            </a:bodyPr>
+            <a:lstStyle/>
+            <a:p>
+              <a:pPr algn="ctr"/>
+              <a:r>
+                <a:rPr lang="en-US" sz="2000" b="1" dirty="0" smtClean="0">
+                  <a:solidFill>
+                    <a:srgbClr val="800000"/>
+                  </a:solidFill>
+                </a:rPr>
+                <a:t>Factors of Production</a:t>
+              </a:r>
+              <a:endParaRPr lang="en-US" sz="2000" dirty="0"/>
+            </a:p>
+          </p:txBody>
+        </p:sp>
+      </p:grpSp>
     </p:spTree>
     <p:extLst>
       <p:ext uri="{BB962C8B-B14F-4D97-AF65-F5344CB8AC3E}">

</xml_diff>

<commit_message>
Now including Caleb's inputs.
</commit_message>
<xml_diff>
--- a/figure_other/Seminar Figures.pptx
+++ b/figure_other/Seminar Figures.pptx
@@ -5,13 +5,14 @@
     <p:sldMasterId id="2147483648" r:id="rId1"/>
   </p:sldMasterIdLst>
   <p:sldIdLst>
-    <p:sldId id="280" r:id="rId2"/>
-    <p:sldId id="282" r:id="rId3"/>
-    <p:sldId id="283" r:id="rId4"/>
-    <p:sldId id="284" r:id="rId5"/>
-    <p:sldId id="281" r:id="rId6"/>
-    <p:sldId id="279" r:id="rId7"/>
-    <p:sldId id="256" r:id="rId8"/>
+    <p:sldId id="285" r:id="rId2"/>
+    <p:sldId id="280" r:id="rId3"/>
+    <p:sldId id="282" r:id="rId4"/>
+    <p:sldId id="283" r:id="rId5"/>
+    <p:sldId id="284" r:id="rId6"/>
+    <p:sldId id="281" r:id="rId7"/>
+    <p:sldId id="279" r:id="rId8"/>
+    <p:sldId id="256" r:id="rId9"/>
   </p:sldIdLst>
   <p:sldSz cx="9144000" cy="6858000" type="screen4x3"/>
   <p:notesSz cx="6858000" cy="9144000"/>
@@ -294,7 +295,7 @@
           <a:p>
             <a:fld id="{392B46AE-74E1-BB46-A59A-36DBA27128E6}" type="datetimeFigureOut">
               <a:rPr lang="en-US" smtClean="0"/>
-              <a:t>25-Mar-13</a:t>
+              <a:t>29-Mar-13</a:t>
             </a:fld>
             <a:endParaRPr lang="en-US"/>
           </a:p>
@@ -464,7 +465,7 @@
           <a:p>
             <a:fld id="{392B46AE-74E1-BB46-A59A-36DBA27128E6}" type="datetimeFigureOut">
               <a:rPr lang="en-US" smtClean="0"/>
-              <a:t>25-Mar-13</a:t>
+              <a:t>29-Mar-13</a:t>
             </a:fld>
             <a:endParaRPr lang="en-US"/>
           </a:p>
@@ -644,7 +645,7 @@
           <a:p>
             <a:fld id="{392B46AE-74E1-BB46-A59A-36DBA27128E6}" type="datetimeFigureOut">
               <a:rPr lang="en-US" smtClean="0"/>
-              <a:t>25-Mar-13</a:t>
+              <a:t>29-Mar-13</a:t>
             </a:fld>
             <a:endParaRPr lang="en-US"/>
           </a:p>
@@ -814,7 +815,7 @@
           <a:p>
             <a:fld id="{392B46AE-74E1-BB46-A59A-36DBA27128E6}" type="datetimeFigureOut">
               <a:rPr lang="en-US" smtClean="0"/>
-              <a:t>25-Mar-13</a:t>
+              <a:t>29-Mar-13</a:t>
             </a:fld>
             <a:endParaRPr lang="en-US"/>
           </a:p>
@@ -1060,7 +1061,7 @@
           <a:p>
             <a:fld id="{392B46AE-74E1-BB46-A59A-36DBA27128E6}" type="datetimeFigureOut">
               <a:rPr lang="en-US" smtClean="0"/>
-              <a:t>25-Mar-13</a:t>
+              <a:t>29-Mar-13</a:t>
             </a:fld>
             <a:endParaRPr lang="en-US"/>
           </a:p>
@@ -1348,7 +1349,7 @@
           <a:p>
             <a:fld id="{392B46AE-74E1-BB46-A59A-36DBA27128E6}" type="datetimeFigureOut">
               <a:rPr lang="en-US" smtClean="0"/>
-              <a:t>25-Mar-13</a:t>
+              <a:t>29-Mar-13</a:t>
             </a:fld>
             <a:endParaRPr lang="en-US"/>
           </a:p>
@@ -1770,7 +1771,7 @@
           <a:p>
             <a:fld id="{392B46AE-74E1-BB46-A59A-36DBA27128E6}" type="datetimeFigureOut">
               <a:rPr lang="en-US" smtClean="0"/>
-              <a:t>25-Mar-13</a:t>
+              <a:t>29-Mar-13</a:t>
             </a:fld>
             <a:endParaRPr lang="en-US"/>
           </a:p>
@@ -1888,7 +1889,7 @@
           <a:p>
             <a:fld id="{392B46AE-74E1-BB46-A59A-36DBA27128E6}" type="datetimeFigureOut">
               <a:rPr lang="en-US" smtClean="0"/>
-              <a:t>25-Mar-13</a:t>
+              <a:t>29-Mar-13</a:t>
             </a:fld>
             <a:endParaRPr lang="en-US"/>
           </a:p>
@@ -1983,7 +1984,7 @@
           <a:p>
             <a:fld id="{392B46AE-74E1-BB46-A59A-36DBA27128E6}" type="datetimeFigureOut">
               <a:rPr lang="en-US" smtClean="0"/>
-              <a:t>25-Mar-13</a:t>
+              <a:t>29-Mar-13</a:t>
             </a:fld>
             <a:endParaRPr lang="en-US"/>
           </a:p>
@@ -2260,7 +2261,7 @@
           <a:p>
             <a:fld id="{392B46AE-74E1-BB46-A59A-36DBA27128E6}" type="datetimeFigureOut">
               <a:rPr lang="en-US" smtClean="0"/>
-              <a:t>25-Mar-13</a:t>
+              <a:t>29-Mar-13</a:t>
             </a:fld>
             <a:endParaRPr lang="en-US"/>
           </a:p>
@@ -2513,7 +2514,7 @@
           <a:p>
             <a:fld id="{392B46AE-74E1-BB46-A59A-36DBA27128E6}" type="datetimeFigureOut">
               <a:rPr lang="en-US" smtClean="0"/>
-              <a:t>25-Mar-13</a:t>
+              <a:t>29-Mar-13</a:t>
             </a:fld>
             <a:endParaRPr lang="en-US"/>
           </a:p>
@@ -2726,7 +2727,7 @@
           <a:p>
             <a:fld id="{392B46AE-74E1-BB46-A59A-36DBA27128E6}" type="datetimeFigureOut">
               <a:rPr lang="en-US" smtClean="0"/>
-              <a:t>25-Mar-13</a:t>
+              <a:t>29-Mar-13</a:t>
             </a:fld>
             <a:endParaRPr lang="en-US"/>
           </a:p>
@@ -3101,6 +3102,643 @@
           <a:chExt cx="0" cy="0"/>
         </a:xfrm>
       </p:grpSpPr>
+      <p:sp>
+        <p:nvSpPr>
+          <p:cNvPr id="5" name="Right Arrow 4"/>
+          <p:cNvSpPr/>
+          <p:nvPr/>
+        </p:nvSpPr>
+        <p:spPr>
+          <a:xfrm>
+            <a:off x="5086350" y="1846738"/>
+            <a:ext cx="3352800" cy="676753"/>
+          </a:xfrm>
+          <a:prstGeom prst="rightArrow">
+            <a:avLst/>
+          </a:prstGeom>
+          <a:solidFill>
+            <a:schemeClr val="accent2">
+              <a:lumMod val="60000"/>
+              <a:lumOff val="40000"/>
+            </a:schemeClr>
+          </a:solidFill>
+          <a:ln>
+            <a:solidFill>
+              <a:schemeClr val="accent2">
+                <a:lumMod val="60000"/>
+                <a:lumOff val="40000"/>
+              </a:schemeClr>
+            </a:solidFill>
+          </a:ln>
+        </p:spPr>
+        <p:style>
+          <a:lnRef idx="2">
+            <a:schemeClr val="accent1">
+              <a:shade val="50000"/>
+            </a:schemeClr>
+          </a:lnRef>
+          <a:fillRef idx="1">
+            <a:schemeClr val="accent1"/>
+          </a:fillRef>
+          <a:effectRef idx="0">
+            <a:schemeClr val="accent1"/>
+          </a:effectRef>
+          <a:fontRef idx="minor">
+            <a:schemeClr val="lt1"/>
+          </a:fontRef>
+        </p:style>
+        <p:txBody>
+          <a:bodyPr rtlCol="0" anchor="ctr"/>
+          <a:lstStyle/>
+          <a:p>
+            <a:pPr algn="ctr"/>
+            <a:endParaRPr lang="en-US"/>
+          </a:p>
+        </p:txBody>
+      </p:sp>
+      <p:sp>
+        <p:nvSpPr>
+          <p:cNvPr id="6" name="Bent Arrow 5"/>
+          <p:cNvSpPr/>
+          <p:nvPr/>
+        </p:nvSpPr>
+        <p:spPr>
+          <a:xfrm rot="5400000">
+            <a:off x="4895850" y="2590800"/>
+            <a:ext cx="2971800" cy="2514600"/>
+          </a:xfrm>
+          <a:prstGeom prst="bentArrow">
+            <a:avLst>
+              <a:gd name="adj1" fmla="val 25918"/>
+              <a:gd name="adj2" fmla="val 30704"/>
+              <a:gd name="adj3" fmla="val 39398"/>
+              <a:gd name="adj4" fmla="val 34879"/>
+            </a:avLst>
+          </a:prstGeom>
+          <a:solidFill>
+            <a:schemeClr val="accent2">
+              <a:lumMod val="75000"/>
+            </a:schemeClr>
+          </a:solidFill>
+          <a:ln>
+            <a:solidFill>
+              <a:schemeClr val="accent2">
+                <a:lumMod val="75000"/>
+              </a:schemeClr>
+            </a:solidFill>
+          </a:ln>
+        </p:spPr>
+        <p:style>
+          <a:lnRef idx="2">
+            <a:schemeClr val="accent1">
+              <a:shade val="50000"/>
+            </a:schemeClr>
+          </a:lnRef>
+          <a:fillRef idx="1">
+            <a:schemeClr val="accent1"/>
+          </a:fillRef>
+          <a:effectRef idx="0">
+            <a:schemeClr val="accent1"/>
+          </a:effectRef>
+          <a:fontRef idx="minor">
+            <a:schemeClr val="lt1"/>
+          </a:fontRef>
+        </p:style>
+        <p:txBody>
+          <a:bodyPr rtlCol="0" anchor="ctr"/>
+          <a:lstStyle/>
+          <a:p>
+            <a:pPr algn="ctr"/>
+            <a:endParaRPr lang="en-US">
+              <a:solidFill>
+                <a:schemeClr val="tx1"/>
+              </a:solidFill>
+            </a:endParaRPr>
+          </a:p>
+        </p:txBody>
+      </p:sp>
+      <p:sp>
+        <p:nvSpPr>
+          <p:cNvPr id="7" name="Flowchart: Process 6"/>
+          <p:cNvSpPr/>
+          <p:nvPr/>
+        </p:nvSpPr>
+        <p:spPr>
+          <a:xfrm>
+            <a:off x="2857500" y="2016126"/>
+            <a:ext cx="2247900" cy="1014730"/>
+          </a:xfrm>
+          <a:prstGeom prst="flowChartProcess">
+            <a:avLst/>
+          </a:prstGeom>
+          <a:solidFill>
+            <a:srgbClr val="800000"/>
+          </a:solidFill>
+          <a:ln>
+            <a:solidFill>
+              <a:srgbClr val="800000"/>
+            </a:solidFill>
+          </a:ln>
+        </p:spPr>
+        <p:style>
+          <a:lnRef idx="2">
+            <a:schemeClr val="accent1">
+              <a:shade val="50000"/>
+            </a:schemeClr>
+          </a:lnRef>
+          <a:fillRef idx="1">
+            <a:schemeClr val="accent1"/>
+          </a:fillRef>
+          <a:effectRef idx="0">
+            <a:schemeClr val="accent1"/>
+          </a:effectRef>
+          <a:fontRef idx="minor">
+            <a:schemeClr val="lt1"/>
+          </a:fontRef>
+        </p:style>
+        <p:txBody>
+          <a:bodyPr rtlCol="0" anchor="ctr"/>
+          <a:lstStyle/>
+          <a:p>
+            <a:pPr algn="ctr"/>
+            <a:endParaRPr lang="en-US"/>
+          </a:p>
+        </p:txBody>
+      </p:sp>
+      <p:sp>
+        <p:nvSpPr>
+          <p:cNvPr id="8" name="Bent Arrow 7"/>
+          <p:cNvSpPr/>
+          <p:nvPr/>
+        </p:nvSpPr>
+        <p:spPr>
+          <a:xfrm rot="5400000">
+            <a:off x="2977515" y="2929891"/>
+            <a:ext cx="1245870" cy="1485900"/>
+          </a:xfrm>
+          <a:prstGeom prst="bentArrow">
+            <a:avLst>
+              <a:gd name="adj1" fmla="val 24443"/>
+              <a:gd name="adj2" fmla="val 25000"/>
+              <a:gd name="adj3" fmla="val 25000"/>
+              <a:gd name="adj4" fmla="val 43750"/>
+            </a:avLst>
+          </a:prstGeom>
+          <a:solidFill>
+            <a:srgbClr val="800000"/>
+          </a:solidFill>
+          <a:ln>
+            <a:solidFill>
+              <a:srgbClr val="800000"/>
+            </a:solidFill>
+          </a:ln>
+        </p:spPr>
+        <p:style>
+          <a:lnRef idx="2">
+            <a:schemeClr val="accent1">
+              <a:shade val="50000"/>
+            </a:schemeClr>
+          </a:lnRef>
+          <a:fillRef idx="1">
+            <a:schemeClr val="accent1"/>
+          </a:fillRef>
+          <a:effectRef idx="0">
+            <a:schemeClr val="accent1"/>
+          </a:effectRef>
+          <a:fontRef idx="minor">
+            <a:schemeClr val="lt1"/>
+          </a:fontRef>
+        </p:style>
+        <p:txBody>
+          <a:bodyPr rtlCol="0" anchor="ctr"/>
+          <a:lstStyle/>
+          <a:p>
+            <a:pPr algn="ctr"/>
+            <a:endParaRPr lang="en-US">
+              <a:solidFill>
+                <a:schemeClr val="tx1"/>
+              </a:solidFill>
+            </a:endParaRPr>
+          </a:p>
+        </p:txBody>
+      </p:sp>
+      <p:sp>
+        <p:nvSpPr>
+          <p:cNvPr id="10" name="Right Arrow 9"/>
+          <p:cNvSpPr/>
+          <p:nvPr/>
+        </p:nvSpPr>
+        <p:spPr>
+          <a:xfrm>
+            <a:off x="2857500" y="1494791"/>
+            <a:ext cx="2933700" cy="2057400"/>
+          </a:xfrm>
+          <a:prstGeom prst="rightArrow">
+            <a:avLst/>
+          </a:prstGeom>
+          <a:solidFill>
+            <a:schemeClr val="accent2">
+              <a:lumMod val="75000"/>
+            </a:schemeClr>
+          </a:solidFill>
+          <a:ln>
+            <a:solidFill>
+              <a:schemeClr val="accent2">
+                <a:lumMod val="75000"/>
+              </a:schemeClr>
+            </a:solidFill>
+          </a:ln>
+        </p:spPr>
+        <p:style>
+          <a:lnRef idx="2">
+            <a:schemeClr val="accent1">
+              <a:shade val="50000"/>
+            </a:schemeClr>
+          </a:lnRef>
+          <a:fillRef idx="1">
+            <a:schemeClr val="accent1"/>
+          </a:fillRef>
+          <a:effectRef idx="0">
+            <a:schemeClr val="accent1"/>
+          </a:effectRef>
+          <a:fontRef idx="minor">
+            <a:schemeClr val="lt1"/>
+          </a:fontRef>
+        </p:style>
+        <p:txBody>
+          <a:bodyPr rtlCol="0" anchor="ctr"/>
+          <a:lstStyle/>
+          <a:p>
+            <a:pPr algn="ctr"/>
+            <a:endParaRPr lang="en-US"/>
+          </a:p>
+        </p:txBody>
+      </p:sp>
+      <p:sp>
+        <p:nvSpPr>
+          <p:cNvPr id="11" name="Right Arrow 10"/>
+          <p:cNvSpPr/>
+          <p:nvPr/>
+        </p:nvSpPr>
+        <p:spPr>
+          <a:xfrm>
+            <a:off x="533400" y="1371600"/>
+            <a:ext cx="3067050" cy="2590800"/>
+          </a:xfrm>
+          <a:prstGeom prst="rightArrow">
+            <a:avLst/>
+          </a:prstGeom>
+          <a:solidFill>
+            <a:srgbClr val="800000"/>
+          </a:solidFill>
+          <a:ln>
+            <a:solidFill>
+              <a:srgbClr val="800000"/>
+            </a:solidFill>
+          </a:ln>
+        </p:spPr>
+        <p:style>
+          <a:lnRef idx="2">
+            <a:schemeClr val="accent1">
+              <a:shade val="50000"/>
+            </a:schemeClr>
+          </a:lnRef>
+          <a:fillRef idx="1">
+            <a:schemeClr val="accent1"/>
+          </a:fillRef>
+          <a:effectRef idx="0">
+            <a:schemeClr val="accent1"/>
+          </a:effectRef>
+          <a:fontRef idx="minor">
+            <a:schemeClr val="lt1"/>
+          </a:fontRef>
+        </p:style>
+        <p:txBody>
+          <a:bodyPr rtlCol="0" anchor="ctr"/>
+          <a:lstStyle/>
+          <a:p>
+            <a:pPr algn="ctr"/>
+            <a:endParaRPr lang="en-US"/>
+          </a:p>
+        </p:txBody>
+      </p:sp>
+      <p:sp>
+        <p:nvSpPr>
+          <p:cNvPr id="12" name="TextBox 11"/>
+          <p:cNvSpPr txBox="1"/>
+          <p:nvPr/>
+        </p:nvSpPr>
+        <p:spPr>
+          <a:xfrm>
+            <a:off x="658938" y="2343834"/>
+            <a:ext cx="1946982" cy="646331"/>
+          </a:xfrm>
+          <a:prstGeom prst="rect">
+            <a:avLst/>
+          </a:prstGeom>
+          <a:noFill/>
+        </p:spPr>
+        <p:txBody>
+          <a:bodyPr wrap="square" rtlCol="0">
+            <a:spAutoFit/>
+          </a:bodyPr>
+          <a:lstStyle/>
+          <a:p>
+            <a:pPr algn="ctr"/>
+            <a:r>
+              <a:rPr lang="en-US" b="1" dirty="0" smtClean="0">
+                <a:solidFill>
+                  <a:schemeClr val="bg2"/>
+                </a:solidFill>
+              </a:rPr>
+              <a:t>Thermal </a:t>
+            </a:r>
+            <a:r>
+              <a:rPr lang="en-US" b="1" dirty="0" smtClean="0">
+                <a:solidFill>
+                  <a:schemeClr val="bg2"/>
+                </a:solidFill>
+              </a:rPr>
+              <a:t>energy</a:t>
+            </a:r>
+            <a:br>
+              <a:rPr lang="en-US" b="1" dirty="0" smtClean="0">
+                <a:solidFill>
+                  <a:schemeClr val="bg2"/>
+                </a:solidFill>
+              </a:rPr>
+            </a:br>
+            <a:r>
+              <a:rPr lang="en-US" b="1" dirty="0" smtClean="0">
+                <a:solidFill>
+                  <a:schemeClr val="bg2"/>
+                </a:solidFill>
+              </a:rPr>
+              <a:t>(</a:t>
+            </a:r>
+            <a:r>
+              <a:rPr lang="en-US" b="1" i="1" dirty="0" smtClean="0">
+                <a:solidFill>
+                  <a:schemeClr val="bg2"/>
+                </a:solidFill>
+              </a:rPr>
+              <a:t>Q</a:t>
+            </a:r>
+            <a:r>
+              <a:rPr lang="en-US" b="1" dirty="0" smtClean="0">
+                <a:solidFill>
+                  <a:schemeClr val="bg2"/>
+                </a:solidFill>
+              </a:rPr>
+              <a:t>)</a:t>
+            </a:r>
+            <a:endParaRPr lang="en-US" b="1" dirty="0">
+              <a:solidFill>
+                <a:schemeClr val="bg2"/>
+              </a:solidFill>
+            </a:endParaRPr>
+          </a:p>
+        </p:txBody>
+      </p:sp>
+      <p:sp>
+        <p:nvSpPr>
+          <p:cNvPr id="13" name="TextBox 12"/>
+          <p:cNvSpPr txBox="1"/>
+          <p:nvPr/>
+        </p:nvSpPr>
+        <p:spPr>
+          <a:xfrm>
+            <a:off x="3613410" y="2224289"/>
+            <a:ext cx="1295400" cy="646331"/>
+          </a:xfrm>
+          <a:prstGeom prst="rect">
+            <a:avLst/>
+          </a:prstGeom>
+          <a:noFill/>
+        </p:spPr>
+        <p:txBody>
+          <a:bodyPr wrap="square" rtlCol="0">
+            <a:spAutoFit/>
+          </a:bodyPr>
+          <a:lstStyle/>
+          <a:p>
+            <a:pPr algn="ctr"/>
+            <a:r>
+              <a:rPr lang="en-US" b="1" dirty="0" err="1" smtClean="0">
+                <a:solidFill>
+                  <a:schemeClr val="bg2"/>
+                </a:solidFill>
+              </a:rPr>
+              <a:t>Exergy</a:t>
+            </a:r>
+            <a:endParaRPr lang="en-US" b="1" dirty="0">
+              <a:solidFill>
+                <a:schemeClr val="bg2"/>
+              </a:solidFill>
+            </a:endParaRPr>
+          </a:p>
+          <a:p>
+            <a:pPr algn="ctr"/>
+            <a:r>
+              <a:rPr lang="en-US" b="1" dirty="0" smtClean="0">
+                <a:solidFill>
+                  <a:schemeClr val="bg2"/>
+                </a:solidFill>
+              </a:rPr>
+              <a:t>(</a:t>
+            </a:r>
+            <a:r>
+              <a:rPr lang="en-US" b="1" i="1" dirty="0" smtClean="0">
+                <a:solidFill>
+                  <a:schemeClr val="bg2"/>
+                </a:solidFill>
+              </a:rPr>
+              <a:t>X</a:t>
+            </a:r>
+            <a:r>
+              <a:rPr lang="en-US" b="1" dirty="0" smtClean="0">
+                <a:solidFill>
+                  <a:schemeClr val="bg2"/>
+                </a:solidFill>
+              </a:rPr>
+              <a:t>)</a:t>
+            </a:r>
+            <a:endParaRPr lang="en-US" b="1" dirty="0">
+              <a:solidFill>
+                <a:schemeClr val="bg2"/>
+              </a:solidFill>
+            </a:endParaRPr>
+          </a:p>
+        </p:txBody>
+      </p:sp>
+      <p:sp>
+        <p:nvSpPr>
+          <p:cNvPr id="14" name="TextBox 13"/>
+          <p:cNvSpPr txBox="1"/>
+          <p:nvPr/>
+        </p:nvSpPr>
+        <p:spPr>
+          <a:xfrm>
+            <a:off x="6450100" y="1976484"/>
+            <a:ext cx="1835870" cy="369332"/>
+          </a:xfrm>
+          <a:prstGeom prst="rect">
+            <a:avLst/>
+          </a:prstGeom>
+          <a:noFill/>
+        </p:spPr>
+        <p:txBody>
+          <a:bodyPr wrap="square" rtlCol="0">
+            <a:spAutoFit/>
+          </a:bodyPr>
+          <a:lstStyle/>
+          <a:p>
+            <a:r>
+              <a:rPr lang="en-US" b="1" dirty="0" smtClean="0">
+                <a:solidFill>
+                  <a:schemeClr val="bg2"/>
+                </a:solidFill>
+              </a:rPr>
+              <a:t>Useful </a:t>
+            </a:r>
+            <a:r>
+              <a:rPr lang="en-US" b="1" dirty="0" smtClean="0">
+                <a:solidFill>
+                  <a:schemeClr val="bg2"/>
+                </a:solidFill>
+              </a:rPr>
+              <a:t>work (</a:t>
+            </a:r>
+            <a:r>
+              <a:rPr lang="en-US" b="1" i="1" dirty="0" smtClean="0">
+                <a:solidFill>
+                  <a:schemeClr val="bg2"/>
+                </a:solidFill>
+              </a:rPr>
+              <a:t>U</a:t>
+            </a:r>
+            <a:r>
+              <a:rPr lang="en-US" b="1" dirty="0" smtClean="0">
+                <a:solidFill>
+                  <a:schemeClr val="bg2"/>
+                </a:solidFill>
+              </a:rPr>
+              <a:t>)</a:t>
+            </a:r>
+            <a:endParaRPr lang="en-US" b="1" dirty="0">
+              <a:solidFill>
+                <a:schemeClr val="bg2"/>
+              </a:solidFill>
+            </a:endParaRPr>
+          </a:p>
+        </p:txBody>
+      </p:sp>
+      <p:sp>
+        <p:nvSpPr>
+          <p:cNvPr id="15" name="TextBox 14"/>
+          <p:cNvSpPr txBox="1"/>
+          <p:nvPr/>
+        </p:nvSpPr>
+        <p:spPr>
+          <a:xfrm>
+            <a:off x="2983780" y="3048848"/>
+            <a:ext cx="1114425" cy="307777"/>
+          </a:xfrm>
+          <a:prstGeom prst="rect">
+            <a:avLst/>
+          </a:prstGeom>
+          <a:noFill/>
+        </p:spPr>
+        <p:txBody>
+          <a:bodyPr wrap="square" rtlCol="0">
+            <a:spAutoFit/>
+          </a:bodyPr>
+          <a:lstStyle/>
+          <a:p>
+            <a:r>
+              <a:rPr lang="en-US" sz="1400" i="1" dirty="0" smtClean="0">
+                <a:solidFill>
+                  <a:schemeClr val="bg2"/>
+                </a:solidFill>
+              </a:rPr>
+              <a:t>Waste heat</a:t>
+            </a:r>
+            <a:endParaRPr lang="en-US" sz="1400" i="1" dirty="0">
+              <a:solidFill>
+                <a:schemeClr val="bg2"/>
+              </a:solidFill>
+            </a:endParaRPr>
+          </a:p>
+        </p:txBody>
+      </p:sp>
+      <p:sp>
+        <p:nvSpPr>
+          <p:cNvPr id="16" name="TextBox 15"/>
+          <p:cNvSpPr txBox="1"/>
+          <p:nvPr/>
+        </p:nvSpPr>
+        <p:spPr>
+          <a:xfrm>
+            <a:off x="5538640" y="2507176"/>
+            <a:ext cx="1528762" cy="307777"/>
+          </a:xfrm>
+          <a:prstGeom prst="rect">
+            <a:avLst/>
+          </a:prstGeom>
+          <a:noFill/>
+        </p:spPr>
+        <p:txBody>
+          <a:bodyPr wrap="square" rtlCol="0">
+            <a:spAutoFit/>
+          </a:bodyPr>
+          <a:lstStyle/>
+          <a:p>
+            <a:r>
+              <a:rPr lang="en-US" sz="1400" i="1" dirty="0" smtClean="0">
+                <a:solidFill>
+                  <a:schemeClr val="bg2"/>
+                </a:solidFill>
+              </a:rPr>
+              <a:t>Residential usage</a:t>
+            </a:r>
+            <a:endParaRPr lang="en-US" sz="1400" i="1" dirty="0">
+              <a:solidFill>
+                <a:schemeClr val="bg2"/>
+              </a:solidFill>
+            </a:endParaRPr>
+          </a:p>
+        </p:txBody>
+      </p:sp>
+    </p:spTree>
+    <p:extLst>
+      <p:ext uri="{BB962C8B-B14F-4D97-AF65-F5344CB8AC3E}">
+        <p14:creationId xmlns:p14="http://schemas.microsoft.com/office/powerpoint/2010/main" val="1231145991"/>
+      </p:ext>
+    </p:extLst>
+  </p:cSld>
+  <p:clrMapOvr>
+    <a:masterClrMapping/>
+  </p:clrMapOvr>
+</p:sld>
+</file>
+
+<file path=ppt/slides/slide2.xml><?xml version="1.0" encoding="utf-8"?>
+<p:sld xmlns:a="http://schemas.openxmlformats.org/drawingml/2006/main" xmlns:r="http://schemas.openxmlformats.org/officeDocument/2006/relationships" xmlns:p="http://schemas.openxmlformats.org/presentationml/2006/main">
+  <p:cSld>
+    <p:spTree>
+      <p:nvGrpSpPr>
+        <p:cNvPr id="1" name=""/>
+        <p:cNvGrpSpPr/>
+        <p:nvPr/>
+      </p:nvGrpSpPr>
+      <p:grpSpPr>
+        <a:xfrm>
+          <a:off x="0" y="0"/>
+          <a:ext cx="0" cy="0"/>
+          <a:chOff x="0" y="0"/>
+          <a:chExt cx="0" cy="0"/>
+        </a:xfrm>
+      </p:grpSpPr>
       <p:cxnSp>
         <p:nvCxnSpPr>
           <p:cNvPr id="6" name="Straight Arrow Connector 5"/>
@@ -3435,7 +4073,7 @@
 </p:sld>
 </file>
 
-<file path=ppt/slides/slide2.xml><?xml version="1.0" encoding="utf-8"?>
+<file path=ppt/slides/slide3.xml><?xml version="1.0" encoding="utf-8"?>
 <p:sld xmlns:a="http://schemas.openxmlformats.org/drawingml/2006/main" xmlns:r="http://schemas.openxmlformats.org/officeDocument/2006/relationships" xmlns:p="http://schemas.openxmlformats.org/presentationml/2006/main">
   <p:cSld>
     <p:spTree>
@@ -3890,11 +4528,6 @@
                 </a:rPr>
                 <a:t>to model</a:t>
               </a:r>
-              <a:endParaRPr lang="en-US" sz="2800" b="1" dirty="0">
-                <a:solidFill>
-                  <a:srgbClr val="6C0000"/>
-                </a:solidFill>
-              </a:endParaRPr>
             </a:p>
           </p:txBody>
         </p:sp>
@@ -3912,7 +4545,7 @@
 </p:sld>
 </file>
 
-<file path=ppt/slides/slide3.xml><?xml version="1.0" encoding="utf-8"?>
+<file path=ppt/slides/slide4.xml><?xml version="1.0" encoding="utf-8"?>
 <p:sld xmlns:a="http://schemas.openxmlformats.org/drawingml/2006/main" xmlns:r="http://schemas.openxmlformats.org/officeDocument/2006/relationships" xmlns:p="http://schemas.openxmlformats.org/presentationml/2006/main">
   <p:cSld>
     <p:spTree>
@@ -4367,11 +5000,6 @@
                 </a:rPr>
                 <a:t>to model</a:t>
               </a:r>
-              <a:endParaRPr lang="en-US" sz="2800" b="1" dirty="0">
-                <a:solidFill>
-                  <a:srgbClr val="6C0000"/>
-                </a:solidFill>
-              </a:endParaRPr>
             </a:p>
           </p:txBody>
         </p:sp>
@@ -4524,7 +5152,7 @@
 </p:sld>
 </file>
 
-<file path=ppt/slides/slide4.xml><?xml version="1.0" encoding="utf-8"?>
+<file path=ppt/slides/slide5.xml><?xml version="1.0" encoding="utf-8"?>
 <p:sld xmlns:a="http://schemas.openxmlformats.org/drawingml/2006/main" xmlns:r="http://schemas.openxmlformats.org/officeDocument/2006/relationships" xmlns:p="http://schemas.openxmlformats.org/presentationml/2006/main">
   <p:cSld>
     <p:spTree>
@@ -4979,11 +5607,6 @@
                 </a:rPr>
                 <a:t>to model</a:t>
               </a:r>
-              <a:endParaRPr lang="en-US" sz="2800" b="1" dirty="0">
-                <a:solidFill>
-                  <a:srgbClr val="6C0000"/>
-                </a:solidFill>
-              </a:endParaRPr>
             </a:p>
           </p:txBody>
         </p:sp>
@@ -5355,7 +5978,7 @@
 </p:sld>
 </file>
 
-<file path=ppt/slides/slide5.xml><?xml version="1.0" encoding="utf-8"?>
+<file path=ppt/slides/slide6.xml><?xml version="1.0" encoding="utf-8"?>
 <p:sld xmlns:a="http://schemas.openxmlformats.org/drawingml/2006/main" xmlns:r="http://schemas.openxmlformats.org/officeDocument/2006/relationships" xmlns:p="http://schemas.openxmlformats.org/presentationml/2006/main">
   <p:cSld>
     <p:spTree>
@@ -5810,11 +6433,6 @@
                 </a:rPr>
                 <a:t>to model</a:t>
               </a:r>
-              <a:endParaRPr lang="en-US" sz="2800" b="1" dirty="0">
-                <a:solidFill>
-                  <a:srgbClr val="6C0000"/>
-                </a:solidFill>
-              </a:endParaRPr>
             </a:p>
           </p:txBody>
         </p:sp>
@@ -6172,7 +6790,7 @@
 </p:sld>
 </file>
 
-<file path=ppt/slides/slide6.xml><?xml version="1.0" encoding="utf-8"?>
+<file path=ppt/slides/slide7.xml><?xml version="1.0" encoding="utf-8"?>
 <p:sld xmlns:a="http://schemas.openxmlformats.org/drawingml/2006/main" xmlns:r="http://schemas.openxmlformats.org/officeDocument/2006/relationships" xmlns:p="http://schemas.openxmlformats.org/presentationml/2006/main">
   <p:cSld>
     <p:spTree>
@@ -6627,11 +7245,6 @@
                 </a:rPr>
                 <a:t>to model</a:t>
               </a:r>
-              <a:endParaRPr lang="en-US" sz="2800" b="1" dirty="0">
-                <a:solidFill>
-                  <a:srgbClr val="6C0000"/>
-                </a:solidFill>
-              </a:endParaRPr>
             </a:p>
           </p:txBody>
         </p:sp>
@@ -6996,7 +7609,7 @@
 </p:sld>
 </file>
 
-<file path=ppt/slides/slide7.xml><?xml version="1.0" encoding="utf-8"?>
+<file path=ppt/slides/slide8.xml><?xml version="1.0" encoding="utf-8"?>
 <p:sld xmlns:a="http://schemas.openxmlformats.org/drawingml/2006/main" xmlns:r="http://schemas.openxmlformats.org/officeDocument/2006/relationships" xmlns:p="http://schemas.openxmlformats.org/presentationml/2006/main">
   <p:cSld>
     <p:spTree>

</xml_diff>

<commit_message>
Many minor edits. Now including better understanding of LINEX model.
</commit_message>
<xml_diff>
--- a/figure_other/Seminar Figures.pptx
+++ b/figure_other/Seminar Figures.pptx
@@ -3448,7 +3448,7 @@
             <a:r>
               <a:rPr lang="en-US" b="1" dirty="0" smtClean="0">
                 <a:solidFill>
-                  <a:schemeClr val="bg2"/>
+                  <a:schemeClr val="bg1"/>
                 </a:solidFill>
               </a:rPr>
               <a:t>Thermal </a:t>
@@ -3456,7 +3456,7 @@
             <a:r>
               <a:rPr lang="en-US" b="1" dirty="0" smtClean="0">
                 <a:solidFill>
-                  <a:schemeClr val="bg2"/>
+                  <a:schemeClr val="bg1"/>
                 </a:solidFill>
               </a:rPr>
               <a:t>energy</a:t>
@@ -3464,14 +3464,14 @@
             <a:br>
               <a:rPr lang="en-US" b="1" dirty="0" smtClean="0">
                 <a:solidFill>
-                  <a:schemeClr val="bg2"/>
+                  <a:schemeClr val="bg1"/>
                 </a:solidFill>
               </a:rPr>
             </a:br>
             <a:r>
               <a:rPr lang="en-US" b="1" dirty="0" smtClean="0">
                 <a:solidFill>
-                  <a:schemeClr val="bg2"/>
+                  <a:schemeClr val="bg1"/>
                 </a:solidFill>
               </a:rPr>
               <a:t>(</a:t>
@@ -3479,7 +3479,7 @@
             <a:r>
               <a:rPr lang="en-US" b="1" i="1" dirty="0" smtClean="0">
                 <a:solidFill>
-                  <a:schemeClr val="bg2"/>
+                  <a:schemeClr val="bg1"/>
                 </a:solidFill>
               </a:rPr>
               <a:t>Q</a:t>
@@ -3487,14 +3487,14 @@
             <a:r>
               <a:rPr lang="en-US" b="1" dirty="0" smtClean="0">
                 <a:solidFill>
-                  <a:schemeClr val="bg2"/>
+                  <a:schemeClr val="bg1"/>
                 </a:solidFill>
               </a:rPr>
               <a:t>)</a:t>
             </a:r>
             <a:endParaRPr lang="en-US" b="1" dirty="0">
               <a:solidFill>
-                <a:schemeClr val="bg2"/>
+                <a:schemeClr val="bg1"/>
               </a:solidFill>
             </a:endParaRPr>
           </a:p>
@@ -3526,14 +3526,14 @@
             <a:r>
               <a:rPr lang="en-US" b="1" dirty="0" err="1" smtClean="0">
                 <a:solidFill>
-                  <a:schemeClr val="bg2"/>
+                  <a:schemeClr val="bg1"/>
                 </a:solidFill>
               </a:rPr>
               <a:t>Exergy</a:t>
             </a:r>
             <a:endParaRPr lang="en-US" b="1" dirty="0">
               <a:solidFill>
-                <a:schemeClr val="bg2"/>
+                <a:schemeClr val="bg1"/>
               </a:solidFill>
             </a:endParaRPr>
           </a:p>
@@ -3542,7 +3542,7 @@
             <a:r>
               <a:rPr lang="en-US" b="1" dirty="0" smtClean="0">
                 <a:solidFill>
-                  <a:schemeClr val="bg2"/>
+                  <a:schemeClr val="bg1"/>
                 </a:solidFill>
               </a:rPr>
               <a:t>(</a:t>
@@ -3550,7 +3550,7 @@
             <a:r>
               <a:rPr lang="en-US" b="1" i="1" dirty="0" smtClean="0">
                 <a:solidFill>
-                  <a:schemeClr val="bg2"/>
+                  <a:schemeClr val="bg1"/>
                 </a:solidFill>
               </a:rPr>
               <a:t>X</a:t>
@@ -3558,14 +3558,14 @@
             <a:r>
               <a:rPr lang="en-US" b="1" dirty="0" smtClean="0">
                 <a:solidFill>
-                  <a:schemeClr val="bg2"/>
+                  <a:schemeClr val="bg1"/>
                 </a:solidFill>
               </a:rPr>
               <a:t>)</a:t>
             </a:r>
             <a:endParaRPr lang="en-US" b="1" dirty="0">
               <a:solidFill>
-                <a:schemeClr val="bg2"/>
+                <a:schemeClr val="bg1"/>
               </a:solidFill>
             </a:endParaRPr>
           </a:p>
@@ -3596,7 +3596,7 @@
             <a:r>
               <a:rPr lang="en-US" b="1" dirty="0" smtClean="0">
                 <a:solidFill>
-                  <a:schemeClr val="bg2"/>
+                  <a:schemeClr val="bg1"/>
                 </a:solidFill>
               </a:rPr>
               <a:t>Useful </a:t>
@@ -3604,7 +3604,7 @@
             <a:r>
               <a:rPr lang="en-US" b="1" dirty="0" smtClean="0">
                 <a:solidFill>
-                  <a:schemeClr val="bg2"/>
+                  <a:schemeClr val="bg1"/>
                 </a:solidFill>
               </a:rPr>
               <a:t>work (</a:t>
@@ -3612,7 +3612,7 @@
             <a:r>
               <a:rPr lang="en-US" b="1" i="1" dirty="0" smtClean="0">
                 <a:solidFill>
-                  <a:schemeClr val="bg2"/>
+                  <a:schemeClr val="bg1"/>
                 </a:solidFill>
               </a:rPr>
               <a:t>U</a:t>
@@ -3620,14 +3620,14 @@
             <a:r>
               <a:rPr lang="en-US" b="1" dirty="0" smtClean="0">
                 <a:solidFill>
-                  <a:schemeClr val="bg2"/>
+                  <a:schemeClr val="bg1"/>
                 </a:solidFill>
               </a:rPr>
               <a:t>)</a:t>
             </a:r>
             <a:endParaRPr lang="en-US" b="1" dirty="0">
               <a:solidFill>
-                <a:schemeClr val="bg2"/>
+                <a:schemeClr val="bg1"/>
               </a:solidFill>
             </a:endParaRPr>
           </a:p>
@@ -3658,14 +3658,14 @@
             <a:r>
               <a:rPr lang="en-US" sz="1400" i="1" dirty="0" smtClean="0">
                 <a:solidFill>
-                  <a:schemeClr val="bg2"/>
+                  <a:schemeClr val="bg1"/>
                 </a:solidFill>
               </a:rPr>
               <a:t>Waste heat</a:t>
             </a:r>
             <a:endParaRPr lang="en-US" sz="1400" i="1" dirty="0">
               <a:solidFill>
-                <a:schemeClr val="bg2"/>
+                <a:schemeClr val="bg1"/>
               </a:solidFill>
             </a:endParaRPr>
           </a:p>
@@ -3696,14 +3696,14 @@
             <a:r>
               <a:rPr lang="en-US" sz="1400" i="1" dirty="0" smtClean="0">
                 <a:solidFill>
-                  <a:schemeClr val="bg2"/>
+                  <a:schemeClr val="bg1"/>
                 </a:solidFill>
               </a:rPr>
               <a:t>Residential usage</a:t>
             </a:r>
             <a:endParaRPr lang="en-US" sz="1400" i="1" dirty="0">
               <a:solidFill>
-                <a:schemeClr val="bg2"/>
+                <a:schemeClr val="bg1"/>
               </a:solidFill>
             </a:endParaRPr>
           </a:p>

</xml_diff>

<commit_message>
Edited the notional graph for delta to correctly identify regions where we see significance. Many other edits to the presentation.
</commit_message>
<xml_diff>
--- a/figure_other/Seminar Figures.pptx
+++ b/figure_other/Seminar Figures.pptx
@@ -10,7 +10,7 @@
     <p:sldId id="282" r:id="rId4"/>
     <p:sldId id="283" r:id="rId5"/>
     <p:sldId id="284" r:id="rId6"/>
-    <p:sldId id="281" r:id="rId7"/>
+    <p:sldId id="286" r:id="rId7"/>
     <p:sldId id="279" r:id="rId8"/>
     <p:sldId id="256" r:id="rId9"/>
   </p:sldIdLst>
@@ -295,7 +295,7 @@
           <a:p>
             <a:fld id="{392B46AE-74E1-BB46-A59A-36DBA27128E6}" type="datetimeFigureOut">
               <a:rPr lang="en-US" smtClean="0"/>
-              <a:t>29-Mar-13</a:t>
+              <a:t>2-Apr-13</a:t>
             </a:fld>
             <a:endParaRPr lang="en-US"/>
           </a:p>
@@ -465,7 +465,7 @@
           <a:p>
             <a:fld id="{392B46AE-74E1-BB46-A59A-36DBA27128E6}" type="datetimeFigureOut">
               <a:rPr lang="en-US" smtClean="0"/>
-              <a:t>29-Mar-13</a:t>
+              <a:t>2-Apr-13</a:t>
             </a:fld>
             <a:endParaRPr lang="en-US"/>
           </a:p>
@@ -645,7 +645,7 @@
           <a:p>
             <a:fld id="{392B46AE-74E1-BB46-A59A-36DBA27128E6}" type="datetimeFigureOut">
               <a:rPr lang="en-US" smtClean="0"/>
-              <a:t>29-Mar-13</a:t>
+              <a:t>2-Apr-13</a:t>
             </a:fld>
             <a:endParaRPr lang="en-US"/>
           </a:p>
@@ -815,7 +815,7 @@
           <a:p>
             <a:fld id="{392B46AE-74E1-BB46-A59A-36DBA27128E6}" type="datetimeFigureOut">
               <a:rPr lang="en-US" smtClean="0"/>
-              <a:t>29-Mar-13</a:t>
+              <a:t>2-Apr-13</a:t>
             </a:fld>
             <a:endParaRPr lang="en-US"/>
           </a:p>
@@ -1061,7 +1061,7 @@
           <a:p>
             <a:fld id="{392B46AE-74E1-BB46-A59A-36DBA27128E6}" type="datetimeFigureOut">
               <a:rPr lang="en-US" smtClean="0"/>
-              <a:t>29-Mar-13</a:t>
+              <a:t>2-Apr-13</a:t>
             </a:fld>
             <a:endParaRPr lang="en-US"/>
           </a:p>
@@ -1349,7 +1349,7 @@
           <a:p>
             <a:fld id="{392B46AE-74E1-BB46-A59A-36DBA27128E6}" type="datetimeFigureOut">
               <a:rPr lang="en-US" smtClean="0"/>
-              <a:t>29-Mar-13</a:t>
+              <a:t>2-Apr-13</a:t>
             </a:fld>
             <a:endParaRPr lang="en-US"/>
           </a:p>
@@ -1771,7 +1771,7 @@
           <a:p>
             <a:fld id="{392B46AE-74E1-BB46-A59A-36DBA27128E6}" type="datetimeFigureOut">
               <a:rPr lang="en-US" smtClean="0"/>
-              <a:t>29-Mar-13</a:t>
+              <a:t>2-Apr-13</a:t>
             </a:fld>
             <a:endParaRPr lang="en-US"/>
           </a:p>
@@ -1889,7 +1889,7 @@
           <a:p>
             <a:fld id="{392B46AE-74E1-BB46-A59A-36DBA27128E6}" type="datetimeFigureOut">
               <a:rPr lang="en-US" smtClean="0"/>
-              <a:t>29-Mar-13</a:t>
+              <a:t>2-Apr-13</a:t>
             </a:fld>
             <a:endParaRPr lang="en-US"/>
           </a:p>
@@ -1984,7 +1984,7 @@
           <a:p>
             <a:fld id="{392B46AE-74E1-BB46-A59A-36DBA27128E6}" type="datetimeFigureOut">
               <a:rPr lang="en-US" smtClean="0"/>
-              <a:t>29-Mar-13</a:t>
+              <a:t>2-Apr-13</a:t>
             </a:fld>
             <a:endParaRPr lang="en-US"/>
           </a:p>
@@ -2261,7 +2261,7 @@
           <a:p>
             <a:fld id="{392B46AE-74E1-BB46-A59A-36DBA27128E6}" type="datetimeFigureOut">
               <a:rPr lang="en-US" smtClean="0"/>
-              <a:t>29-Mar-13</a:t>
+              <a:t>2-Apr-13</a:t>
             </a:fld>
             <a:endParaRPr lang="en-US"/>
           </a:p>
@@ -2514,7 +2514,7 @@
           <a:p>
             <a:fld id="{392B46AE-74E1-BB46-A59A-36DBA27128E6}" type="datetimeFigureOut">
               <a:rPr lang="en-US" smtClean="0"/>
-              <a:t>29-Mar-13</a:t>
+              <a:t>2-Apr-13</a:t>
             </a:fld>
             <a:endParaRPr lang="en-US"/>
           </a:p>
@@ -2727,7 +2727,7 @@
           <a:p>
             <a:fld id="{392B46AE-74E1-BB46-A59A-36DBA27128E6}" type="datetimeFigureOut">
               <a:rPr lang="en-US" smtClean="0"/>
-              <a:t>29-Mar-13</a:t>
+              <a:t>2-Apr-13</a:t>
             </a:fld>
             <a:endParaRPr lang="en-US"/>
           </a:p>
@@ -3451,15 +3451,7 @@
                   <a:schemeClr val="bg1"/>
                 </a:solidFill>
               </a:rPr>
-              <a:t>Thermal </a:t>
-            </a:r>
-            <a:r>
-              <a:rPr lang="en-US" b="1" dirty="0" smtClean="0">
-                <a:solidFill>
-                  <a:schemeClr val="bg1"/>
-                </a:solidFill>
-              </a:rPr>
-              <a:t>energy</a:t>
+              <a:t>Thermal energy</a:t>
             </a:r>
             <a:br>
               <a:rPr lang="en-US" b="1" dirty="0" smtClean="0">
@@ -3599,15 +3591,7 @@
                   <a:schemeClr val="bg1"/>
                 </a:solidFill>
               </a:rPr>
-              <a:t>Useful </a:t>
-            </a:r>
-            <a:r>
-              <a:rPr lang="en-US" b="1" dirty="0" smtClean="0">
-                <a:solidFill>
-                  <a:schemeClr val="bg1"/>
-                </a:solidFill>
-              </a:rPr>
-              <a:t>work (</a:t>
+              <a:t>Useful work (</a:t>
             </a:r>
             <a:r>
               <a:rPr lang="en-US" b="1" i="1" dirty="0" smtClean="0">
@@ -6318,277 +6302,16 @@
       </p:sp>
       <p:grpSp>
         <p:nvGrpSpPr>
-          <p:cNvPr id="2" name="Group 1"/>
-          <p:cNvGrpSpPr/>
-          <p:nvPr/>
-        </p:nvGrpSpPr>
-        <p:grpSpPr>
-          <a:xfrm>
-            <a:off x="1109529" y="233018"/>
-            <a:ext cx="7489733" cy="5423298"/>
-            <a:chOff x="1109529" y="233018"/>
-            <a:chExt cx="7489733" cy="5423298"/>
-          </a:xfrm>
-        </p:grpSpPr>
-        <p:sp>
-          <p:nvSpPr>
-            <p:cNvPr id="3" name="Right Triangle 2"/>
-            <p:cNvSpPr/>
-            <p:nvPr/>
-          </p:nvSpPr>
-          <p:spPr>
-            <a:xfrm rot="5400000">
-              <a:off x="2142747" y="-800200"/>
-              <a:ext cx="5423298" cy="7489733"/>
-            </a:xfrm>
-            <a:prstGeom prst="rtTriangle">
-              <a:avLst/>
-            </a:prstGeom>
-            <a:noFill/>
-            <a:ln w="50800">
-              <a:solidFill>
-                <a:srgbClr val="6C0000"/>
-              </a:solidFill>
-            </a:ln>
-            <a:effectLst/>
-          </p:spPr>
-          <p:style>
-            <a:lnRef idx="1">
-              <a:schemeClr val="accent1"/>
-            </a:lnRef>
-            <a:fillRef idx="3">
-              <a:schemeClr val="accent1"/>
-            </a:fillRef>
-            <a:effectRef idx="2">
-              <a:schemeClr val="accent1"/>
-            </a:effectRef>
-            <a:fontRef idx="minor">
-              <a:schemeClr val="lt1"/>
-            </a:fontRef>
-          </p:style>
-          <p:txBody>
-            <a:bodyPr rot="0" spcFirstLastPara="0" vertOverflow="overflow" horzOverflow="overflow" vert="vert270" wrap="square" lIns="0" tIns="0" rIns="0" bIns="0" numCol="1" spcCol="0" rtlCol="0" fromWordArt="0" anchor="t" anchorCtr="0" forceAA="0" compatLnSpc="1">
-              <a:prstTxWarp prst="textNoShape">
-                <a:avLst/>
-              </a:prstTxWarp>
-              <a:noAutofit/>
-            </a:bodyPr>
-            <a:lstStyle/>
-            <a:p>
-              <a:endParaRPr lang="en-US" sz="2800" b="1" dirty="0">
-                <a:solidFill>
-                  <a:srgbClr val="6C0000"/>
-                </a:solidFill>
-              </a:endParaRPr>
-            </a:p>
-          </p:txBody>
-        </p:sp>
-        <p:sp>
-          <p:nvSpPr>
-            <p:cNvPr id="5" name="TextBox 4"/>
-            <p:cNvSpPr txBox="1"/>
-            <p:nvPr/>
-          </p:nvSpPr>
-          <p:spPr>
-            <a:xfrm>
-              <a:off x="1165212" y="287761"/>
-              <a:ext cx="3989293" cy="1384995"/>
-            </a:xfrm>
-            <a:prstGeom prst="rect">
-              <a:avLst/>
-            </a:prstGeom>
-            <a:noFill/>
-          </p:spPr>
-          <p:txBody>
-            <a:bodyPr wrap="none" rtlCol="0">
-              <a:spAutoFit/>
-            </a:bodyPr>
-            <a:lstStyle/>
-            <a:p>
-              <a:r>
-                <a:rPr lang="en-US" sz="2800" b="1" dirty="0">
-                  <a:solidFill>
-                    <a:srgbClr val="6C0000"/>
-                  </a:solidFill>
-                </a:rPr>
-                <a:t>Can’t determine if energy</a:t>
-              </a:r>
-            </a:p>
-            <a:p>
-              <a:r>
-                <a:rPr lang="en-US" sz="2800" b="1" dirty="0">
-                  <a:solidFill>
-                    <a:srgbClr val="6C0000"/>
-                  </a:solidFill>
-                </a:rPr>
-                <a:t>meaningfully contributes</a:t>
-              </a:r>
-            </a:p>
-            <a:p>
-              <a:r>
-                <a:rPr lang="en-US" sz="2800" b="1" dirty="0">
-                  <a:solidFill>
-                    <a:srgbClr val="6C0000"/>
-                  </a:solidFill>
-                </a:rPr>
-                <a:t>to model</a:t>
-              </a:r>
-            </a:p>
-          </p:txBody>
-        </p:sp>
-      </p:grpSp>
-      <p:grpSp>
-        <p:nvGrpSpPr>
-          <p:cNvPr id="14" name="Group 13"/>
-          <p:cNvGrpSpPr/>
-          <p:nvPr/>
-        </p:nvGrpSpPr>
-        <p:grpSpPr>
-          <a:xfrm>
-            <a:off x="1055042" y="4497518"/>
-            <a:ext cx="2283816" cy="1442049"/>
-            <a:chOff x="862262" y="4497518"/>
-            <a:chExt cx="2283816" cy="1442049"/>
-          </a:xfrm>
-        </p:grpSpPr>
-        <p:sp>
-          <p:nvSpPr>
-            <p:cNvPr id="7" name="Right Triangle 6"/>
-            <p:cNvSpPr/>
-            <p:nvPr/>
-          </p:nvSpPr>
-          <p:spPr>
-            <a:xfrm flipH="1">
-              <a:off x="1109528" y="4497518"/>
-              <a:ext cx="2036544" cy="1442049"/>
-            </a:xfrm>
-            <a:prstGeom prst="rtTriangle">
-              <a:avLst/>
-            </a:prstGeom>
-            <a:noFill/>
-            <a:ln w="50800">
-              <a:solidFill>
-                <a:srgbClr val="6C0000"/>
-              </a:solidFill>
-            </a:ln>
-            <a:effectLst/>
-          </p:spPr>
-          <p:style>
-            <a:lnRef idx="1">
-              <a:schemeClr val="accent1"/>
-            </a:lnRef>
-            <a:fillRef idx="3">
-              <a:schemeClr val="accent1"/>
-            </a:fillRef>
-            <a:effectRef idx="2">
-              <a:schemeClr val="accent1"/>
-            </a:effectRef>
-            <a:fontRef idx="minor">
-              <a:schemeClr val="lt1"/>
-            </a:fontRef>
-          </p:style>
-          <p:txBody>
-            <a:bodyPr rot="0" spcFirstLastPara="0" vertOverflow="overflow" horzOverflow="overflow" vert="vert270" wrap="square" lIns="0" tIns="0" rIns="0" bIns="0" numCol="1" spcCol="0" rtlCol="0" fromWordArt="0" anchor="t" anchorCtr="0" forceAA="0" compatLnSpc="1">
-              <a:prstTxWarp prst="textNoShape">
-                <a:avLst/>
-              </a:prstTxWarp>
-              <a:noAutofit/>
-            </a:bodyPr>
-            <a:lstStyle/>
-            <a:p>
-              <a:endParaRPr lang="en-US" sz="2800" b="1">
-                <a:solidFill>
-                  <a:srgbClr val="6C0000"/>
-                </a:solidFill>
-              </a:endParaRPr>
-            </a:p>
-          </p:txBody>
-        </p:sp>
-        <p:sp>
-          <p:nvSpPr>
-            <p:cNvPr id="17" name="TextBox 16"/>
-            <p:cNvSpPr txBox="1"/>
-            <p:nvPr/>
-          </p:nvSpPr>
-          <p:spPr>
-            <a:xfrm>
-              <a:off x="862262" y="4984655"/>
-              <a:ext cx="2283816" cy="954107"/>
-            </a:xfrm>
-            <a:prstGeom prst="rect">
-              <a:avLst/>
-            </a:prstGeom>
-            <a:noFill/>
-          </p:spPr>
-          <p:txBody>
-            <a:bodyPr wrap="square" rtlCol="0">
-              <a:spAutoFit/>
-            </a:bodyPr>
-            <a:lstStyle/>
-            <a:p>
-              <a:pPr algn="r"/>
-              <a:r>
-                <a:rPr lang="en-US" sz="1400" b="1" dirty="0">
-                  <a:solidFill>
-                    <a:srgbClr val="6C0000"/>
-                  </a:solidFill>
-                </a:rPr>
-                <a:t>Energy</a:t>
-              </a:r>
-            </a:p>
-            <a:p>
-              <a:pPr algn="r"/>
-              <a:r>
-                <a:rPr lang="en-US" sz="1400" b="1" dirty="0">
-                  <a:solidFill>
-                    <a:srgbClr val="6C0000"/>
-                  </a:solidFill>
-                </a:rPr>
-                <a:t>significant</a:t>
-              </a:r>
-            </a:p>
-            <a:p>
-              <a:pPr algn="r"/>
-              <a:r>
-                <a:rPr lang="en-US" sz="1400" b="1" dirty="0">
-                  <a:solidFill>
-                    <a:srgbClr val="6C0000"/>
-                  </a:solidFill>
-                </a:rPr>
-                <a:t>for economic</a:t>
-              </a:r>
-            </a:p>
-            <a:p>
-              <a:pPr algn="r"/>
-              <a:r>
-                <a:rPr lang="en-US" sz="1400" b="1" dirty="0" smtClean="0">
-                  <a:solidFill>
-                    <a:srgbClr val="6C0000"/>
-                  </a:solidFill>
-                </a:rPr>
-                <a:t>growth</a:t>
-              </a:r>
-              <a:endParaRPr lang="en-US" sz="1400" b="1" dirty="0">
-                <a:solidFill>
-                  <a:srgbClr val="6C0000"/>
-                </a:solidFill>
-              </a:endParaRPr>
-            </a:p>
-          </p:txBody>
-        </p:sp>
-      </p:grpSp>
-      <p:grpSp>
-        <p:nvGrpSpPr>
           <p:cNvPr id="20" name="Group 19"/>
           <p:cNvGrpSpPr/>
           <p:nvPr/>
         </p:nvGrpSpPr>
         <p:grpSpPr>
-          <a:xfrm>
-            <a:off x="5045367" y="734006"/>
-            <a:ext cx="3600504" cy="5207943"/>
-            <a:chOff x="4987107" y="734006"/>
-            <a:chExt cx="3600504" cy="5207943"/>
+          <a:xfrm flipH="1">
+            <a:off x="1165212" y="641482"/>
+            <a:ext cx="2656683" cy="5207943"/>
+            <a:chOff x="4971246" y="734006"/>
+            <a:chExt cx="3616365" cy="5207943"/>
           </a:xfrm>
         </p:grpSpPr>
         <p:sp>
@@ -6599,8 +6322,8 @@
           </p:nvSpPr>
           <p:spPr>
             <a:xfrm>
-              <a:off x="4987107" y="734006"/>
-              <a:ext cx="3600504" cy="5207943"/>
+              <a:off x="4971246" y="734006"/>
+              <a:ext cx="3616365" cy="5207943"/>
             </a:xfrm>
             <a:custGeom>
               <a:avLst/>
@@ -6635,6 +6358,16 @@
                 <a:gd name="connsiteY3" fmla="*/ 2328332 h 4465635"/>
                 <a:gd name="connsiteX4" fmla="*/ 3600504 w 3600504"/>
                 <a:gd name="connsiteY4" fmla="*/ 0 h 4465635"/>
+                <a:gd name="connsiteX0" fmla="*/ 3616365 w 3616365"/>
+                <a:gd name="connsiteY0" fmla="*/ 0 h 4465635"/>
+                <a:gd name="connsiteX1" fmla="*/ 3581409 w 3616365"/>
+                <a:gd name="connsiteY1" fmla="*/ 4465635 h 4465635"/>
+                <a:gd name="connsiteX2" fmla="*/ 15861 w 3616365"/>
+                <a:gd name="connsiteY2" fmla="*/ 4465635 h 4465635"/>
+                <a:gd name="connsiteX3" fmla="*/ 0 w 3616365"/>
+                <a:gd name="connsiteY3" fmla="*/ 1808839 h 4465635"/>
+                <a:gd name="connsiteX4" fmla="*/ 3616365 w 3616365"/>
+                <a:gd name="connsiteY4" fmla="*/ 0 h 4465635"/>
               </a:gdLst>
               <a:ahLst/>
               <a:cxnLst>
@@ -6656,21 +6389,21 @@
               </a:cxnLst>
               <a:rect l="l" t="t" r="r" b="b"/>
               <a:pathLst>
-                <a:path w="3600504" h="4465635">
+                <a:path w="3616365" h="4465635">
                   <a:moveTo>
-                    <a:pt x="3600504" y="0"/>
+                    <a:pt x="3616365" y="0"/>
                   </a:moveTo>
                   <a:lnTo>
-                    <a:pt x="3565548" y="4465635"/>
+                    <a:pt x="3581409" y="4465635"/>
                   </a:lnTo>
                   <a:lnTo>
-                    <a:pt x="0" y="4465635"/>
+                    <a:pt x="15861" y="4465635"/>
                   </a:lnTo>
                   <a:lnTo>
-                    <a:pt x="0" y="2328332"/>
+                    <a:pt x="0" y="1808839"/>
                   </a:lnTo>
                   <a:lnTo>
-                    <a:pt x="3600504" y="0"/>
+                    <a:pt x="3616365" y="0"/>
                   </a:lnTo>
                   <a:close/>
                 </a:path>
@@ -6723,8 +6456,8 @@
           </p:nvSpPr>
           <p:spPr>
             <a:xfrm>
-              <a:off x="5096246" y="3979169"/>
-              <a:ext cx="3305042" cy="1815882"/>
+              <a:off x="5159691" y="4017408"/>
+              <a:ext cx="3305041" cy="1815882"/>
             </a:xfrm>
             <a:prstGeom prst="rect">
               <a:avLst/>
@@ -6737,9 +6470,279 @@
             </a:bodyPr>
             <a:lstStyle/>
             <a:p>
-              <a:pPr algn="r"/>
+              <a:r>
+                <a:rPr lang="en-US" sz="2800" b="1" dirty="0">
+                  <a:solidFill>
+                    <a:srgbClr val="6C0000"/>
+                  </a:solidFill>
+                </a:rPr>
+                <a:t>Energy</a:t>
+              </a:r>
+            </a:p>
+            <a:p>
+              <a:r>
+                <a:rPr lang="en-US" sz="2800" b="1" dirty="0">
+                  <a:solidFill>
+                    <a:srgbClr val="6C0000"/>
+                  </a:solidFill>
+                </a:rPr>
+                <a:t>significant</a:t>
+              </a:r>
+            </a:p>
+            <a:p>
+              <a:r>
+                <a:rPr lang="en-US" sz="2800" b="1" dirty="0">
+                  <a:solidFill>
+                    <a:srgbClr val="6C0000"/>
+                  </a:solidFill>
+                </a:rPr>
+                <a:t>for economic</a:t>
+              </a:r>
+            </a:p>
+            <a:p>
               <a:r>
                 <a:rPr lang="en-US" sz="2800" b="1" dirty="0" smtClean="0">
+                  <a:solidFill>
+                    <a:srgbClr val="6C0000"/>
+                  </a:solidFill>
+                </a:rPr>
+                <a:t>growth</a:t>
+              </a:r>
+              <a:endParaRPr lang="en-US" sz="2800" b="1" dirty="0">
+                <a:solidFill>
+                  <a:srgbClr val="6C0000"/>
+                </a:solidFill>
+              </a:endParaRPr>
+            </a:p>
+          </p:txBody>
+        </p:sp>
+      </p:grpSp>
+      <p:sp>
+        <p:nvSpPr>
+          <p:cNvPr id="4" name="Right Triangle 3"/>
+          <p:cNvSpPr/>
+          <p:nvPr/>
+        </p:nvSpPr>
+        <p:spPr>
+          <a:xfrm flipH="1" flipV="1">
+            <a:off x="1165212" y="233016"/>
+            <a:ext cx="7480659" cy="5705745"/>
+          </a:xfrm>
+          <a:prstGeom prst="rtTriangle">
+            <a:avLst/>
+          </a:prstGeom>
+          <a:noFill/>
+          <a:ln w="50800">
+            <a:solidFill>
+              <a:srgbClr val="6C0000"/>
+            </a:solidFill>
+          </a:ln>
+          <a:effectLst/>
+        </p:spPr>
+        <p:style>
+          <a:lnRef idx="1">
+            <a:schemeClr val="accent1"/>
+          </a:lnRef>
+          <a:fillRef idx="3">
+            <a:schemeClr val="accent1"/>
+          </a:fillRef>
+          <a:effectRef idx="2">
+            <a:schemeClr val="accent1"/>
+          </a:effectRef>
+          <a:fontRef idx="minor">
+            <a:schemeClr val="lt1"/>
+          </a:fontRef>
+        </p:style>
+        <p:txBody>
+          <a:bodyPr rot="0" spcFirstLastPara="0" vertOverflow="overflow" horzOverflow="overflow" vert="vert270" wrap="square" lIns="0" tIns="0" rIns="0" bIns="0" numCol="1" spcCol="0" rtlCol="0" fromWordArt="0" anchor="t" anchorCtr="0" forceAA="0" compatLnSpc="1">
+            <a:prstTxWarp prst="textNoShape">
+              <a:avLst/>
+            </a:prstTxWarp>
+            <a:noAutofit/>
+          </a:bodyPr>
+          <a:lstStyle/>
+          <a:p>
+            <a:endParaRPr lang="en-US" sz="2800" b="1" dirty="0">
+              <a:solidFill>
+                <a:srgbClr val="6C0000"/>
+              </a:solidFill>
+            </a:endParaRPr>
+          </a:p>
+        </p:txBody>
+      </p:sp>
+      <p:sp>
+        <p:nvSpPr>
+          <p:cNvPr id="8" name="TextBox 7"/>
+          <p:cNvSpPr txBox="1"/>
+          <p:nvPr/>
+        </p:nvSpPr>
+        <p:spPr>
+          <a:xfrm>
+            <a:off x="5154506" y="266574"/>
+            <a:ext cx="3491365" cy="1815882"/>
+          </a:xfrm>
+          <a:prstGeom prst="rect">
+            <a:avLst/>
+          </a:prstGeom>
+          <a:noFill/>
+        </p:spPr>
+        <p:txBody>
+          <a:bodyPr wrap="square" rtlCol="0">
+            <a:spAutoFit/>
+          </a:bodyPr>
+          <a:lstStyle/>
+          <a:p>
+            <a:pPr algn="r"/>
+            <a:r>
+              <a:rPr lang="en-US" sz="2800" b="1" dirty="0">
+                <a:solidFill>
+                  <a:srgbClr val="6C0000"/>
+                </a:solidFill>
+              </a:rPr>
+              <a:t>Can’t determine if energy meaningfully contributes to model</a:t>
+            </a:r>
+          </a:p>
+          <a:p>
+            <a:pPr algn="r"/>
+            <a:endParaRPr lang="en-US" sz="2800" dirty="0"/>
+          </a:p>
+        </p:txBody>
+      </p:sp>
+      <p:grpSp>
+        <p:nvGrpSpPr>
+          <p:cNvPr id="18" name="Group 17"/>
+          <p:cNvGrpSpPr/>
+          <p:nvPr/>
+        </p:nvGrpSpPr>
+        <p:grpSpPr>
+          <a:xfrm>
+            <a:off x="5544400" y="3916275"/>
+            <a:ext cx="2649221" cy="1976655"/>
+            <a:chOff x="5476360" y="3916275"/>
+            <a:chExt cx="2649221" cy="1976655"/>
+          </a:xfrm>
+        </p:grpSpPr>
+        <p:grpSp>
+          <p:nvGrpSpPr>
+            <p:cNvPr id="14" name="Group 13"/>
+            <p:cNvGrpSpPr/>
+            <p:nvPr/>
+          </p:nvGrpSpPr>
+          <p:grpSpPr>
+            <a:xfrm>
+              <a:off x="5476360" y="3916275"/>
+              <a:ext cx="2649221" cy="1976655"/>
+              <a:chOff x="1194382" y="4497518"/>
+              <a:chExt cx="2082239" cy="1442049"/>
+            </a:xfrm>
+          </p:grpSpPr>
+          <p:sp>
+            <p:nvSpPr>
+              <p:cNvPr id="7" name="Right Triangle 6"/>
+              <p:cNvSpPr/>
+              <p:nvPr/>
+            </p:nvSpPr>
+            <p:spPr>
+              <a:xfrm>
+                <a:off x="1194382" y="4497518"/>
+                <a:ext cx="2036544" cy="1442049"/>
+              </a:xfrm>
+              <a:prstGeom prst="rtTriangle">
+                <a:avLst/>
+              </a:prstGeom>
+              <a:noFill/>
+              <a:ln w="50800">
+                <a:solidFill>
+                  <a:srgbClr val="6C0000"/>
+                </a:solidFill>
+              </a:ln>
+              <a:effectLst/>
+            </p:spPr>
+            <p:style>
+              <a:lnRef idx="1">
+                <a:schemeClr val="accent1"/>
+              </a:lnRef>
+              <a:fillRef idx="3">
+                <a:schemeClr val="accent1"/>
+              </a:fillRef>
+              <a:effectRef idx="2">
+                <a:schemeClr val="accent1"/>
+              </a:effectRef>
+              <a:fontRef idx="minor">
+                <a:schemeClr val="lt1"/>
+              </a:fontRef>
+            </p:style>
+            <p:txBody>
+              <a:bodyPr rot="0" spcFirstLastPara="0" vertOverflow="overflow" horzOverflow="overflow" vert="vert270" wrap="square" lIns="0" tIns="0" rIns="0" bIns="0" numCol="1" spcCol="0" rtlCol="0" fromWordArt="0" anchor="t" anchorCtr="0" forceAA="0" compatLnSpc="1">
+                <a:prstTxWarp prst="textNoShape">
+                  <a:avLst/>
+                </a:prstTxWarp>
+                <a:noAutofit/>
+              </a:bodyPr>
+              <a:lstStyle/>
+              <a:p>
+                <a:endParaRPr lang="en-US" sz="2800" b="1" dirty="0">
+                  <a:solidFill>
+                    <a:srgbClr val="6C0000"/>
+                  </a:solidFill>
+                </a:endParaRPr>
+              </a:p>
+            </p:txBody>
+          </p:sp>
+          <p:sp>
+            <p:nvSpPr>
+              <p:cNvPr id="17" name="TextBox 16"/>
+              <p:cNvSpPr txBox="1"/>
+              <p:nvPr/>
+            </p:nvSpPr>
+            <p:spPr>
+              <a:xfrm>
+                <a:off x="1240071" y="5096781"/>
+                <a:ext cx="2036550" cy="242336"/>
+              </a:xfrm>
+              <a:prstGeom prst="rect">
+                <a:avLst/>
+              </a:prstGeom>
+              <a:noFill/>
+            </p:spPr>
+            <p:txBody>
+              <a:bodyPr wrap="square" rtlCol="0">
+                <a:spAutoFit/>
+              </a:bodyPr>
+              <a:lstStyle/>
+              <a:p>
+                <a:endParaRPr lang="en-US" sz="2400" b="1" dirty="0">
+                  <a:solidFill>
+                    <a:srgbClr val="6C0000"/>
+                  </a:solidFill>
+                </a:endParaRPr>
+              </a:p>
+            </p:txBody>
+          </p:sp>
+        </p:grpSp>
+        <p:sp>
+          <p:nvSpPr>
+            <p:cNvPr id="9" name="Rectangle 8"/>
+            <p:cNvSpPr/>
+            <p:nvPr/>
+          </p:nvSpPr>
+          <p:spPr>
+            <a:xfrm>
+              <a:off x="5510295" y="4562520"/>
+              <a:ext cx="1803771" cy="1323439"/>
+            </a:xfrm>
+            <a:prstGeom prst="rect">
+              <a:avLst/>
+            </a:prstGeom>
+          </p:spPr>
+          <p:txBody>
+            <a:bodyPr wrap="square">
+              <a:spAutoFit/>
+            </a:bodyPr>
+            <a:lstStyle/>
+            <a:p>
+              <a:r>
+                <a:rPr lang="en-US" sz="1600" b="1" dirty="0">
                   <a:solidFill>
                     <a:srgbClr val="6C0000"/>
                   </a:solidFill>
@@ -6748,9 +6751,8 @@
               </a:r>
             </a:p>
             <a:p>
-              <a:pPr algn="r"/>
               <a:r>
-                <a:rPr lang="en-US" sz="2800" b="1" dirty="0" smtClean="0">
+                <a:rPr lang="en-US" sz="1600" b="1" dirty="0">
                   <a:solidFill>
                     <a:srgbClr val="6C0000"/>
                   </a:solidFill>
@@ -6759,16 +6761,15 @@
               </a:r>
             </a:p>
             <a:p>
-              <a:pPr algn="r"/>
               <a:r>
-                <a:rPr lang="en-US" sz="2800" b="1" dirty="0" smtClean="0">
+                <a:rPr lang="en-US" sz="1600" b="1" dirty="0">
                   <a:solidFill>
                     <a:srgbClr val="6C0000"/>
                   </a:solidFill>
                 </a:rPr>
                 <a:t>for economic growth</a:t>
               </a:r>
-              <a:endParaRPr lang="en-US" sz="2800" b="1" dirty="0">
+              <a:endParaRPr lang="en-US" sz="1600" b="1" dirty="0">
                 <a:solidFill>
                   <a:srgbClr val="6C0000"/>
                 </a:solidFill>
@@ -6780,7 +6781,7 @@
     </p:spTree>
     <p:extLst>
       <p:ext uri="{BB962C8B-B14F-4D97-AF65-F5344CB8AC3E}">
-        <p14:creationId xmlns:p14="http://schemas.microsoft.com/office/powerpoint/2010/main" val="1061016967"/>
+        <p14:creationId xmlns:p14="http://schemas.microsoft.com/office/powerpoint/2010/main" val="3708998409"/>
       </p:ext>
     </p:extLst>
   </p:cSld>

</xml_diff>

<commit_message>
Changes to the presentation before the seminar.
</commit_message>
<xml_diff>
--- a/figure_other/Seminar Figures.pptx
+++ b/figure_other/Seminar Figures.pptx
@@ -295,7 +295,7 @@
           <a:p>
             <a:fld id="{392B46AE-74E1-BB46-A59A-36DBA27128E6}" type="datetimeFigureOut">
               <a:rPr lang="en-US" smtClean="0"/>
-              <a:t>2-Apr-13</a:t>
+              <a:t>3-Apr-13</a:t>
             </a:fld>
             <a:endParaRPr lang="en-US"/>
           </a:p>
@@ -465,7 +465,7 @@
           <a:p>
             <a:fld id="{392B46AE-74E1-BB46-A59A-36DBA27128E6}" type="datetimeFigureOut">
               <a:rPr lang="en-US" smtClean="0"/>
-              <a:t>2-Apr-13</a:t>
+              <a:t>3-Apr-13</a:t>
             </a:fld>
             <a:endParaRPr lang="en-US"/>
           </a:p>
@@ -645,7 +645,7 @@
           <a:p>
             <a:fld id="{392B46AE-74E1-BB46-A59A-36DBA27128E6}" type="datetimeFigureOut">
               <a:rPr lang="en-US" smtClean="0"/>
-              <a:t>2-Apr-13</a:t>
+              <a:t>3-Apr-13</a:t>
             </a:fld>
             <a:endParaRPr lang="en-US"/>
           </a:p>
@@ -815,7 +815,7 @@
           <a:p>
             <a:fld id="{392B46AE-74E1-BB46-A59A-36DBA27128E6}" type="datetimeFigureOut">
               <a:rPr lang="en-US" smtClean="0"/>
-              <a:t>2-Apr-13</a:t>
+              <a:t>3-Apr-13</a:t>
             </a:fld>
             <a:endParaRPr lang="en-US"/>
           </a:p>
@@ -1061,7 +1061,7 @@
           <a:p>
             <a:fld id="{392B46AE-74E1-BB46-A59A-36DBA27128E6}" type="datetimeFigureOut">
               <a:rPr lang="en-US" smtClean="0"/>
-              <a:t>2-Apr-13</a:t>
+              <a:t>3-Apr-13</a:t>
             </a:fld>
             <a:endParaRPr lang="en-US"/>
           </a:p>
@@ -1349,7 +1349,7 @@
           <a:p>
             <a:fld id="{392B46AE-74E1-BB46-A59A-36DBA27128E6}" type="datetimeFigureOut">
               <a:rPr lang="en-US" smtClean="0"/>
-              <a:t>2-Apr-13</a:t>
+              <a:t>3-Apr-13</a:t>
             </a:fld>
             <a:endParaRPr lang="en-US"/>
           </a:p>
@@ -1771,7 +1771,7 @@
           <a:p>
             <a:fld id="{392B46AE-74E1-BB46-A59A-36DBA27128E6}" type="datetimeFigureOut">
               <a:rPr lang="en-US" smtClean="0"/>
-              <a:t>2-Apr-13</a:t>
+              <a:t>3-Apr-13</a:t>
             </a:fld>
             <a:endParaRPr lang="en-US"/>
           </a:p>
@@ -1889,7 +1889,7 @@
           <a:p>
             <a:fld id="{392B46AE-74E1-BB46-A59A-36DBA27128E6}" type="datetimeFigureOut">
               <a:rPr lang="en-US" smtClean="0"/>
-              <a:t>2-Apr-13</a:t>
+              <a:t>3-Apr-13</a:t>
             </a:fld>
             <a:endParaRPr lang="en-US"/>
           </a:p>
@@ -1984,7 +1984,7 @@
           <a:p>
             <a:fld id="{392B46AE-74E1-BB46-A59A-36DBA27128E6}" type="datetimeFigureOut">
               <a:rPr lang="en-US" smtClean="0"/>
-              <a:t>2-Apr-13</a:t>
+              <a:t>3-Apr-13</a:t>
             </a:fld>
             <a:endParaRPr lang="en-US"/>
           </a:p>
@@ -2261,7 +2261,7 @@
           <a:p>
             <a:fld id="{392B46AE-74E1-BB46-A59A-36DBA27128E6}" type="datetimeFigureOut">
               <a:rPr lang="en-US" smtClean="0"/>
-              <a:t>2-Apr-13</a:t>
+              <a:t>3-Apr-13</a:t>
             </a:fld>
             <a:endParaRPr lang="en-US"/>
           </a:p>
@@ -2514,7 +2514,7 @@
           <a:p>
             <a:fld id="{392B46AE-74E1-BB46-A59A-36DBA27128E6}" type="datetimeFigureOut">
               <a:rPr lang="en-US" smtClean="0"/>
-              <a:t>2-Apr-13</a:t>
+              <a:t>3-Apr-13</a:t>
             </a:fld>
             <a:endParaRPr lang="en-US"/>
           </a:p>
@@ -2727,7 +2727,7 @@
           <a:p>
             <a:fld id="{392B46AE-74E1-BB46-A59A-36DBA27128E6}" type="datetimeFigureOut">
               <a:rPr lang="en-US" smtClean="0"/>
-              <a:t>2-Apr-13</a:t>
+              <a:t>3-Apr-13</a:t>
             </a:fld>
             <a:endParaRPr lang="en-US"/>
           </a:p>
@@ -6308,8 +6308,8 @@
         </p:nvGrpSpPr>
         <p:grpSpPr>
           <a:xfrm flipH="1">
-            <a:off x="1165212" y="641482"/>
-            <a:ext cx="2656683" cy="5207943"/>
+            <a:off x="1165211" y="641482"/>
+            <a:ext cx="3835568" cy="5207943"/>
             <a:chOff x="4971246" y="734006"/>
             <a:chExt cx="3616365" cy="5207943"/>
           </a:xfrm>
@@ -6368,6 +6368,16 @@
                 <a:gd name="connsiteY3" fmla="*/ 1808839 h 4465635"/>
                 <a:gd name="connsiteX4" fmla="*/ 3616365 w 3616365"/>
                 <a:gd name="connsiteY4" fmla="*/ 0 h 4465635"/>
+                <a:gd name="connsiteX0" fmla="*/ 3616365 w 3616365"/>
+                <a:gd name="connsiteY0" fmla="*/ 0 h 4465635"/>
+                <a:gd name="connsiteX1" fmla="*/ 3581409 w 3616365"/>
+                <a:gd name="connsiteY1" fmla="*/ 4465635 h 4465635"/>
+                <a:gd name="connsiteX2" fmla="*/ 15861 w 3616365"/>
+                <a:gd name="connsiteY2" fmla="*/ 4465635 h 4465635"/>
+                <a:gd name="connsiteX3" fmla="*/ 0 w 3616365"/>
+                <a:gd name="connsiteY3" fmla="*/ 2557576 h 4465635"/>
+                <a:gd name="connsiteX4" fmla="*/ 3616365 w 3616365"/>
+                <a:gd name="connsiteY4" fmla="*/ 0 h 4465635"/>
               </a:gdLst>
               <a:ahLst/>
               <a:cxnLst>
@@ -6400,7 +6410,7 @@
                     <a:pt x="15861" y="4465635"/>
                   </a:lnTo>
                   <a:lnTo>
-                    <a:pt x="0" y="1808839"/>
+                    <a:pt x="0" y="2557576"/>
                   </a:lnTo>
                   <a:lnTo>
                     <a:pt x="3616365" y="0"/>
@@ -6769,11 +6779,6 @@
                 </a:rPr>
                 <a:t>for economic growth</a:t>
               </a:r>
-              <a:endParaRPr lang="en-US" sz="1600" b="1" dirty="0">
-                <a:solidFill>
-                  <a:srgbClr val="6C0000"/>
-                </a:solidFill>
-              </a:endParaRPr>
             </a:p>
           </p:txBody>
         </p:sp>

</xml_diff>

<commit_message>
Fixed several small things on the seminar in preparation for the seminar.
</commit_message>
<xml_diff>
--- a/figure_other/Seminar Figures.pptx
+++ b/figure_other/Seminar Figures.pptx
@@ -295,7 +295,7 @@
           <a:p>
             <a:fld id="{392B46AE-74E1-BB46-A59A-36DBA27128E6}" type="datetimeFigureOut">
               <a:rPr lang="en-US" smtClean="0"/>
-              <a:t>3-Apr-13</a:t>
+              <a:t>4-Apr-13</a:t>
             </a:fld>
             <a:endParaRPr lang="en-US"/>
           </a:p>
@@ -465,7 +465,7 @@
           <a:p>
             <a:fld id="{392B46AE-74E1-BB46-A59A-36DBA27128E6}" type="datetimeFigureOut">
               <a:rPr lang="en-US" smtClean="0"/>
-              <a:t>3-Apr-13</a:t>
+              <a:t>4-Apr-13</a:t>
             </a:fld>
             <a:endParaRPr lang="en-US"/>
           </a:p>
@@ -645,7 +645,7 @@
           <a:p>
             <a:fld id="{392B46AE-74E1-BB46-A59A-36DBA27128E6}" type="datetimeFigureOut">
               <a:rPr lang="en-US" smtClean="0"/>
-              <a:t>3-Apr-13</a:t>
+              <a:t>4-Apr-13</a:t>
             </a:fld>
             <a:endParaRPr lang="en-US"/>
           </a:p>
@@ -815,7 +815,7 @@
           <a:p>
             <a:fld id="{392B46AE-74E1-BB46-A59A-36DBA27128E6}" type="datetimeFigureOut">
               <a:rPr lang="en-US" smtClean="0"/>
-              <a:t>3-Apr-13</a:t>
+              <a:t>4-Apr-13</a:t>
             </a:fld>
             <a:endParaRPr lang="en-US"/>
           </a:p>
@@ -1061,7 +1061,7 @@
           <a:p>
             <a:fld id="{392B46AE-74E1-BB46-A59A-36DBA27128E6}" type="datetimeFigureOut">
               <a:rPr lang="en-US" smtClean="0"/>
-              <a:t>3-Apr-13</a:t>
+              <a:t>4-Apr-13</a:t>
             </a:fld>
             <a:endParaRPr lang="en-US"/>
           </a:p>
@@ -1349,7 +1349,7 @@
           <a:p>
             <a:fld id="{392B46AE-74E1-BB46-A59A-36DBA27128E6}" type="datetimeFigureOut">
               <a:rPr lang="en-US" smtClean="0"/>
-              <a:t>3-Apr-13</a:t>
+              <a:t>4-Apr-13</a:t>
             </a:fld>
             <a:endParaRPr lang="en-US"/>
           </a:p>
@@ -1771,7 +1771,7 @@
           <a:p>
             <a:fld id="{392B46AE-74E1-BB46-A59A-36DBA27128E6}" type="datetimeFigureOut">
               <a:rPr lang="en-US" smtClean="0"/>
-              <a:t>3-Apr-13</a:t>
+              <a:t>4-Apr-13</a:t>
             </a:fld>
             <a:endParaRPr lang="en-US"/>
           </a:p>
@@ -1889,7 +1889,7 @@
           <a:p>
             <a:fld id="{392B46AE-74E1-BB46-A59A-36DBA27128E6}" type="datetimeFigureOut">
               <a:rPr lang="en-US" smtClean="0"/>
-              <a:t>3-Apr-13</a:t>
+              <a:t>4-Apr-13</a:t>
             </a:fld>
             <a:endParaRPr lang="en-US"/>
           </a:p>
@@ -1984,7 +1984,7 @@
           <a:p>
             <a:fld id="{392B46AE-74E1-BB46-A59A-36DBA27128E6}" type="datetimeFigureOut">
               <a:rPr lang="en-US" smtClean="0"/>
-              <a:t>3-Apr-13</a:t>
+              <a:t>4-Apr-13</a:t>
             </a:fld>
             <a:endParaRPr lang="en-US"/>
           </a:p>
@@ -2261,7 +2261,7 @@
           <a:p>
             <a:fld id="{392B46AE-74E1-BB46-A59A-36DBA27128E6}" type="datetimeFigureOut">
               <a:rPr lang="en-US" smtClean="0"/>
-              <a:t>3-Apr-13</a:t>
+              <a:t>4-Apr-13</a:t>
             </a:fld>
             <a:endParaRPr lang="en-US"/>
           </a:p>
@@ -2514,7 +2514,7 @@
           <a:p>
             <a:fld id="{392B46AE-74E1-BB46-A59A-36DBA27128E6}" type="datetimeFigureOut">
               <a:rPr lang="en-US" smtClean="0"/>
-              <a:t>3-Apr-13</a:t>
+              <a:t>4-Apr-13</a:t>
             </a:fld>
             <a:endParaRPr lang="en-US"/>
           </a:p>
@@ -2727,7 +2727,7 @@
           <a:p>
             <a:fld id="{392B46AE-74E1-BB46-A59A-36DBA27128E6}" type="datetimeFigureOut">
               <a:rPr lang="en-US" smtClean="0"/>
-              <a:t>3-Apr-13</a:t>
+              <a:t>4-Apr-13</a:t>
             </a:fld>
             <a:endParaRPr lang="en-US"/>
           </a:p>
@@ -7640,7 +7640,7 @@
         </p:nvSpPr>
         <p:spPr>
           <a:xfrm>
-            <a:off x="4070955" y="2097941"/>
+            <a:off x="4002915" y="2097941"/>
             <a:ext cx="3039023" cy="2245365"/>
           </a:xfrm>
           <a:prstGeom prst="roundRect">
@@ -7679,9 +7679,28 @@
                   <a:srgbClr val="800000"/>
                 </a:solidFill>
               </a:rPr>
-              <a:t>Growth Model</a:t>
-            </a:r>
-            <a:endParaRPr lang="en-US" sz="2800" b="1" dirty="0">
+              <a:t>Growth </a:t>
+            </a:r>
+            <a:r>
+              <a:rPr lang="en-US" sz="2800" b="1" dirty="0" smtClean="0">
+                <a:solidFill>
+                  <a:srgbClr val="800000"/>
+                </a:solidFill>
+              </a:rPr>
+              <a:t>Model</a:t>
+            </a:r>
+          </a:p>
+          <a:p>
+            <a:pPr algn="ctr"/>
+            <a:r>
+              <a:rPr lang="en-US" b="1" dirty="0" smtClean="0">
+                <a:solidFill>
+                  <a:srgbClr val="800000"/>
+                </a:solidFill>
+              </a:rPr>
+              <a:t>(Production Function)</a:t>
+            </a:r>
+            <a:endParaRPr lang="en-US" b="1" dirty="0">
               <a:solidFill>
                 <a:srgbClr val="800000"/>
               </a:solidFill>
@@ -7699,7 +7718,7 @@
         </p:nvCxnSpPr>
         <p:spPr>
           <a:xfrm>
-            <a:off x="7109978" y="3220624"/>
+            <a:off x="7041938" y="3220624"/>
             <a:ext cx="1111284" cy="11340"/>
           </a:xfrm>
           <a:prstGeom prst="straightConnector1">
@@ -7736,7 +7755,7 @@
         </p:nvCxnSpPr>
         <p:spPr>
           <a:xfrm>
-            <a:off x="2959671" y="2438149"/>
+            <a:off x="2891631" y="2438149"/>
             <a:ext cx="1111284" cy="11340"/>
           </a:xfrm>
           <a:prstGeom prst="straightConnector1">
@@ -7773,7 +7792,7 @@
         </p:nvCxnSpPr>
         <p:spPr>
           <a:xfrm>
-            <a:off x="2959671" y="3209284"/>
+            <a:off x="2891631" y="3209284"/>
             <a:ext cx="1111284" cy="11340"/>
           </a:xfrm>
           <a:prstGeom prst="straightConnector1">
@@ -7810,7 +7829,7 @@
         </p:nvCxnSpPr>
         <p:spPr>
           <a:xfrm>
-            <a:off x="2959671" y="3980420"/>
+            <a:off x="2891631" y="3980420"/>
             <a:ext cx="1111284" cy="11340"/>
           </a:xfrm>
           <a:prstGeom prst="straightConnector1">
@@ -7848,7 +7867,7 @@
         </p:nvSpPr>
         <p:spPr>
           <a:xfrm>
-            <a:off x="8221262" y="2897458"/>
+            <a:off x="8153222" y="2897458"/>
             <a:ext cx="537477" cy="646331"/>
           </a:xfrm>
           <a:prstGeom prst="rect">
@@ -7881,7 +7900,7 @@
         </p:nvSpPr>
         <p:spPr>
           <a:xfrm>
-            <a:off x="2335990" y="2114983"/>
+            <a:off x="2267950" y="2114983"/>
             <a:ext cx="550100" cy="646331"/>
           </a:xfrm>
           <a:prstGeom prst="rect">
@@ -7914,7 +7933,7 @@
         </p:nvSpPr>
         <p:spPr>
           <a:xfrm>
-            <a:off x="2335990" y="2818078"/>
+            <a:off x="2267950" y="2818078"/>
             <a:ext cx="492843" cy="646331"/>
           </a:xfrm>
           <a:prstGeom prst="rect">
@@ -7947,7 +7966,7 @@
         </p:nvSpPr>
         <p:spPr>
           <a:xfrm>
-            <a:off x="1665214" y="3623234"/>
+            <a:off x="1597174" y="3623234"/>
             <a:ext cx="1813092" cy="1200329"/>
           </a:xfrm>
           <a:prstGeom prst="rect">
@@ -8040,7 +8059,7 @@
         </p:nvGrpSpPr>
         <p:grpSpPr>
           <a:xfrm>
-            <a:off x="871578" y="1999244"/>
+            <a:off x="803538" y="1999244"/>
             <a:ext cx="874746" cy="2465438"/>
             <a:chOff x="304578" y="1987904"/>
             <a:chExt cx="874746" cy="2465438"/>

</xml_diff>